<commit_message>
working on intro and first algorithm description
</commit_message>
<xml_diff>
--- a/SKA-Days/Towards Distributed Image Reconstruction.pptx
+++ b/SKA-Days/Towards Distributed Image Reconstruction.pptx
@@ -14,22 +14,25 @@
     <p:sldId id="263" r:id="rId8"/>
     <p:sldId id="272" r:id="rId9"/>
     <p:sldId id="283" r:id="rId10"/>
-    <p:sldId id="262" r:id="rId11"/>
-    <p:sldId id="271" r:id="rId12"/>
-    <p:sldId id="270" r:id="rId13"/>
-    <p:sldId id="273" r:id="rId14"/>
-    <p:sldId id="280" r:id="rId15"/>
-    <p:sldId id="284" r:id="rId16"/>
-    <p:sldId id="275" r:id="rId17"/>
-    <p:sldId id="279" r:id="rId18"/>
-    <p:sldId id="278" r:id="rId19"/>
-    <p:sldId id="289" r:id="rId20"/>
-    <p:sldId id="285" r:id="rId21"/>
-    <p:sldId id="292" r:id="rId22"/>
-    <p:sldId id="287" r:id="rId23"/>
-    <p:sldId id="290" r:id="rId24"/>
-    <p:sldId id="291" r:id="rId25"/>
-    <p:sldId id="293" r:id="rId26"/>
+    <p:sldId id="294" r:id="rId11"/>
+    <p:sldId id="262" r:id="rId12"/>
+    <p:sldId id="271" r:id="rId13"/>
+    <p:sldId id="270" r:id="rId14"/>
+    <p:sldId id="273" r:id="rId15"/>
+    <p:sldId id="280" r:id="rId16"/>
+    <p:sldId id="284" r:id="rId17"/>
+    <p:sldId id="295" r:id="rId18"/>
+    <p:sldId id="275" r:id="rId19"/>
+    <p:sldId id="279" r:id="rId20"/>
+    <p:sldId id="278" r:id="rId21"/>
+    <p:sldId id="296" r:id="rId22"/>
+    <p:sldId id="289" r:id="rId23"/>
+    <p:sldId id="285" r:id="rId24"/>
+    <p:sldId id="292" r:id="rId25"/>
+    <p:sldId id="287" r:id="rId26"/>
+    <p:sldId id="290" r:id="rId27"/>
+    <p:sldId id="291" r:id="rId28"/>
+    <p:sldId id="293" r:id="rId29"/>
   </p:sldIdLst>
   <p:sldSz cx="12192000" cy="6858000"/>
   <p:notesSz cx="6858000" cy="9144000"/>
@@ -146,6 +149,7 @@
         </p14:section>
         <p14:section name="Bisher, Major Cycle" id="{2D4D444E-B0B4-4900-AF19-E41610FF43CD}">
           <p14:sldIdLst>
+            <p14:sldId id="294"/>
             <p14:sldId id="262"/>
             <p14:sldId id="271"/>
             <p14:sldId id="270"/>
@@ -156,9 +160,11 @@
           <p14:sldIdLst>
             <p14:sldId id="280"/>
             <p14:sldId id="284"/>
+            <p14:sldId id="295"/>
             <p14:sldId id="275"/>
             <p14:sldId id="279"/>
             <p14:sldId id="278"/>
+            <p14:sldId id="296"/>
             <p14:sldId id="289"/>
             <p14:sldId id="285"/>
             <p14:sldId id="292"/>
@@ -312,7 +318,7 @@
           <a:p>
             <a:fld id="{2019A626-8AAF-4A70-B83C-143F15D5AD18}" type="datetimeFigureOut">
               <a:rPr lang="en-GB" smtClean="0"/>
-              <a:t>05/06/2019</a:t>
+              <a:t>07/06/2019</a:t>
             </a:fld>
             <a:endParaRPr lang="en-GB"/>
           </a:p>
@@ -482,7 +488,7 @@
           <a:p>
             <a:fld id="{2019A626-8AAF-4A70-B83C-143F15D5AD18}" type="datetimeFigureOut">
               <a:rPr lang="en-GB" smtClean="0"/>
-              <a:t>05/06/2019</a:t>
+              <a:t>07/06/2019</a:t>
             </a:fld>
             <a:endParaRPr lang="en-GB"/>
           </a:p>
@@ -662,7 +668,7 @@
           <a:p>
             <a:fld id="{2019A626-8AAF-4A70-B83C-143F15D5AD18}" type="datetimeFigureOut">
               <a:rPr lang="en-GB" smtClean="0"/>
-              <a:t>05/06/2019</a:t>
+              <a:t>07/06/2019</a:t>
             </a:fld>
             <a:endParaRPr lang="en-GB"/>
           </a:p>
@@ -832,7 +838,7 @@
           <a:p>
             <a:fld id="{2019A626-8AAF-4A70-B83C-143F15D5AD18}" type="datetimeFigureOut">
               <a:rPr lang="en-GB" smtClean="0"/>
-              <a:t>05/06/2019</a:t>
+              <a:t>07/06/2019</a:t>
             </a:fld>
             <a:endParaRPr lang="en-GB"/>
           </a:p>
@@ -1078,7 +1084,7 @@
           <a:p>
             <a:fld id="{2019A626-8AAF-4A70-B83C-143F15D5AD18}" type="datetimeFigureOut">
               <a:rPr lang="en-GB" smtClean="0"/>
-              <a:t>05/06/2019</a:t>
+              <a:t>07/06/2019</a:t>
             </a:fld>
             <a:endParaRPr lang="en-GB"/>
           </a:p>
@@ -1310,7 +1316,7 @@
           <a:p>
             <a:fld id="{2019A626-8AAF-4A70-B83C-143F15D5AD18}" type="datetimeFigureOut">
               <a:rPr lang="en-GB" smtClean="0"/>
-              <a:t>05/06/2019</a:t>
+              <a:t>07/06/2019</a:t>
             </a:fld>
             <a:endParaRPr lang="en-GB"/>
           </a:p>
@@ -1677,7 +1683,7 @@
           <a:p>
             <a:fld id="{2019A626-8AAF-4A70-B83C-143F15D5AD18}" type="datetimeFigureOut">
               <a:rPr lang="en-GB" smtClean="0"/>
-              <a:t>05/06/2019</a:t>
+              <a:t>07/06/2019</a:t>
             </a:fld>
             <a:endParaRPr lang="en-GB"/>
           </a:p>
@@ -1795,7 +1801,7 @@
           <a:p>
             <a:fld id="{2019A626-8AAF-4A70-B83C-143F15D5AD18}" type="datetimeFigureOut">
               <a:rPr lang="en-GB" smtClean="0"/>
-              <a:t>05/06/2019</a:t>
+              <a:t>07/06/2019</a:t>
             </a:fld>
             <a:endParaRPr lang="en-GB"/>
           </a:p>
@@ -1890,7 +1896,7 @@
           <a:p>
             <a:fld id="{2019A626-8AAF-4A70-B83C-143F15D5AD18}" type="datetimeFigureOut">
               <a:rPr lang="en-GB" smtClean="0"/>
-              <a:t>05/06/2019</a:t>
+              <a:t>07/06/2019</a:t>
             </a:fld>
             <a:endParaRPr lang="en-GB"/>
           </a:p>
@@ -2167,7 +2173,7 @@
           <a:p>
             <a:fld id="{2019A626-8AAF-4A70-B83C-143F15D5AD18}" type="datetimeFigureOut">
               <a:rPr lang="en-GB" smtClean="0"/>
-              <a:t>05/06/2019</a:t>
+              <a:t>07/06/2019</a:t>
             </a:fld>
             <a:endParaRPr lang="en-GB"/>
           </a:p>
@@ -2420,7 +2426,7 @@
           <a:p>
             <a:fld id="{2019A626-8AAF-4A70-B83C-143F15D5AD18}" type="datetimeFigureOut">
               <a:rPr lang="en-GB" smtClean="0"/>
-              <a:t>05/06/2019</a:t>
+              <a:t>07/06/2019</a:t>
             </a:fld>
             <a:endParaRPr lang="en-GB"/>
           </a:p>
@@ -2633,7 +2639,7 @@
           <a:p>
             <a:fld id="{2019A626-8AAF-4A70-B83C-143F15D5AD18}" type="datetimeFigureOut">
               <a:rPr lang="en-GB" smtClean="0"/>
-              <a:t>05/06/2019</a:t>
+              <a:t>07/06/2019</a:t>
             </a:fld>
             <a:endParaRPr lang="en-GB"/>
           </a:p>
@@ -3125,6 +3131,74 @@
           <a:bodyPr/>
           <a:lstStyle/>
           <a:p>
+            <a:endParaRPr lang="en-GB"/>
+          </a:p>
+        </p:txBody>
+      </p:sp>
+      <p:sp>
+        <p:nvSpPr>
+          <p:cNvPr id="3" name="Inhaltsplatzhalter 2"/>
+          <p:cNvSpPr>
+            <a:spLocks noGrp="1"/>
+          </p:cNvSpPr>
+          <p:nvPr>
+            <p:ph idx="1"/>
+          </p:nvPr>
+        </p:nvSpPr>
+        <p:spPr/>
+        <p:txBody>
+          <a:bodyPr/>
+          <a:lstStyle/>
+          <a:p>
+            <a:endParaRPr lang="en-GB"/>
+          </a:p>
+        </p:txBody>
+      </p:sp>
+    </p:spTree>
+    <p:extLst>
+      <p:ext uri="{BB962C8B-B14F-4D97-AF65-F5344CB8AC3E}">
+        <p14:creationId xmlns:p14="http://schemas.microsoft.com/office/powerpoint/2010/main" val="724787272"/>
+      </p:ext>
+    </p:extLst>
+  </p:cSld>
+  <p:clrMapOvr>
+    <a:masterClrMapping/>
+  </p:clrMapOvr>
+</p:sld>
+</file>
+
+<file path=ppt/slides/slide11.xml><?xml version="1.0" encoding="utf-8"?>
+<p:sld xmlns:a="http://schemas.openxmlformats.org/drawingml/2006/main" xmlns:r="http://schemas.openxmlformats.org/officeDocument/2006/relationships" xmlns:p="http://schemas.openxmlformats.org/presentationml/2006/main">
+  <p:cSld>
+    <p:spTree>
+      <p:nvGrpSpPr>
+        <p:cNvPr id="1" name=""/>
+        <p:cNvGrpSpPr/>
+        <p:nvPr/>
+      </p:nvGrpSpPr>
+      <p:grpSpPr>
+        <a:xfrm>
+          <a:off x="0" y="0"/>
+          <a:ext cx="0" cy="0"/>
+          <a:chOff x="0" y="0"/>
+          <a:chExt cx="0" cy="0"/>
+        </a:xfrm>
+      </p:grpSpPr>
+      <p:sp>
+        <p:nvSpPr>
+          <p:cNvPr id="2" name="Titel 1"/>
+          <p:cNvSpPr>
+            <a:spLocks noGrp="1"/>
+          </p:cNvSpPr>
+          <p:nvPr>
+            <p:ph type="title"/>
+          </p:nvPr>
+        </p:nvSpPr>
+        <p:spPr/>
+        <p:txBody>
+          <a:bodyPr/>
+          <a:lstStyle/>
+          <a:p>
             <a:r>
               <a:rPr lang="en-GB" dirty="0" smtClean="0"/>
               <a:t>Major / Minor Cycle</a:t>
@@ -3189,7 +3263,7 @@
 </p:sld>
 </file>
 
-<file path=ppt/slides/slide11.xml><?xml version="1.0" encoding="utf-8"?>
+<file path=ppt/slides/slide12.xml><?xml version="1.0" encoding="utf-8"?>
 <p:sld xmlns:a="http://schemas.openxmlformats.org/drawingml/2006/main" xmlns:r="http://schemas.openxmlformats.org/officeDocument/2006/relationships" xmlns:p="http://schemas.openxmlformats.org/presentationml/2006/main">
   <p:cSld>
     <p:spTree>
@@ -3391,7 +3465,7 @@
 </p:sld>
 </file>
 
-<file path=ppt/slides/slide12.xml><?xml version="1.0" encoding="utf-8"?>
+<file path=ppt/slides/slide13.xml><?xml version="1.0" encoding="utf-8"?>
 <p:sld xmlns:a="http://schemas.openxmlformats.org/drawingml/2006/main" xmlns:r="http://schemas.openxmlformats.org/officeDocument/2006/relationships" xmlns:p="http://schemas.openxmlformats.org/presentationml/2006/main">
   <p:cSld>
     <p:spTree>
@@ -3487,155 +3561,6 @@
 </p:sld>
 </file>
 
-<file path=ppt/slides/slide13.xml><?xml version="1.0" encoding="utf-8"?>
-<p:sld xmlns:a="http://schemas.openxmlformats.org/drawingml/2006/main" xmlns:r="http://schemas.openxmlformats.org/officeDocument/2006/relationships" xmlns:p="http://schemas.openxmlformats.org/presentationml/2006/main">
-  <p:cSld>
-    <p:spTree>
-      <p:nvGrpSpPr>
-        <p:cNvPr id="1" name=""/>
-        <p:cNvGrpSpPr/>
-        <p:nvPr/>
-      </p:nvGrpSpPr>
-      <p:grpSpPr>
-        <a:xfrm>
-          <a:off x="0" y="0"/>
-          <a:ext cx="0" cy="0"/>
-          <a:chOff x="0" y="0"/>
-          <a:chExt cx="0" cy="0"/>
-        </a:xfrm>
-      </p:grpSpPr>
-      <p:sp>
-        <p:nvSpPr>
-          <p:cNvPr id="2" name="Titel 1"/>
-          <p:cNvSpPr>
-            <a:spLocks noGrp="1"/>
-          </p:cNvSpPr>
-          <p:nvPr>
-            <p:ph type="title"/>
-          </p:nvPr>
-        </p:nvSpPr>
-        <p:spPr/>
-        <p:txBody>
-          <a:bodyPr/>
-          <a:lstStyle/>
-          <a:p>
-            <a:r>
-              <a:rPr lang="en-GB" dirty="0" smtClean="0"/>
-              <a:t>Distribute Gridding!</a:t>
-            </a:r>
-            <a:endParaRPr lang="en-GB" dirty="0"/>
-          </a:p>
-        </p:txBody>
-      </p:sp>
-      <p:sp>
-        <p:nvSpPr>
-          <p:cNvPr id="3" name="Inhaltsplatzhalter 2"/>
-          <p:cNvSpPr>
-            <a:spLocks noGrp="1"/>
-          </p:cNvSpPr>
-          <p:nvPr>
-            <p:ph idx="1"/>
-          </p:nvPr>
-        </p:nvSpPr>
-        <p:spPr/>
-        <p:txBody>
-          <a:bodyPr>
-            <a:normAutofit/>
-          </a:bodyPr>
-          <a:lstStyle/>
-          <a:p>
-            <a:r>
-              <a:rPr lang="en-GB" dirty="0" smtClean="0"/>
-              <a:t>May let us keep the calibrated Visibilities </a:t>
-            </a:r>
-            <a:r>
-              <a:rPr lang="en-GB" dirty="0" smtClean="0"/>
-              <a:t>in-memory</a:t>
-            </a:r>
-            <a:endParaRPr lang="en-GB" dirty="0" smtClean="0"/>
-          </a:p>
-          <a:p>
-            <a:r>
-              <a:rPr lang="en-GB" dirty="0" smtClean="0"/>
-              <a:t>New </a:t>
-            </a:r>
-            <a:r>
-              <a:rPr lang="en-GB" dirty="0" err="1" smtClean="0"/>
-              <a:t>Gridders</a:t>
-            </a:r>
-            <a:r>
-              <a:rPr lang="en-GB" dirty="0" smtClean="0"/>
-              <a:t> like IDG use GPU </a:t>
-            </a:r>
-            <a:r>
-              <a:rPr lang="en-GB" dirty="0" smtClean="0"/>
-              <a:t>acceleration</a:t>
-            </a:r>
-            <a:endParaRPr lang="en-GB" dirty="0" smtClean="0"/>
-          </a:p>
-          <a:p>
-            <a:pPr marL="0" indent="0">
-              <a:buNone/>
-            </a:pPr>
-            <a:endParaRPr lang="en-GB" dirty="0" smtClean="0"/>
-          </a:p>
-          <a:p>
-            <a:pPr marL="0" indent="0">
-              <a:buNone/>
-            </a:pPr>
-            <a:r>
-              <a:rPr lang="en-GB" dirty="0" smtClean="0"/>
-              <a:t>But</a:t>
-            </a:r>
-            <a:r>
-              <a:rPr lang="en-GB" dirty="0" smtClean="0"/>
-              <a:t>:</a:t>
-            </a:r>
-          </a:p>
-          <a:p>
-            <a:r>
-              <a:rPr lang="en-GB" dirty="0" smtClean="0"/>
-              <a:t>All other nodes idle during </a:t>
-            </a:r>
-            <a:r>
-              <a:rPr lang="en-GB" dirty="0" smtClean="0"/>
-              <a:t>deconvolution</a:t>
-            </a:r>
-            <a:endParaRPr lang="en-GB" dirty="0" smtClean="0"/>
-          </a:p>
-          <a:p>
-            <a:r>
-              <a:rPr lang="en-GB" dirty="0" smtClean="0"/>
-              <a:t>Deconvolution may become the most time consuming step</a:t>
-            </a:r>
-          </a:p>
-          <a:p>
-            <a:pPr marL="0" indent="0">
-              <a:buNone/>
-            </a:pPr>
-            <a:endParaRPr lang="en-GB" dirty="0" smtClean="0"/>
-          </a:p>
-          <a:p>
-            <a:pPr marL="0" indent="0">
-              <a:buNone/>
-            </a:pPr>
-            <a:endParaRPr lang="en-GB" dirty="0"/>
-          </a:p>
-        </p:txBody>
-      </p:sp>
-    </p:spTree>
-    <p:extLst>
-      <p:ext uri="{BB962C8B-B14F-4D97-AF65-F5344CB8AC3E}">
-        <p14:creationId xmlns:p14="http://schemas.microsoft.com/office/powerpoint/2010/main" val="592263724"/>
-      </p:ext>
-    </p:extLst>
-  </p:cSld>
-  <p:clrMapOvr>
-    <a:masterClrMapping/>
-  </p:clrMapOvr>
-</p:sld>
-</file>
-
 <file path=ppt/slides/slide14.xml><?xml version="1.0" encoding="utf-8"?>
 <p:sld xmlns:a="http://schemas.openxmlformats.org/drawingml/2006/main" xmlns:r="http://schemas.openxmlformats.org/officeDocument/2006/relationships" xmlns:p="http://schemas.openxmlformats.org/presentationml/2006/main">
   <p:cSld>
@@ -3670,15 +3595,7 @@
           <a:p>
             <a:r>
               <a:rPr lang="en-GB" dirty="0" smtClean="0"/>
-              <a:t>Can </a:t>
-            </a:r>
-            <a:r>
-              <a:rPr lang="en-GB" dirty="0" smtClean="0"/>
-              <a:t>we use </a:t>
-            </a:r>
-            <a:r>
-              <a:rPr lang="en-GB" dirty="0" smtClean="0"/>
-              <a:t>the idling nodes?</a:t>
+              <a:t>Distribute Gridding!</a:t>
             </a:r>
             <a:endParaRPr lang="en-GB" dirty="0"/>
           </a:p>
@@ -3696,25 +3613,61 @@
         </p:nvSpPr>
         <p:spPr/>
         <p:txBody>
-          <a:bodyPr/>
-          <a:lstStyle/>
-          <a:p>
-            <a:r>
-              <a:rPr lang="en-GB" dirty="0" smtClean="0"/>
-              <a:t>Repeat as little work as possible</a:t>
-            </a:r>
-          </a:p>
-          <a:p>
-            <a:r>
-              <a:rPr lang="en-GB" dirty="0" smtClean="0"/>
-              <a:t>Communicate as little as possible</a:t>
+          <a:bodyPr>
+            <a:normAutofit lnSpcReduction="10000"/>
+          </a:bodyPr>
+          <a:lstStyle/>
+          <a:p>
+            <a:r>
+              <a:rPr lang="en-GB" dirty="0" smtClean="0"/>
+              <a:t>(Gridding benefits from many nodes)</a:t>
+            </a:r>
+          </a:p>
+          <a:p>
+            <a:r>
+              <a:rPr lang="en-GB" dirty="0" smtClean="0"/>
+              <a:t>May </a:t>
+            </a:r>
+            <a:r>
+              <a:rPr lang="en-GB" dirty="0" smtClean="0"/>
+              <a:t>let us keep the calibrated </a:t>
+            </a:r>
+            <a:r>
+              <a:rPr lang="en-GB" dirty="0" smtClean="0"/>
+              <a:t>visibilities </a:t>
+            </a:r>
+            <a:r>
+              <a:rPr lang="en-GB" dirty="0" smtClean="0"/>
+              <a:t>in-memory</a:t>
+            </a:r>
+          </a:p>
+          <a:p>
+            <a:r>
+              <a:rPr lang="en-GB" dirty="0" smtClean="0"/>
+              <a:t>New </a:t>
+            </a:r>
+            <a:r>
+              <a:rPr lang="en-GB" dirty="0" err="1"/>
+              <a:t>g</a:t>
+            </a:r>
+            <a:r>
+              <a:rPr lang="en-GB" dirty="0" err="1" smtClean="0"/>
+              <a:t>ridders</a:t>
+            </a:r>
+            <a:r>
+              <a:rPr lang="en-GB" dirty="0" smtClean="0"/>
+              <a:t> </a:t>
+            </a:r>
+            <a:r>
+              <a:rPr lang="en-GB" dirty="0" smtClean="0"/>
+              <a:t>like IDG use GPU acceleration</a:t>
             </a:r>
           </a:p>
           <a:p>
             <a:pPr marL="0" indent="0">
               <a:buNone/>
             </a:pPr>
-            <a:endParaRPr lang="en-GB" dirty="0"/>
+            <a:endParaRPr lang="en-GB" dirty="0" smtClean="0"/>
           </a:p>
           <a:p>
             <a:pPr marL="0" indent="0">
@@ -3722,14 +3675,61 @@
             </a:pPr>
             <a:r>
               <a:rPr lang="en-GB" dirty="0" smtClean="0"/>
-              <a:t>Data Dependant factors</a:t>
-            </a:r>
-            <a:endParaRPr lang="en-GB" dirty="0"/>
-          </a:p>
-          <a:p>
+              <a:t>But what about deconvolution?</a:t>
+            </a:r>
             <a:endParaRPr lang="en-GB" dirty="0" smtClean="0"/>
           </a:p>
           <a:p>
+            <a:r>
+              <a:rPr lang="en-GB" dirty="0"/>
+              <a:t>Deconvolution may become the most time consuming </a:t>
+            </a:r>
+            <a:r>
+              <a:rPr lang="en-GB" dirty="0" smtClean="0"/>
+              <a:t>step</a:t>
+            </a:r>
+          </a:p>
+          <a:p>
+            <a:r>
+              <a:rPr lang="en-GB" dirty="0" smtClean="0"/>
+              <a:t>(</a:t>
+            </a:r>
+            <a:r>
+              <a:rPr lang="en-GB" dirty="0"/>
+              <a:t>Deconvolution is done only on one node</a:t>
+            </a:r>
+            <a:r>
+              <a:rPr lang="en-GB" dirty="0" smtClean="0"/>
+              <a:t>)</a:t>
+            </a:r>
+          </a:p>
+          <a:p>
+            <a:r>
+              <a:rPr lang="en-GB" dirty="0" smtClean="0"/>
+              <a:t>All other nodes idle during deconvolution</a:t>
+            </a:r>
+          </a:p>
+          <a:p>
+            <a:r>
+              <a:rPr lang="en-GB" dirty="0"/>
+              <a:t>We can use the idling nodes for </a:t>
+            </a:r>
+            <a:r>
+              <a:rPr lang="en-GB" dirty="0" smtClean="0"/>
+              <a:t>deconvolution</a:t>
+            </a:r>
+            <a:endParaRPr lang="en-GB" dirty="0" smtClean="0"/>
+          </a:p>
+          <a:p>
+            <a:pPr marL="0" indent="0">
+              <a:buNone/>
+            </a:pPr>
+            <a:endParaRPr lang="en-GB" dirty="0" smtClean="0"/>
+          </a:p>
+          <a:p>
+            <a:pPr marL="0" indent="0">
+              <a:buNone/>
+            </a:pPr>
             <a:endParaRPr lang="en-GB" dirty="0"/>
           </a:p>
         </p:txBody>
@@ -3737,7 +3737,7 @@
     </p:spTree>
     <p:extLst>
       <p:ext uri="{BB962C8B-B14F-4D97-AF65-F5344CB8AC3E}">
-        <p14:creationId xmlns:p14="http://schemas.microsoft.com/office/powerpoint/2010/main" val="2646679646"/>
+        <p14:creationId xmlns:p14="http://schemas.microsoft.com/office/powerpoint/2010/main" val="592263724"/>
       </p:ext>
     </p:extLst>
   </p:cSld>
@@ -3781,7 +3781,7 @@
           <a:p>
             <a:r>
               <a:rPr lang="en-GB" dirty="0" smtClean="0"/>
-              <a:t>Data Dependant factors</a:t>
+              <a:t>The problem of distributed deconvolution</a:t>
             </a:r>
             <a:endParaRPr lang="en-GB" dirty="0"/>
           </a:p>
@@ -3799,82 +3799,16 @@
         </p:nvSpPr>
         <p:spPr/>
         <p:txBody>
-          <a:bodyPr>
-            <a:normAutofit lnSpcReduction="10000"/>
-          </a:bodyPr>
-          <a:lstStyle/>
-          <a:p>
-            <a:r>
-              <a:rPr lang="en-GB" dirty="0" smtClean="0"/>
-              <a:t>How large is the grid vs. the calibrated Visibilities</a:t>
-            </a:r>
-          </a:p>
-          <a:p>
-            <a:r>
-              <a:rPr lang="en-GB" dirty="0" smtClean="0"/>
-              <a:t>How sparse is the model image</a:t>
-            </a:r>
-          </a:p>
-          <a:p>
-            <a:r>
-              <a:rPr lang="en-GB" dirty="0" smtClean="0"/>
-              <a:t>How </a:t>
-            </a:r>
-            <a:r>
-              <a:rPr lang="en-GB" dirty="0" smtClean="0"/>
-              <a:t>large is the PSF</a:t>
-            </a:r>
-          </a:p>
-          <a:p>
-            <a:r>
-              <a:rPr lang="en-GB" dirty="0" smtClean="0"/>
-              <a:t>What </a:t>
-            </a:r>
-            <a:r>
-              <a:rPr lang="en-GB" dirty="0" smtClean="0"/>
-              <a:t>is the dynamic range of the </a:t>
-            </a:r>
-            <a:r>
-              <a:rPr lang="en-GB" dirty="0" smtClean="0"/>
-              <a:t>image</a:t>
-            </a:r>
-          </a:p>
-          <a:p>
-            <a:r>
-              <a:rPr lang="en-GB" dirty="0"/>
-              <a:t>…</a:t>
-            </a:r>
-          </a:p>
+          <a:bodyPr/>
+          <a:lstStyle/>
           <a:p>
             <a:endParaRPr lang="en-GB" dirty="0" smtClean="0"/>
           </a:p>
           <a:p>
-            <a:pPr marL="0" indent="0">
-              <a:buNone/>
-            </a:pPr>
-            <a:endParaRPr lang="en-GB" dirty="0" smtClean="0"/>
-          </a:p>
-          <a:p>
-            <a:endParaRPr lang="en-GB" dirty="0" smtClean="0"/>
-          </a:p>
-          <a:p>
-            <a:pPr marL="0" indent="0">
-              <a:buNone/>
-            </a:pPr>
-            <a:r>
-              <a:rPr lang="en-GB" dirty="0" smtClean="0"/>
-              <a:t>Test on a real world </a:t>
-            </a:r>
-            <a:r>
-              <a:rPr lang="en-GB" dirty="0" err="1" smtClean="0"/>
-              <a:t>MeerKAT</a:t>
-            </a:r>
-            <a:r>
-              <a:rPr lang="en-GB" dirty="0" smtClean="0"/>
-              <a:t> observation</a:t>
-            </a:r>
-          </a:p>
-          <a:p>
+            <a:r>
+              <a:rPr lang="en-GB" dirty="0" smtClean="0"/>
+              <a:t>(Image PSF)</a:t>
+            </a:r>
             <a:endParaRPr lang="en-GB" dirty="0"/>
           </a:p>
         </p:txBody>
@@ -3882,7 +3816,7 @@
     </p:spTree>
     <p:extLst>
       <p:ext uri="{BB962C8B-B14F-4D97-AF65-F5344CB8AC3E}">
-        <p14:creationId xmlns:p14="http://schemas.microsoft.com/office/powerpoint/2010/main" val="1282123596"/>
+        <p14:creationId xmlns:p14="http://schemas.microsoft.com/office/powerpoint/2010/main" val="2646679646"/>
       </p:ext>
     </p:extLst>
   </p:cSld>
@@ -3926,6 +3860,284 @@
           <a:p>
             <a:r>
               <a:rPr lang="en-GB" dirty="0" smtClean="0"/>
+              <a:t>Distribution </a:t>
+            </a:r>
+            <a:r>
+              <a:rPr lang="en-GB" dirty="0"/>
+              <a:t>can exploit the data properties</a:t>
+            </a:r>
+            <a:r>
+              <a:rPr lang="en-GB" dirty="0" smtClean="0"/>
+              <a:t> </a:t>
+            </a:r>
+            <a:endParaRPr lang="en-GB" dirty="0"/>
+          </a:p>
+        </p:txBody>
+      </p:sp>
+      <p:sp>
+        <p:nvSpPr>
+          <p:cNvPr id="3" name="Inhaltsplatzhalter 2"/>
+          <p:cNvSpPr>
+            <a:spLocks noGrp="1"/>
+          </p:cNvSpPr>
+          <p:nvPr>
+            <p:ph idx="1"/>
+          </p:nvPr>
+        </p:nvSpPr>
+        <p:spPr/>
+        <p:txBody>
+          <a:bodyPr>
+            <a:normAutofit lnSpcReduction="10000"/>
+          </a:bodyPr>
+          <a:lstStyle/>
+          <a:p>
+            <a:endParaRPr lang="en-GB" dirty="0" smtClean="0"/>
+          </a:p>
+          <a:p>
+            <a:r>
+              <a:rPr lang="en-GB" dirty="0" smtClean="0"/>
+              <a:t>Dependent</a:t>
+            </a:r>
+          </a:p>
+          <a:p>
+            <a:r>
+              <a:rPr lang="en-GB" dirty="0" smtClean="0"/>
+              <a:t>How large is the PSF</a:t>
+            </a:r>
+          </a:p>
+          <a:p>
+            <a:r>
+              <a:rPr lang="en-GB" dirty="0" smtClean="0"/>
+              <a:t>What is the dynamic range of the image</a:t>
+            </a:r>
+          </a:p>
+          <a:p>
+            <a:r>
+              <a:rPr lang="en-GB" dirty="0" smtClean="0"/>
+              <a:t>…</a:t>
+            </a:r>
+          </a:p>
+          <a:p>
+            <a:endParaRPr lang="en-GB" dirty="0" smtClean="0"/>
+          </a:p>
+          <a:p>
+            <a:pPr marL="0" indent="0">
+              <a:buNone/>
+            </a:pPr>
+            <a:endParaRPr lang="en-GB" dirty="0" smtClean="0"/>
+          </a:p>
+          <a:p>
+            <a:endParaRPr lang="en-GB" dirty="0" smtClean="0"/>
+          </a:p>
+          <a:p>
+            <a:pPr marL="0" indent="0">
+              <a:buNone/>
+            </a:pPr>
+            <a:r>
+              <a:rPr lang="en-GB" dirty="0" smtClean="0"/>
+              <a:t>Test on a real world </a:t>
+            </a:r>
+            <a:r>
+              <a:rPr lang="en-GB" dirty="0" err="1" smtClean="0"/>
+              <a:t>MeerKAT</a:t>
+            </a:r>
+            <a:r>
+              <a:rPr lang="en-GB" dirty="0" smtClean="0"/>
+              <a:t> observation</a:t>
+            </a:r>
+          </a:p>
+          <a:p>
+            <a:endParaRPr lang="en-GB" dirty="0"/>
+          </a:p>
+        </p:txBody>
+      </p:sp>
+    </p:spTree>
+    <p:extLst>
+      <p:ext uri="{BB962C8B-B14F-4D97-AF65-F5344CB8AC3E}">
+        <p14:creationId xmlns:p14="http://schemas.microsoft.com/office/powerpoint/2010/main" val="1282123596"/>
+      </p:ext>
+    </p:extLst>
+  </p:cSld>
+  <p:clrMapOvr>
+    <a:masterClrMapping/>
+  </p:clrMapOvr>
+</p:sld>
+</file>
+
+<file path=ppt/slides/slide17.xml><?xml version="1.0" encoding="utf-8"?>
+<p:sld xmlns:a="http://schemas.openxmlformats.org/drawingml/2006/main" xmlns:r="http://schemas.openxmlformats.org/officeDocument/2006/relationships" xmlns:p="http://schemas.openxmlformats.org/presentationml/2006/main">
+  <p:cSld>
+    <p:spTree>
+      <p:nvGrpSpPr>
+        <p:cNvPr id="1" name=""/>
+        <p:cNvGrpSpPr/>
+        <p:nvPr/>
+      </p:nvGrpSpPr>
+      <p:grpSpPr>
+        <a:xfrm>
+          <a:off x="0" y="0"/>
+          <a:ext cx="0" cy="0"/>
+          <a:chOff x="0" y="0"/>
+          <a:chExt cx="0" cy="0"/>
+        </a:xfrm>
+      </p:grpSpPr>
+      <p:sp>
+        <p:nvSpPr>
+          <p:cNvPr id="2" name="Titel 1"/>
+          <p:cNvSpPr>
+            <a:spLocks noGrp="1"/>
+          </p:cNvSpPr>
+          <p:nvPr>
+            <p:ph type="title"/>
+          </p:nvPr>
+        </p:nvSpPr>
+        <p:spPr/>
+        <p:txBody>
+          <a:bodyPr/>
+          <a:lstStyle/>
+          <a:p>
+            <a:r>
+              <a:rPr lang="en-GB" dirty="0" smtClean="0"/>
+              <a:t>Compressed Sensing based deconvolution</a:t>
+            </a:r>
+            <a:endParaRPr lang="en-GB" dirty="0"/>
+          </a:p>
+        </p:txBody>
+      </p:sp>
+      <p:sp>
+        <p:nvSpPr>
+          <p:cNvPr id="3" name="Inhaltsplatzhalter 2"/>
+          <p:cNvSpPr>
+            <a:spLocks noGrp="1"/>
+          </p:cNvSpPr>
+          <p:nvPr>
+            <p:ph idx="1"/>
+          </p:nvPr>
+        </p:nvSpPr>
+        <p:spPr/>
+        <p:txBody>
+          <a:bodyPr/>
+          <a:lstStyle/>
+          <a:p>
+            <a:r>
+              <a:rPr lang="en-GB" dirty="0" smtClean="0"/>
+              <a:t>Deconvolution as a system of linear equations</a:t>
+            </a:r>
+          </a:p>
+          <a:p>
+            <a:endParaRPr lang="en-GB" dirty="0"/>
+          </a:p>
+          <a:p>
+            <a:endParaRPr lang="en-GB" dirty="0" smtClean="0"/>
+          </a:p>
+          <a:p>
+            <a:r>
+              <a:rPr lang="en-GB" dirty="0" smtClean="0"/>
+              <a:t>A represents convolution</a:t>
+            </a:r>
+            <a:endParaRPr lang="en-GB" dirty="0"/>
+          </a:p>
+          <a:p>
+            <a:r>
+              <a:rPr lang="en-GB" dirty="0" smtClean="0"/>
+              <a:t>P() represents the prior knowledge about our image</a:t>
+            </a:r>
+          </a:p>
+          <a:p>
+            <a:r>
+              <a:rPr lang="en-GB" dirty="0" smtClean="0"/>
+              <a:t>Optimization algorithm needed, Gradient Descent, ADMM…</a:t>
+            </a:r>
+          </a:p>
+          <a:p>
+            <a:endParaRPr lang="en-GB" dirty="0"/>
+          </a:p>
+          <a:p>
+            <a:r>
+              <a:rPr lang="en-GB" dirty="0" smtClean="0"/>
+              <a:t>CLEAN can be seen as a Compressed Sensing based deconvolution</a:t>
+            </a:r>
+            <a:endParaRPr lang="en-GB" dirty="0"/>
+          </a:p>
+        </p:txBody>
+      </p:sp>
+      <p:pic>
+        <p:nvPicPr>
+          <p:cNvPr id="4" name="Grafik 3"/>
+          <p:cNvPicPr>
+            <a:picLocks noChangeAspect="1"/>
+          </p:cNvPicPr>
+          <p:nvPr/>
+        </p:nvPicPr>
+        <p:blipFill>
+          <a:blip r:embed="rId2" cstate="print">
+            <a:extLst>
+              <a:ext uri="{28A0092B-C50C-407E-A947-70E740481C1C}">
+                <a14:useLocalDpi xmlns:a14="http://schemas.microsoft.com/office/drawing/2010/main" val="0"/>
+              </a:ext>
+            </a:extLst>
+          </a:blip>
+          <a:stretch>
+            <a:fillRect/>
+          </a:stretch>
+        </p:blipFill>
+        <p:spPr>
+          <a:xfrm>
+            <a:off x="3555053" y="2618138"/>
+            <a:ext cx="4591421" cy="712039"/>
+          </a:xfrm>
+          <a:prstGeom prst="rect">
+            <a:avLst/>
+          </a:prstGeom>
+        </p:spPr>
+      </p:pic>
+    </p:spTree>
+    <p:extLst>
+      <p:ext uri="{BB962C8B-B14F-4D97-AF65-F5344CB8AC3E}">
+        <p14:creationId xmlns:p14="http://schemas.microsoft.com/office/powerpoint/2010/main" val="857991154"/>
+      </p:ext>
+    </p:extLst>
+  </p:cSld>
+  <p:clrMapOvr>
+    <a:masterClrMapping/>
+  </p:clrMapOvr>
+</p:sld>
+</file>
+
+<file path=ppt/slides/slide18.xml><?xml version="1.0" encoding="utf-8"?>
+<p:sld xmlns:a="http://schemas.openxmlformats.org/drawingml/2006/main" xmlns:r="http://schemas.openxmlformats.org/officeDocument/2006/relationships" xmlns:p="http://schemas.openxmlformats.org/presentationml/2006/main">
+  <p:cSld>
+    <p:spTree>
+      <p:nvGrpSpPr>
+        <p:cNvPr id="1" name=""/>
+        <p:cNvGrpSpPr/>
+        <p:nvPr/>
+      </p:nvGrpSpPr>
+      <p:grpSpPr>
+        <a:xfrm>
+          <a:off x="0" y="0"/>
+          <a:ext cx="0" cy="0"/>
+          <a:chOff x="0" y="0"/>
+          <a:chExt cx="0" cy="0"/>
+        </a:xfrm>
+      </p:grpSpPr>
+      <p:sp>
+        <p:nvSpPr>
+          <p:cNvPr id="2" name="Titel 1"/>
+          <p:cNvSpPr>
+            <a:spLocks noGrp="1"/>
+          </p:cNvSpPr>
+          <p:nvPr>
+            <p:ph type="title"/>
+          </p:nvPr>
+        </p:nvSpPr>
+        <p:spPr/>
+        <p:txBody>
+          <a:bodyPr/>
+          <a:lstStyle/>
+          <a:p>
+            <a:r>
+              <a:rPr lang="en-GB" dirty="0" smtClean="0"/>
               <a:t>Compressed Sensing</a:t>
             </a:r>
             <a:endParaRPr lang="en-GB" dirty="0"/>
@@ -3949,12 +4161,6 @@
           </a:bodyPr>
           <a:lstStyle/>
           <a:p>
-            <a:r>
-              <a:rPr lang="en-GB" dirty="0" smtClean="0"/>
-              <a:t>Deconvolution == system of linear equations</a:t>
-            </a:r>
-          </a:p>
-          <a:p>
             <a:endParaRPr lang="en-GB" dirty="0" smtClean="0"/>
           </a:p>
           <a:p>
@@ -3967,13 +4173,15 @@
             <a:endParaRPr lang="en-GB" dirty="0" smtClean="0"/>
           </a:p>
           <a:p>
-            <a:r>
-              <a:rPr lang="en-GB" dirty="0" smtClean="0"/>
-              <a:t>Prior </a:t>
-            </a:r>
-            <a:r>
-              <a:rPr lang="en-GB" dirty="0" smtClean="0"/>
-              <a:t>P() </a:t>
+            <a:pPr marL="0" indent="0">
+              <a:buNone/>
+            </a:pPr>
+            <a:endParaRPr lang="en-GB" dirty="0" smtClean="0"/>
+          </a:p>
+          <a:p>
+            <a:r>
+              <a:rPr lang="en-GB" dirty="0" smtClean="0"/>
+              <a:t>Prior P() </a:t>
             </a:r>
             <a:r>
               <a:rPr lang="en-GB" dirty="0" smtClean="0">
@@ -4053,7 +4261,7 @@
 </p:sld>
 </file>
 
-<file path=ppt/slides/slide17.xml><?xml version="1.0" encoding="utf-8"?>
+<file path=ppt/slides/slide19.xml><?xml version="1.0" encoding="utf-8"?>
 <p:sld xmlns:a="http://schemas.openxmlformats.org/drawingml/2006/main" xmlns:r="http://schemas.openxmlformats.org/officeDocument/2006/relationships" xmlns:p="http://schemas.openxmlformats.org/presentationml/2006/main">
   <p:cSld>
     <p:spTree>
@@ -4114,13 +4322,8 @@
           <a:p>
             <a:r>
               <a:rPr lang="en-GB" dirty="0" smtClean="0"/>
-              <a:t>Mixture between L1 and </a:t>
-            </a:r>
-            <a:r>
-              <a:rPr lang="en-GB" dirty="0" smtClean="0"/>
-              <a:t>L2 Norm</a:t>
-            </a:r>
-            <a:endParaRPr lang="en-GB" dirty="0" smtClean="0"/>
+              <a:t>Mixture between L1 and L2 Norm</a:t>
+            </a:r>
           </a:p>
           <a:p>
             <a:pPr marL="0" indent="0">
@@ -4173,192 +4376,6 @@
 </p:sld>
 </file>
 
-<file path=ppt/slides/slide18.xml><?xml version="1.0" encoding="utf-8"?>
-<p:sld xmlns:a="http://schemas.openxmlformats.org/drawingml/2006/main" xmlns:r="http://schemas.openxmlformats.org/officeDocument/2006/relationships" xmlns:p="http://schemas.openxmlformats.org/presentationml/2006/main">
-  <p:cSld>
-    <p:spTree>
-      <p:nvGrpSpPr>
-        <p:cNvPr id="1" name=""/>
-        <p:cNvGrpSpPr/>
-        <p:nvPr/>
-      </p:nvGrpSpPr>
-      <p:grpSpPr>
-        <a:xfrm>
-          <a:off x="0" y="0"/>
-          <a:ext cx="0" cy="0"/>
-          <a:chOff x="0" y="0"/>
-          <a:chExt cx="0" cy="0"/>
-        </a:xfrm>
-      </p:grpSpPr>
-      <p:sp>
-        <p:nvSpPr>
-          <p:cNvPr id="2" name="Titel 1"/>
-          <p:cNvSpPr>
-            <a:spLocks noGrp="1"/>
-          </p:cNvSpPr>
-          <p:nvPr>
-            <p:ph type="title"/>
-          </p:nvPr>
-        </p:nvSpPr>
-        <p:spPr/>
-        <p:txBody>
-          <a:bodyPr/>
-          <a:lstStyle/>
-          <a:p>
-            <a:r>
-              <a:rPr lang="en-GB" dirty="0" smtClean="0"/>
-              <a:t>Coordinate Descent</a:t>
-            </a:r>
-            <a:endParaRPr lang="en-GB" dirty="0"/>
-          </a:p>
-        </p:txBody>
-      </p:sp>
-      <p:sp>
-        <p:nvSpPr>
-          <p:cNvPr id="3" name="Inhaltsplatzhalter 2"/>
-          <p:cNvSpPr>
-            <a:spLocks noGrp="1"/>
-          </p:cNvSpPr>
-          <p:nvPr>
-            <p:ph idx="1"/>
-          </p:nvPr>
-        </p:nvSpPr>
-        <p:spPr/>
-        <p:txBody>
-          <a:bodyPr/>
-          <a:lstStyle/>
-          <a:p>
-            <a:r>
-              <a:rPr lang="en-GB" dirty="0" smtClean="0"/>
-              <a:t>Minimizes one Pixel at a time</a:t>
-            </a:r>
-          </a:p>
-          <a:p>
-            <a:r>
-              <a:rPr lang="en-GB" dirty="0" smtClean="0"/>
-              <a:t>Effective for high-dimensional problems</a:t>
-            </a:r>
-          </a:p>
-          <a:p>
-            <a:r>
-              <a:rPr lang="en-GB" dirty="0" smtClean="0"/>
-              <a:t>More sophisticated variants</a:t>
-            </a:r>
-          </a:p>
-          <a:p>
-            <a:endParaRPr lang="en-GB" dirty="0"/>
-          </a:p>
-        </p:txBody>
-      </p:sp>
-    </p:spTree>
-    <p:extLst>
-      <p:ext uri="{BB962C8B-B14F-4D97-AF65-F5344CB8AC3E}">
-        <p14:creationId xmlns:p14="http://schemas.microsoft.com/office/powerpoint/2010/main" val="2837136548"/>
-      </p:ext>
-    </p:extLst>
-  </p:cSld>
-  <p:clrMapOvr>
-    <a:masterClrMapping/>
-  </p:clrMapOvr>
-</p:sld>
-</file>
-
-<file path=ppt/slides/slide19.xml><?xml version="1.0" encoding="utf-8"?>
-<p:sld xmlns:a="http://schemas.openxmlformats.org/drawingml/2006/main" xmlns:r="http://schemas.openxmlformats.org/officeDocument/2006/relationships" xmlns:p="http://schemas.openxmlformats.org/presentationml/2006/main">
-  <p:cSld>
-    <p:spTree>
-      <p:nvGrpSpPr>
-        <p:cNvPr id="1" name=""/>
-        <p:cNvGrpSpPr/>
-        <p:nvPr/>
-      </p:nvGrpSpPr>
-      <p:grpSpPr>
-        <a:xfrm>
-          <a:off x="0" y="0"/>
-          <a:ext cx="0" cy="0"/>
-          <a:chOff x="0" y="0"/>
-          <a:chExt cx="0" cy="0"/>
-        </a:xfrm>
-      </p:grpSpPr>
-      <p:sp>
-        <p:nvSpPr>
-          <p:cNvPr id="2" name="Titel 1"/>
-          <p:cNvSpPr>
-            <a:spLocks noGrp="1"/>
-          </p:cNvSpPr>
-          <p:nvPr>
-            <p:ph type="title"/>
-          </p:nvPr>
-        </p:nvSpPr>
-        <p:spPr/>
-        <p:txBody>
-          <a:bodyPr/>
-          <a:lstStyle/>
-          <a:p>
-            <a:r>
-              <a:rPr lang="en-GB" dirty="0" smtClean="0"/>
-              <a:t>Simple Distributed Deconvolution</a:t>
-            </a:r>
-            <a:endParaRPr lang="en-GB" dirty="0"/>
-          </a:p>
-        </p:txBody>
-      </p:sp>
-      <p:sp>
-        <p:nvSpPr>
-          <p:cNvPr id="3" name="Inhaltsplatzhalter 2"/>
-          <p:cNvSpPr>
-            <a:spLocks noGrp="1"/>
-          </p:cNvSpPr>
-          <p:nvPr>
-            <p:ph idx="1"/>
-          </p:nvPr>
-        </p:nvSpPr>
-        <p:spPr/>
-        <p:txBody>
-          <a:bodyPr/>
-          <a:lstStyle/>
-          <a:p>
-            <a:endParaRPr lang="en-GB"/>
-          </a:p>
-        </p:txBody>
-      </p:sp>
-      <p:pic>
-        <p:nvPicPr>
-          <p:cNvPr id="4" name="Inhaltsplatzhalter 5"/>
-          <p:cNvPicPr>
-            <a:picLocks noChangeAspect="1"/>
-          </p:cNvPicPr>
-          <p:nvPr/>
-        </p:nvPicPr>
-        <p:blipFill>
-          <a:blip r:embed="rId2"/>
-          <a:stretch>
-            <a:fillRect/>
-          </a:stretch>
-        </p:blipFill>
-        <p:spPr>
-          <a:xfrm>
-            <a:off x="1951597" y="2819095"/>
-            <a:ext cx="7218317" cy="1939093"/>
-          </a:xfrm>
-          <a:prstGeom prst="rect">
-            <a:avLst/>
-          </a:prstGeom>
-        </p:spPr>
-      </p:pic>
-    </p:spTree>
-    <p:extLst>
-      <p:ext uri="{BB962C8B-B14F-4D97-AF65-F5344CB8AC3E}">
-        <p14:creationId xmlns:p14="http://schemas.microsoft.com/office/powerpoint/2010/main" val="1704200707"/>
-      </p:ext>
-    </p:extLst>
-  </p:cSld>
-  <p:clrMapOvr>
-    <a:masterClrMapping/>
-  </p:clrMapOvr>
-</p:sld>
-</file>
-
 <file path=ppt/slides/slide2.xml><?xml version="1.0" encoding="utf-8"?>
 <p:sld xmlns:a="http://schemas.openxmlformats.org/drawingml/2006/main" xmlns:r="http://schemas.openxmlformats.org/officeDocument/2006/relationships" xmlns:p="http://schemas.openxmlformats.org/presentationml/2006/main">
   <p:cSld>
@@ -4465,6 +4482,267 @@
           <a:p>
             <a:r>
               <a:rPr lang="en-GB" dirty="0" smtClean="0"/>
+              <a:t>Coordinate Descent</a:t>
+            </a:r>
+            <a:endParaRPr lang="en-GB" dirty="0"/>
+          </a:p>
+        </p:txBody>
+      </p:sp>
+      <p:sp>
+        <p:nvSpPr>
+          <p:cNvPr id="3" name="Inhaltsplatzhalter 2"/>
+          <p:cNvSpPr>
+            <a:spLocks noGrp="1"/>
+          </p:cNvSpPr>
+          <p:nvPr>
+            <p:ph idx="1"/>
+          </p:nvPr>
+        </p:nvSpPr>
+        <p:spPr/>
+        <p:txBody>
+          <a:bodyPr/>
+          <a:lstStyle/>
+          <a:p>
+            <a:r>
+              <a:rPr lang="en-GB" dirty="0" smtClean="0"/>
+              <a:t>Minimizes one Pixel at a time</a:t>
+            </a:r>
+          </a:p>
+          <a:p>
+            <a:r>
+              <a:rPr lang="en-GB" dirty="0" smtClean="0"/>
+              <a:t>Effective for high-dimensional problems</a:t>
+            </a:r>
+          </a:p>
+          <a:p>
+            <a:r>
+              <a:rPr lang="en-GB" dirty="0" smtClean="0"/>
+              <a:t>More sophisticated variants</a:t>
+            </a:r>
+          </a:p>
+          <a:p>
+            <a:endParaRPr lang="en-GB" dirty="0"/>
+          </a:p>
+        </p:txBody>
+      </p:sp>
+    </p:spTree>
+    <p:extLst>
+      <p:ext uri="{BB962C8B-B14F-4D97-AF65-F5344CB8AC3E}">
+        <p14:creationId xmlns:p14="http://schemas.microsoft.com/office/powerpoint/2010/main" val="2837136548"/>
+      </p:ext>
+    </p:extLst>
+  </p:cSld>
+  <p:clrMapOvr>
+    <a:masterClrMapping/>
+  </p:clrMapOvr>
+</p:sld>
+</file>
+
+<file path=ppt/slides/slide21.xml><?xml version="1.0" encoding="utf-8"?>
+<p:sld xmlns:a="http://schemas.openxmlformats.org/drawingml/2006/main" xmlns:r="http://schemas.openxmlformats.org/officeDocument/2006/relationships" xmlns:p="http://schemas.openxmlformats.org/presentationml/2006/main">
+  <p:cSld>
+    <p:spTree>
+      <p:nvGrpSpPr>
+        <p:cNvPr id="1" name=""/>
+        <p:cNvGrpSpPr/>
+        <p:nvPr/>
+      </p:nvGrpSpPr>
+      <p:grpSpPr>
+        <a:xfrm>
+          <a:off x="0" y="0"/>
+          <a:ext cx="0" cy="0"/>
+          <a:chOff x="0" y="0"/>
+          <a:chExt cx="0" cy="0"/>
+        </a:xfrm>
+      </p:grpSpPr>
+      <p:sp>
+        <p:nvSpPr>
+          <p:cNvPr id="2" name="Titel 1"/>
+          <p:cNvSpPr>
+            <a:spLocks noGrp="1"/>
+          </p:cNvSpPr>
+          <p:nvPr>
+            <p:ph type="title"/>
+          </p:nvPr>
+        </p:nvSpPr>
+        <p:spPr/>
+        <p:txBody>
+          <a:bodyPr/>
+          <a:lstStyle/>
+          <a:p>
+            <a:r>
+              <a:rPr lang="en-GB" dirty="0"/>
+              <a:t>Simple Distributed Deconvolution</a:t>
+            </a:r>
+          </a:p>
+        </p:txBody>
+      </p:sp>
+      <p:sp>
+        <p:nvSpPr>
+          <p:cNvPr id="3" name="Inhaltsplatzhalter 2"/>
+          <p:cNvSpPr>
+            <a:spLocks noGrp="1"/>
+          </p:cNvSpPr>
+          <p:nvPr>
+            <p:ph idx="1"/>
+          </p:nvPr>
+        </p:nvSpPr>
+        <p:spPr/>
+        <p:txBody>
+          <a:bodyPr/>
+          <a:lstStyle/>
+          <a:p>
+            <a:r>
+              <a:rPr lang="en-GB" dirty="0" smtClean="0"/>
+              <a:t>(4 image patches)</a:t>
+            </a:r>
+            <a:endParaRPr lang="en-GB" dirty="0"/>
+          </a:p>
+        </p:txBody>
+      </p:sp>
+    </p:spTree>
+    <p:extLst>
+      <p:ext uri="{BB962C8B-B14F-4D97-AF65-F5344CB8AC3E}">
+        <p14:creationId xmlns:p14="http://schemas.microsoft.com/office/powerpoint/2010/main" val="3455588167"/>
+      </p:ext>
+    </p:extLst>
+  </p:cSld>
+  <p:clrMapOvr>
+    <a:masterClrMapping/>
+  </p:clrMapOvr>
+</p:sld>
+</file>
+
+<file path=ppt/slides/slide22.xml><?xml version="1.0" encoding="utf-8"?>
+<p:sld xmlns:a="http://schemas.openxmlformats.org/drawingml/2006/main" xmlns:r="http://schemas.openxmlformats.org/officeDocument/2006/relationships" xmlns:p="http://schemas.openxmlformats.org/presentationml/2006/main">
+  <p:cSld>
+    <p:spTree>
+      <p:nvGrpSpPr>
+        <p:cNvPr id="1" name=""/>
+        <p:cNvGrpSpPr/>
+        <p:nvPr/>
+      </p:nvGrpSpPr>
+      <p:grpSpPr>
+        <a:xfrm>
+          <a:off x="0" y="0"/>
+          <a:ext cx="0" cy="0"/>
+          <a:chOff x="0" y="0"/>
+          <a:chExt cx="0" cy="0"/>
+        </a:xfrm>
+      </p:grpSpPr>
+      <p:sp>
+        <p:nvSpPr>
+          <p:cNvPr id="2" name="Titel 1"/>
+          <p:cNvSpPr>
+            <a:spLocks noGrp="1"/>
+          </p:cNvSpPr>
+          <p:nvPr>
+            <p:ph type="title"/>
+          </p:nvPr>
+        </p:nvSpPr>
+        <p:spPr/>
+        <p:txBody>
+          <a:bodyPr/>
+          <a:lstStyle/>
+          <a:p>
+            <a:r>
+              <a:rPr lang="en-GB" dirty="0" smtClean="0"/>
+              <a:t>Simple Distributed Deconvolution</a:t>
+            </a:r>
+            <a:endParaRPr lang="en-GB" dirty="0"/>
+          </a:p>
+        </p:txBody>
+      </p:sp>
+      <p:sp>
+        <p:nvSpPr>
+          <p:cNvPr id="3" name="Inhaltsplatzhalter 2"/>
+          <p:cNvSpPr>
+            <a:spLocks noGrp="1"/>
+          </p:cNvSpPr>
+          <p:nvPr>
+            <p:ph idx="1"/>
+          </p:nvPr>
+        </p:nvSpPr>
+        <p:spPr/>
+        <p:txBody>
+          <a:bodyPr/>
+          <a:lstStyle/>
+          <a:p>
+            <a:endParaRPr lang="en-GB"/>
+          </a:p>
+        </p:txBody>
+      </p:sp>
+      <p:pic>
+        <p:nvPicPr>
+          <p:cNvPr id="4" name="Inhaltsplatzhalter 5"/>
+          <p:cNvPicPr>
+            <a:picLocks noChangeAspect="1"/>
+          </p:cNvPicPr>
+          <p:nvPr/>
+        </p:nvPicPr>
+        <p:blipFill>
+          <a:blip r:embed="rId2"/>
+          <a:stretch>
+            <a:fillRect/>
+          </a:stretch>
+        </p:blipFill>
+        <p:spPr>
+          <a:xfrm>
+            <a:off x="1409947" y="2519837"/>
+            <a:ext cx="9372105" cy="2517676"/>
+          </a:xfrm>
+          <a:prstGeom prst="rect">
+            <a:avLst/>
+          </a:prstGeom>
+        </p:spPr>
+      </p:pic>
+    </p:spTree>
+    <p:extLst>
+      <p:ext uri="{BB962C8B-B14F-4D97-AF65-F5344CB8AC3E}">
+        <p14:creationId xmlns:p14="http://schemas.microsoft.com/office/powerpoint/2010/main" val="1704200707"/>
+      </p:ext>
+    </p:extLst>
+  </p:cSld>
+  <p:clrMapOvr>
+    <a:masterClrMapping/>
+  </p:clrMapOvr>
+</p:sld>
+</file>
+
+<file path=ppt/slides/slide23.xml><?xml version="1.0" encoding="utf-8"?>
+<p:sld xmlns:a="http://schemas.openxmlformats.org/drawingml/2006/main" xmlns:r="http://schemas.openxmlformats.org/officeDocument/2006/relationships" xmlns:p="http://schemas.openxmlformats.org/presentationml/2006/main">
+  <p:cSld>
+    <p:spTree>
+      <p:nvGrpSpPr>
+        <p:cNvPr id="1" name=""/>
+        <p:cNvGrpSpPr/>
+        <p:nvPr/>
+      </p:nvGrpSpPr>
+      <p:grpSpPr>
+        <a:xfrm>
+          <a:off x="0" y="0"/>
+          <a:ext cx="0" cy="0"/>
+          <a:chOff x="0" y="0"/>
+          <a:chExt cx="0" cy="0"/>
+        </a:xfrm>
+      </p:grpSpPr>
+      <p:sp>
+        <p:nvSpPr>
+          <p:cNvPr id="2" name="Titel 1"/>
+          <p:cNvSpPr>
+            <a:spLocks noGrp="1"/>
+          </p:cNvSpPr>
+          <p:nvPr>
+            <p:ph type="title"/>
+          </p:nvPr>
+        </p:nvSpPr>
+        <p:spPr/>
+        <p:txBody>
+          <a:bodyPr/>
+          <a:lstStyle/>
+          <a:p>
+            <a:r>
+              <a:rPr lang="en-GB" dirty="0" smtClean="0"/>
               <a:t>Preliminary Results</a:t>
             </a:r>
             <a:endParaRPr lang="en-GB" dirty="0"/>
@@ -4553,7 +4831,7 @@
 </p:sld>
 </file>
 
-<file path=ppt/slides/slide21.xml><?xml version="1.0" encoding="utf-8"?>
+<file path=ppt/slides/slide24.xml><?xml version="1.0" encoding="utf-8"?>
 <p:sld xmlns:a="http://schemas.openxmlformats.org/drawingml/2006/main" xmlns:r="http://schemas.openxmlformats.org/officeDocument/2006/relationships" xmlns:p="http://schemas.openxmlformats.org/presentationml/2006/main">
   <p:cSld>
     <p:spTree>
@@ -4624,7 +4902,7 @@
       </p:pic>
       <p:pic>
         <p:nvPicPr>
-          <p:cNvPr id="7" name="Inhaltsplatzhalter 6"/>
+          <p:cNvPr id="4" name="Inhaltsplatzhalter 3"/>
           <p:cNvPicPr>
             <a:picLocks noGrp="1" noChangeAspect="1"/>
           </p:cNvPicPr>
@@ -4646,7 +4924,7 @@
         </p:blipFill>
         <p:spPr>
           <a:xfrm>
-            <a:off x="5749131" y="1875052"/>
+            <a:off x="6441109" y="1885649"/>
             <a:ext cx="4351338" cy="4351338"/>
           </a:xfrm>
         </p:spPr>
@@ -4664,7 +4942,7 @@
 </p:sld>
 </file>
 
-<file path=ppt/slides/slide22.xml><?xml version="1.0" encoding="utf-8"?>
+<file path=ppt/slides/slide25.xml><?xml version="1.0" encoding="utf-8"?>
 <p:sld xmlns:a="http://schemas.openxmlformats.org/drawingml/2006/main" xmlns:r="http://schemas.openxmlformats.org/officeDocument/2006/relationships" xmlns:p="http://schemas.openxmlformats.org/presentationml/2006/main">
   <p:cSld>
     <p:spTree>
@@ -4721,31 +4999,14 @@
           <a:p>
             <a:r>
               <a:rPr lang="en-GB" dirty="0" smtClean="0"/>
-              <a:t>Latency </a:t>
-            </a:r>
-            <a:r>
-              <a:rPr lang="en-GB" dirty="0" smtClean="0"/>
-              <a:t>Limited</a:t>
-            </a:r>
-          </a:p>
-          <a:p>
-            <a:r>
-              <a:rPr lang="en-GB" dirty="0" smtClean="0"/>
-              <a:t>Proof </a:t>
-            </a:r>
-            <a:r>
-              <a:rPr lang="en-GB" dirty="0" smtClean="0"/>
-              <a:t>of concept </a:t>
-            </a:r>
-            <a:r>
-              <a:rPr lang="en-GB" dirty="0" smtClean="0"/>
-              <a:t>implementation (speedup </a:t>
-            </a:r>
-            <a:r>
-              <a:rPr lang="en-GB" dirty="0" smtClean="0"/>
-              <a:t>factor is inaccurate)</a:t>
-            </a:r>
-            <a:endParaRPr lang="en-GB" dirty="0" smtClean="0"/>
+              <a:t>Latency Limited</a:t>
+            </a:r>
+          </a:p>
+          <a:p>
+            <a:r>
+              <a:rPr lang="en-GB" dirty="0" smtClean="0"/>
+              <a:t>Proof of concept implementation (speedup factor is inaccurate)</a:t>
+            </a:r>
           </a:p>
           <a:p>
             <a:r>
@@ -4778,7 +5039,7 @@
 </p:sld>
 </file>
 
-<file path=ppt/slides/slide23.xml><?xml version="1.0" encoding="utf-8"?>
+<file path=ppt/slides/slide26.xml><?xml version="1.0" encoding="utf-8"?>
 <p:sld xmlns:a="http://schemas.openxmlformats.org/drawingml/2006/main" xmlns:r="http://schemas.openxmlformats.org/officeDocument/2006/relationships" xmlns:p="http://schemas.openxmlformats.org/presentationml/2006/main">
   <p:cSld>
     <p:spTree>
@@ -4912,7 +5173,7 @@
 </p:sld>
 </file>
 
-<file path=ppt/slides/slide24.xml><?xml version="1.0" encoding="utf-8"?>
+<file path=ppt/slides/slide27.xml><?xml version="1.0" encoding="utf-8"?>
 <p:sld xmlns:a="http://schemas.openxmlformats.org/drawingml/2006/main" xmlns:r="http://schemas.openxmlformats.org/officeDocument/2006/relationships" xmlns:p="http://schemas.openxmlformats.org/presentationml/2006/main">
   <p:cSld>
     <p:spTree>
@@ -5036,7 +5297,7 @@
 </p:sld>
 </file>
 
-<file path=ppt/slides/slide25.xml><?xml version="1.0" encoding="utf-8"?>
+<file path=ppt/slides/slide28.xml><?xml version="1.0" encoding="utf-8"?>
 <p:sld xmlns:a="http://schemas.openxmlformats.org/drawingml/2006/main" xmlns:r="http://schemas.openxmlformats.org/officeDocument/2006/relationships" xmlns:p="http://schemas.openxmlformats.org/presentationml/2006/main">
   <p:cSld>
     <p:spTree>

</xml_diff>

<commit_message>
worked on intro for presentation
</commit_message>
<xml_diff>
--- a/SKA-Days/Towards Distributed Image Reconstruction.pptx
+++ b/SKA-Days/Towards Distributed Image Reconstruction.pptx
@@ -7,13 +7,13 @@
   <p:sldIdLst>
     <p:sldId id="256" r:id="rId2"/>
     <p:sldId id="258" r:id="rId3"/>
-    <p:sldId id="257" r:id="rId4"/>
-    <p:sldId id="259" r:id="rId5"/>
-    <p:sldId id="260" r:id="rId6"/>
-    <p:sldId id="269" r:id="rId7"/>
-    <p:sldId id="263" r:id="rId8"/>
-    <p:sldId id="272" r:id="rId9"/>
-    <p:sldId id="283" r:id="rId10"/>
+    <p:sldId id="298" r:id="rId4"/>
+    <p:sldId id="299" r:id="rId5"/>
+    <p:sldId id="300" r:id="rId6"/>
+    <p:sldId id="301" r:id="rId7"/>
+    <p:sldId id="257" r:id="rId8"/>
+    <p:sldId id="269" r:id="rId9"/>
+    <p:sldId id="263" r:id="rId10"/>
     <p:sldId id="294" r:id="rId11"/>
     <p:sldId id="262" r:id="rId12"/>
     <p:sldId id="271" r:id="rId13"/>
@@ -138,13 +138,13 @@
           <p14:sldIdLst>
             <p14:sldId id="256"/>
             <p14:sldId id="258"/>
+            <p14:sldId id="298"/>
+            <p14:sldId id="299"/>
+            <p14:sldId id="300"/>
+            <p14:sldId id="301"/>
             <p14:sldId id="257"/>
-            <p14:sldId id="259"/>
-            <p14:sldId id="260"/>
             <p14:sldId id="269"/>
             <p14:sldId id="263"/>
-            <p14:sldId id="272"/>
-            <p14:sldId id="283"/>
           </p14:sldIdLst>
         </p14:section>
         <p14:section name="Bisher, Major Cycle" id="{2D4D444E-B0B4-4900-AF19-E41610FF43CD}">
@@ -318,7 +318,7 @@
           <a:p>
             <a:fld id="{2019A626-8AAF-4A70-B83C-143F15D5AD18}" type="datetimeFigureOut">
               <a:rPr lang="en-GB" smtClean="0"/>
-              <a:t>07/06/2019</a:t>
+              <a:t>09/06/2019</a:t>
             </a:fld>
             <a:endParaRPr lang="en-GB"/>
           </a:p>
@@ -488,7 +488,7 @@
           <a:p>
             <a:fld id="{2019A626-8AAF-4A70-B83C-143F15D5AD18}" type="datetimeFigureOut">
               <a:rPr lang="en-GB" smtClean="0"/>
-              <a:t>07/06/2019</a:t>
+              <a:t>09/06/2019</a:t>
             </a:fld>
             <a:endParaRPr lang="en-GB"/>
           </a:p>
@@ -668,7 +668,7 @@
           <a:p>
             <a:fld id="{2019A626-8AAF-4A70-B83C-143F15D5AD18}" type="datetimeFigureOut">
               <a:rPr lang="en-GB" smtClean="0"/>
-              <a:t>07/06/2019</a:t>
+              <a:t>09/06/2019</a:t>
             </a:fld>
             <a:endParaRPr lang="en-GB"/>
           </a:p>
@@ -838,7 +838,7 @@
           <a:p>
             <a:fld id="{2019A626-8AAF-4A70-B83C-143F15D5AD18}" type="datetimeFigureOut">
               <a:rPr lang="en-GB" smtClean="0"/>
-              <a:t>07/06/2019</a:t>
+              <a:t>09/06/2019</a:t>
             </a:fld>
             <a:endParaRPr lang="en-GB"/>
           </a:p>
@@ -1084,7 +1084,7 @@
           <a:p>
             <a:fld id="{2019A626-8AAF-4A70-B83C-143F15D5AD18}" type="datetimeFigureOut">
               <a:rPr lang="en-GB" smtClean="0"/>
-              <a:t>07/06/2019</a:t>
+              <a:t>09/06/2019</a:t>
             </a:fld>
             <a:endParaRPr lang="en-GB"/>
           </a:p>
@@ -1316,7 +1316,7 @@
           <a:p>
             <a:fld id="{2019A626-8AAF-4A70-B83C-143F15D5AD18}" type="datetimeFigureOut">
               <a:rPr lang="en-GB" smtClean="0"/>
-              <a:t>07/06/2019</a:t>
+              <a:t>09/06/2019</a:t>
             </a:fld>
             <a:endParaRPr lang="en-GB"/>
           </a:p>
@@ -1683,7 +1683,7 @@
           <a:p>
             <a:fld id="{2019A626-8AAF-4A70-B83C-143F15D5AD18}" type="datetimeFigureOut">
               <a:rPr lang="en-GB" smtClean="0"/>
-              <a:t>07/06/2019</a:t>
+              <a:t>09/06/2019</a:t>
             </a:fld>
             <a:endParaRPr lang="en-GB"/>
           </a:p>
@@ -1801,7 +1801,7 @@
           <a:p>
             <a:fld id="{2019A626-8AAF-4A70-B83C-143F15D5AD18}" type="datetimeFigureOut">
               <a:rPr lang="en-GB" smtClean="0"/>
-              <a:t>07/06/2019</a:t>
+              <a:t>09/06/2019</a:t>
             </a:fld>
             <a:endParaRPr lang="en-GB"/>
           </a:p>
@@ -1896,7 +1896,7 @@
           <a:p>
             <a:fld id="{2019A626-8AAF-4A70-B83C-143F15D5AD18}" type="datetimeFigureOut">
               <a:rPr lang="en-GB" smtClean="0"/>
-              <a:t>07/06/2019</a:t>
+              <a:t>09/06/2019</a:t>
             </a:fld>
             <a:endParaRPr lang="en-GB"/>
           </a:p>
@@ -2173,7 +2173,7 @@
           <a:p>
             <a:fld id="{2019A626-8AAF-4A70-B83C-143F15D5AD18}" type="datetimeFigureOut">
               <a:rPr lang="en-GB" smtClean="0"/>
-              <a:t>07/06/2019</a:t>
+              <a:t>09/06/2019</a:t>
             </a:fld>
             <a:endParaRPr lang="en-GB"/>
           </a:p>
@@ -2426,7 +2426,7 @@
           <a:p>
             <a:fld id="{2019A626-8AAF-4A70-B83C-143F15D5AD18}" type="datetimeFigureOut">
               <a:rPr lang="en-GB" smtClean="0"/>
-              <a:t>07/06/2019</a:t>
+              <a:t>09/06/2019</a:t>
             </a:fld>
             <a:endParaRPr lang="en-GB"/>
           </a:p>
@@ -2639,7 +2639,7 @@
           <a:p>
             <a:fld id="{2019A626-8AAF-4A70-B83C-143F15D5AD18}" type="datetimeFigureOut">
               <a:rPr lang="en-GB" smtClean="0"/>
-              <a:t>07/06/2019</a:t>
+              <a:t>09/06/2019</a:t>
             </a:fld>
             <a:endParaRPr lang="en-GB"/>
           </a:p>
@@ -3056,12 +3056,26 @@
         </p:nvSpPr>
         <p:spPr/>
         <p:txBody>
-          <a:bodyPr/>
+          <a:bodyPr>
+            <a:normAutofit fontScale="90000"/>
+          </a:bodyPr>
           <a:lstStyle/>
           <a:p>
             <a:r>
               <a:rPr lang="en-GB" dirty="0" smtClean="0"/>
-              <a:t>Towards Distributed Image Reconstruction</a:t>
+              <a:t>Towards </a:t>
+            </a:r>
+            <a:r>
+              <a:rPr lang="en-GB" dirty="0" smtClean="0"/>
+              <a:t>distributed </a:t>
+            </a:r>
+            <a:r>
+              <a:rPr lang="en-GB" dirty="0" smtClean="0"/>
+              <a:t>Image </a:t>
+            </a:r>
+            <a:r>
+              <a:rPr lang="en-GB" dirty="0" smtClean="0"/>
+              <a:t>Reconstruction for Radio Interferometers</a:t>
             </a:r>
             <a:endParaRPr lang="en-GB" dirty="0"/>
           </a:p>
@@ -3082,10 +3096,40 @@
           <a:bodyPr/>
           <a:lstStyle/>
           <a:p>
-            <a:endParaRPr lang="en-GB"/>
-          </a:p>
-        </p:txBody>
-      </p:sp>
+            <a:endParaRPr lang="en-GB" dirty="0"/>
+          </a:p>
+        </p:txBody>
+      </p:sp>
+      <p:pic>
+        <p:nvPicPr>
+          <p:cNvPr id="4" name="Grafik 3"/>
+          <p:cNvPicPr>
+            <a:picLocks noChangeAspect="1"/>
+          </p:cNvPicPr>
+          <p:nvPr/>
+        </p:nvPicPr>
+        <p:blipFill>
+          <a:blip r:embed="rId2">
+            <a:extLst>
+              <a:ext uri="{28A0092B-C50C-407E-A947-70E740481C1C}">
+                <a14:useLocalDpi xmlns:a14="http://schemas.microsoft.com/office/drawing/2010/main" val="0"/>
+              </a:ext>
+            </a:extLst>
+          </a:blip>
+          <a:stretch>
+            <a:fillRect/>
+          </a:stretch>
+        </p:blipFill>
+        <p:spPr>
+          <a:xfrm>
+            <a:off x="2726210" y="3602038"/>
+            <a:ext cx="7048500" cy="2438400"/>
+          </a:xfrm>
+          <a:prstGeom prst="rect">
+            <a:avLst/>
+          </a:prstGeom>
+        </p:spPr>
+      </p:pic>
     </p:spTree>
     <p:extLst>
       <p:ext uri="{BB962C8B-B14F-4D97-AF65-F5344CB8AC3E}">
@@ -3626,19 +3670,7 @@
           <a:p>
             <a:r>
               <a:rPr lang="en-GB" dirty="0" smtClean="0"/>
-              <a:t>May </a:t>
-            </a:r>
-            <a:r>
-              <a:rPr lang="en-GB" dirty="0" smtClean="0"/>
-              <a:t>let us keep the calibrated </a:t>
-            </a:r>
-            <a:r>
-              <a:rPr lang="en-GB" dirty="0" smtClean="0"/>
-              <a:t>visibilities </a:t>
-            </a:r>
-            <a:r>
-              <a:rPr lang="en-GB" dirty="0" smtClean="0"/>
-              <a:t>in-memory</a:t>
+              <a:t>May let us keep the calibrated visibilities in-memory</a:t>
             </a:r>
           </a:p>
           <a:p>
@@ -3656,11 +3688,7 @@
             </a:r>
             <a:r>
               <a:rPr lang="en-GB" dirty="0" smtClean="0"/>
-              <a:t> </a:t>
-            </a:r>
-            <a:r>
-              <a:rPr lang="en-GB" dirty="0" smtClean="0"/>
-              <a:t>like IDG use GPU acceleration</a:t>
+              <a:t> like IDG use GPU acceleration</a:t>
             </a:r>
           </a:p>
           <a:p>
@@ -3677,7 +3705,6 @@
               <a:rPr lang="en-GB" dirty="0" smtClean="0"/>
               <a:t>But what about deconvolution?</a:t>
             </a:r>
-            <a:endParaRPr lang="en-GB" dirty="0" smtClean="0"/>
           </a:p>
           <a:p>
             <a:r>
@@ -3718,7 +3745,6 @@
               <a:rPr lang="en-GB" dirty="0" smtClean="0"/>
               <a:t>deconvolution</a:t>
             </a:r>
-            <a:endParaRPr lang="en-GB" dirty="0" smtClean="0"/>
           </a:p>
           <a:p>
             <a:pPr marL="0" indent="0">
@@ -3887,28 +3913,41 @@
         <p:spPr/>
         <p:txBody>
           <a:bodyPr>
-            <a:normAutofit lnSpcReduction="10000"/>
+            <a:normAutofit/>
           </a:bodyPr>
           <a:lstStyle/>
           <a:p>
-            <a:endParaRPr lang="en-GB" dirty="0" smtClean="0"/>
-          </a:p>
-          <a:p>
             <a:r>
               <a:rPr lang="en-GB" dirty="0" smtClean="0"/>
-              <a:t>Dependent</a:t>
-            </a:r>
-          </a:p>
-          <a:p>
+              <a:t>How </a:t>
+            </a:r>
+            <a:r>
+              <a:rPr lang="en-GB" dirty="0"/>
+              <a:t>large is the </a:t>
+            </a:r>
             <a:r>
               <a:rPr lang="en-GB" dirty="0" smtClean="0"/>
-              <a:t>How large is the PSF</a:t>
+              <a:t>PSF</a:t>
             </a:r>
           </a:p>
           <a:p>
             <a:r>
               <a:rPr lang="en-GB" dirty="0" smtClean="0"/>
-              <a:t>What is the dynamic range of the image</a:t>
+              <a:t>How </a:t>
+            </a:r>
+            <a:r>
+              <a:rPr lang="en-GB" dirty="0"/>
+              <a:t>large is the grid vs. the calibrated Visibilities</a:t>
+            </a:r>
+          </a:p>
+          <a:p>
+            <a:r>
+              <a:rPr lang="en-GB" dirty="0"/>
+              <a:t>How sparse is the model </a:t>
+            </a:r>
+            <a:r>
+              <a:rPr lang="en-GB" dirty="0" smtClean="0"/>
+              <a:t>image</a:t>
             </a:r>
           </a:p>
           <a:p>
@@ -3918,15 +3957,9 @@
             </a:r>
           </a:p>
           <a:p>
-            <a:endParaRPr lang="en-GB" dirty="0" smtClean="0"/>
-          </a:p>
-          <a:p>
             <a:pPr marL="0" indent="0">
               <a:buNone/>
             </a:pPr>
-            <a:endParaRPr lang="en-GB" dirty="0" smtClean="0"/>
-          </a:p>
-          <a:p>
             <a:endParaRPr lang="en-GB" dirty="0" smtClean="0"/>
           </a:p>
           <a:p>
@@ -4363,6 +4396,66 @@
           </a:prstGeom>
         </p:spPr>
       </p:pic>
+      <p:pic>
+        <p:nvPicPr>
+          <p:cNvPr id="3" name="Grafik 2"/>
+          <p:cNvPicPr>
+            <a:picLocks noChangeAspect="1"/>
+          </p:cNvPicPr>
+          <p:nvPr/>
+        </p:nvPicPr>
+        <p:blipFill>
+          <a:blip r:embed="rId3">
+            <a:extLst>
+              <a:ext uri="{28A0092B-C50C-407E-A947-70E740481C1C}">
+                <a14:useLocalDpi xmlns:a14="http://schemas.microsoft.com/office/drawing/2010/main" val="0"/>
+              </a:ext>
+            </a:extLst>
+          </a:blip>
+          <a:stretch>
+            <a:fillRect/>
+          </a:stretch>
+        </p:blipFill>
+        <p:spPr>
+          <a:xfrm>
+            <a:off x="6284269" y="3936268"/>
+            <a:ext cx="2240693" cy="2240693"/>
+          </a:xfrm>
+          <a:prstGeom prst="rect">
+            <a:avLst/>
+          </a:prstGeom>
+        </p:spPr>
+      </p:pic>
+      <p:pic>
+        <p:nvPicPr>
+          <p:cNvPr id="4" name="Grafik 3"/>
+          <p:cNvPicPr>
+            <a:picLocks noChangeAspect="1"/>
+          </p:cNvPicPr>
+          <p:nvPr/>
+        </p:nvPicPr>
+        <p:blipFill>
+          <a:blip r:embed="rId4">
+            <a:extLst>
+              <a:ext uri="{28A0092B-C50C-407E-A947-70E740481C1C}">
+                <a14:useLocalDpi xmlns:a14="http://schemas.microsoft.com/office/drawing/2010/main" val="0"/>
+              </a:ext>
+            </a:extLst>
+          </a:blip>
+          <a:stretch>
+            <a:fillRect/>
+          </a:stretch>
+        </p:blipFill>
+        <p:spPr>
+          <a:xfrm>
+            <a:off x="2314833" y="3936269"/>
+            <a:ext cx="2240693" cy="2240693"/>
+          </a:xfrm>
+          <a:prstGeom prst="rect">
+            <a:avLst/>
+          </a:prstGeom>
+        </p:spPr>
+      </p:pic>
     </p:spTree>
     <p:extLst>
       <p:ext uri="{BB962C8B-B14F-4D97-AF65-F5344CB8AC3E}">
@@ -4410,27 +4503,120 @@
           <a:p>
             <a:r>
               <a:rPr lang="en-GB" dirty="0" smtClean="0"/>
-              <a:t>Radio Astronomy</a:t>
+              <a:t>Our eyes see only a fraction of EM wavelengths…</a:t>
             </a:r>
             <a:endParaRPr lang="en-GB" dirty="0"/>
           </a:p>
         </p:txBody>
       </p:sp>
-      <p:sp>
-        <p:nvSpPr>
-          <p:cNvPr id="3" name="Inhaltsplatzhalter 2"/>
-          <p:cNvSpPr>
-            <a:spLocks noGrp="1"/>
-          </p:cNvSpPr>
+      <p:pic>
+        <p:nvPicPr>
+          <p:cNvPr id="4" name="Inhaltsplatzhalter 3"/>
+          <p:cNvPicPr>
+            <a:picLocks noGrp="1" noChangeAspect="1"/>
+          </p:cNvPicPr>
           <p:nvPr>
             <p:ph idx="1"/>
           </p:nvPr>
-        </p:nvSpPr>
-        <p:spPr/>
-        <p:txBody>
-          <a:bodyPr/>
-          <a:lstStyle/>
-          <a:p>
+        </p:nvPicPr>
+        <p:blipFill>
+          <a:blip r:embed="rId2">
+            <a:extLst>
+              <a:ext uri="{28A0092B-C50C-407E-A947-70E740481C1C}">
+                <a14:useLocalDpi xmlns:a14="http://schemas.microsoft.com/office/drawing/2010/main" val="0"/>
+              </a:ext>
+            </a:extLst>
+          </a:blip>
+          <a:stretch>
+            <a:fillRect/>
+          </a:stretch>
+        </p:blipFill>
+        <p:spPr>
+          <a:xfrm>
+            <a:off x="2832496" y="1825625"/>
+            <a:ext cx="6527007" cy="4351338"/>
+          </a:xfrm>
+        </p:spPr>
+      </p:pic>
+      <p:sp>
+        <p:nvSpPr>
+          <p:cNvPr id="5" name="Right Arrow 7"/>
+          <p:cNvSpPr/>
+          <p:nvPr/>
+        </p:nvSpPr>
+        <p:spPr>
+          <a:xfrm rot="10800000">
+            <a:off x="1954785" y="3507283"/>
+            <a:ext cx="1755422" cy="838200"/>
+          </a:xfrm>
+          <a:prstGeom prst="rightArrow">
+            <a:avLst/>
+          </a:prstGeom>
+        </p:spPr>
+        <p:style>
+          <a:lnRef idx="2">
+            <a:schemeClr val="accent2">
+              <a:shade val="50000"/>
+            </a:schemeClr>
+          </a:lnRef>
+          <a:fillRef idx="1">
+            <a:schemeClr val="accent2"/>
+          </a:fillRef>
+          <a:effectRef idx="0">
+            <a:schemeClr val="accent2"/>
+          </a:effectRef>
+          <a:fontRef idx="minor">
+            <a:schemeClr val="lt1"/>
+          </a:fontRef>
+        </p:style>
+        <p:txBody>
+          <a:bodyPr rtlCol="0" anchor="ctr"/>
+          <a:lstStyle/>
+          <a:p>
+            <a:pPr algn="ctr"/>
+            <a:endParaRPr lang="en-GB"/>
+          </a:p>
+        </p:txBody>
+      </p:sp>
+      <p:sp>
+        <p:nvSpPr>
+          <p:cNvPr id="6" name="Right Arrow 9"/>
+          <p:cNvSpPr/>
+          <p:nvPr/>
+        </p:nvSpPr>
+        <p:spPr>
+          <a:xfrm>
+            <a:off x="7297987" y="4174289"/>
+            <a:ext cx="1755422" cy="838200"/>
+          </a:xfrm>
+          <a:prstGeom prst="rightArrow">
+            <a:avLst/>
+          </a:prstGeom>
+          <a:solidFill>
+            <a:srgbClr val="7030A0"/>
+          </a:solidFill>
+        </p:spPr>
+        <p:style>
+          <a:lnRef idx="2">
+            <a:schemeClr val="accent4">
+              <a:shade val="50000"/>
+            </a:schemeClr>
+          </a:lnRef>
+          <a:fillRef idx="1">
+            <a:schemeClr val="accent4"/>
+          </a:fillRef>
+          <a:effectRef idx="0">
+            <a:schemeClr val="accent4"/>
+          </a:effectRef>
+          <a:fontRef idx="minor">
+            <a:schemeClr val="lt1"/>
+          </a:fontRef>
+        </p:style>
+        <p:txBody>
+          <a:bodyPr rtlCol="0" anchor="ctr"/>
+          <a:lstStyle/>
+          <a:p>
+            <a:pPr algn="ctr"/>
             <a:endParaRPr lang="en-GB"/>
           </a:p>
         </p:txBody>
@@ -4445,6 +4631,146 @@
   <p:clrMapOvr>
     <a:masterClrMapping/>
   </p:clrMapOvr>
+  <p:timing>
+    <p:tnLst>
+      <p:par>
+        <p:cTn id="1" dur="indefinite" restart="never" nodeType="tmRoot">
+          <p:childTnLst>
+            <p:seq concurrent="1" nextAc="seek">
+              <p:cTn id="2" dur="indefinite" nodeType="mainSeq">
+                <p:childTnLst>
+                  <p:par>
+                    <p:cTn id="3" fill="hold">
+                      <p:stCondLst>
+                        <p:cond delay="indefinite"/>
+                      </p:stCondLst>
+                      <p:childTnLst>
+                        <p:par>
+                          <p:cTn id="4" fill="hold">
+                            <p:stCondLst>
+                              <p:cond delay="0"/>
+                            </p:stCondLst>
+                            <p:childTnLst>
+                              <p:par>
+                                <p:cTn id="5" presetID="22" presetClass="entr" presetSubtype="8" fill="hold" grpId="0" nodeType="clickEffect">
+                                  <p:stCondLst>
+                                    <p:cond delay="0"/>
+                                  </p:stCondLst>
+                                  <p:childTnLst>
+                                    <p:set>
+                                      <p:cBhvr>
+                                        <p:cTn id="6" dur="1" fill="hold">
+                                          <p:stCondLst>
+                                            <p:cond delay="0"/>
+                                          </p:stCondLst>
+                                        </p:cTn>
+                                        <p:tgtEl>
+                                          <p:spTgt spid="5"/>
+                                        </p:tgtEl>
+                                        <p:attrNameLst>
+                                          <p:attrName>style.visibility</p:attrName>
+                                        </p:attrNameLst>
+                                      </p:cBhvr>
+                                      <p:to>
+                                        <p:strVal val="visible"/>
+                                      </p:to>
+                                    </p:set>
+                                    <p:animEffect transition="in" filter="wipe(left)">
+                                      <p:cBhvr>
+                                        <p:cTn id="7" dur="500"/>
+                                        <p:tgtEl>
+                                          <p:spTgt spid="5"/>
+                                        </p:tgtEl>
+                                      </p:cBhvr>
+                                    </p:animEffect>
+                                  </p:childTnLst>
+                                </p:cTn>
+                              </p:par>
+                            </p:childTnLst>
+                          </p:cTn>
+                        </p:par>
+                      </p:childTnLst>
+                    </p:cTn>
+                  </p:par>
+                  <p:par>
+                    <p:cTn id="8" fill="hold">
+                      <p:stCondLst>
+                        <p:cond delay="indefinite"/>
+                      </p:stCondLst>
+                      <p:childTnLst>
+                        <p:par>
+                          <p:cTn id="9" fill="hold">
+                            <p:stCondLst>
+                              <p:cond delay="0"/>
+                            </p:stCondLst>
+                            <p:childTnLst>
+                              <p:par>
+                                <p:cTn id="10" presetID="22" presetClass="entr" presetSubtype="2" fill="hold" grpId="0" nodeType="clickEffect">
+                                  <p:stCondLst>
+                                    <p:cond delay="0"/>
+                                  </p:stCondLst>
+                                  <p:childTnLst>
+                                    <p:set>
+                                      <p:cBhvr>
+                                        <p:cTn id="11" dur="1" fill="hold">
+                                          <p:stCondLst>
+                                            <p:cond delay="0"/>
+                                          </p:stCondLst>
+                                        </p:cTn>
+                                        <p:tgtEl>
+                                          <p:spTgt spid="6"/>
+                                        </p:tgtEl>
+                                        <p:attrNameLst>
+                                          <p:attrName>style.visibility</p:attrName>
+                                        </p:attrNameLst>
+                                      </p:cBhvr>
+                                      <p:to>
+                                        <p:strVal val="visible"/>
+                                      </p:to>
+                                    </p:set>
+                                    <p:animEffect transition="in" filter="wipe(right)">
+                                      <p:cBhvr>
+                                        <p:cTn id="12" dur="500"/>
+                                        <p:tgtEl>
+                                          <p:spTgt spid="6"/>
+                                        </p:tgtEl>
+                                      </p:cBhvr>
+                                    </p:animEffect>
+                                  </p:childTnLst>
+                                </p:cTn>
+                              </p:par>
+                            </p:childTnLst>
+                          </p:cTn>
+                        </p:par>
+                      </p:childTnLst>
+                    </p:cTn>
+                  </p:par>
+                </p:childTnLst>
+              </p:cTn>
+              <p:prevCondLst>
+                <p:cond evt="onPrev" delay="0">
+                  <p:tgtEl>
+                    <p:sldTgt/>
+                  </p:tgtEl>
+                </p:cond>
+              </p:prevCondLst>
+              <p:nextCondLst>
+                <p:cond evt="onNext" delay="0">
+                  <p:tgtEl>
+                    <p:sldTgt/>
+                  </p:tgtEl>
+                </p:cond>
+              </p:nextCondLst>
+            </p:seq>
+          </p:childTnLst>
+        </p:cTn>
+      </p:par>
+    </p:tnLst>
+    <p:bldLst>
+      <p:bldP spid="5" grpId="0" animBg="1"/>
+      <p:bldP spid="6" grpId="0" animBg="1"/>
+    </p:bldLst>
+  </p:timing>
 </p:sld>
 </file>
 
@@ -5399,7 +5725,7 @@
           <a:p>
             <a:r>
               <a:rPr lang="en-GB" dirty="0" smtClean="0"/>
-              <a:t>SKA</a:t>
+              <a:t>Our Sun at wavelengths visible to our eyes</a:t>
             </a:r>
             <a:endParaRPr lang="en-GB" dirty="0"/>
           </a:p>
@@ -5424,10 +5750,83 @@
           </a:p>
         </p:txBody>
       </p:sp>
+      <p:pic>
+        <p:nvPicPr>
+          <p:cNvPr id="4" name="Picture 3"/>
+          <p:cNvPicPr>
+            <a:picLocks noChangeAspect="1" noChangeArrowheads="1"/>
+          </p:cNvPicPr>
+          <p:nvPr/>
+        </p:nvPicPr>
+        <p:blipFill>
+          <a:blip r:embed="rId2">
+            <a:extLst>
+              <a:ext uri="{BEBA8EAE-BF5A-486C-A8C5-ECC9F3942E4B}">
+                <a14:imgProps xmlns:a14="http://schemas.microsoft.com/office/drawing/2010/main">
+                  <a14:imgLayer r:embed="rId3">
+                    <a14:imgEffect>
+                      <a14:brightnessContrast bright="20000"/>
+                    </a14:imgEffect>
+                  </a14:imgLayer>
+                </a14:imgProps>
+              </a:ext>
+              <a:ext uri="{28A0092B-C50C-407E-A947-70E740481C1C}">
+                <a14:useLocalDpi xmlns:a14="http://schemas.microsoft.com/office/drawing/2010/main"/>
+              </a:ext>
+            </a:extLst>
+          </a:blip>
+          <a:srcRect/>
+          <a:stretch>
+            <a:fillRect/>
+          </a:stretch>
+        </p:blipFill>
+        <p:spPr bwMode="auto">
+          <a:xfrm>
+            <a:off x="3206579" y="1440903"/>
+            <a:ext cx="5544623" cy="5539549"/>
+          </a:xfrm>
+          <a:prstGeom prst="rect">
+            <a:avLst/>
+          </a:prstGeom>
+          <a:noFill/>
+          <a:ln>
+            <a:noFill/>
+          </a:ln>
+          <a:effectLst/>
+          <a:extLst>
+            <a:ext uri="{909E8E84-426E-40DD-AFC4-6F175D3DCCD1}">
+              <a14:hiddenFill xmlns:a14="http://schemas.microsoft.com/office/drawing/2010/main">
+                <a:solidFill>
+                  <a:schemeClr val="accent1"/>
+                </a:solidFill>
+              </a14:hiddenFill>
+            </a:ext>
+            <a:ext uri="{91240B29-F687-4F45-9708-019B960494DF}">
+              <a14:hiddenLine xmlns:a14="http://schemas.microsoft.com/office/drawing/2010/main" w="9525">
+                <a:solidFill>
+                  <a:schemeClr val="tx1"/>
+                </a:solidFill>
+                <a:miter lim="800000"/>
+                <a:headEnd/>
+                <a:tailEnd/>
+              </a14:hiddenLine>
+            </a:ext>
+            <a:ext uri="{AF507438-7753-43E0-B8FC-AC1667EBCBE1}">
+              <a14:hiddenEffects xmlns:a14="http://schemas.microsoft.com/office/drawing/2010/main">
+                <a:effectLst>
+                  <a:outerShdw dist="35921" dir="2700000" algn="ctr" rotWithShape="0">
+                    <a:schemeClr val="bg2"/>
+                  </a:outerShdw>
+                </a:effectLst>
+              </a14:hiddenEffects>
+            </a:ext>
+          </a:extLst>
+        </p:spPr>
+      </p:pic>
     </p:spTree>
     <p:extLst>
       <p:ext uri="{BB962C8B-B14F-4D97-AF65-F5344CB8AC3E}">
-        <p14:creationId xmlns:p14="http://schemas.microsoft.com/office/powerpoint/2010/main" val="2044514056"/>
+        <p14:creationId xmlns:p14="http://schemas.microsoft.com/office/powerpoint/2010/main" val="3463326838"/>
       </p:ext>
     </p:extLst>
   </p:cSld>
@@ -5471,41 +5870,231 @@
           <a:p>
             <a:r>
               <a:rPr lang="en-GB" dirty="0" smtClean="0"/>
-              <a:t>Large Amount of Data</a:t>
+              <a:t>Our Sun at smaller wavelengths</a:t>
             </a:r>
             <a:endParaRPr lang="en-GB" dirty="0"/>
           </a:p>
         </p:txBody>
       </p:sp>
-      <p:sp>
-        <p:nvSpPr>
-          <p:cNvPr id="3" name="Inhaltsplatzhalter 2"/>
-          <p:cNvSpPr>
-            <a:spLocks noGrp="1"/>
-          </p:cNvSpPr>
+      <p:pic>
+        <p:nvPicPr>
+          <p:cNvPr id="4" name="Picture 2" descr="http://umbra.nascom.nasa.gov/images/latest_eit_304.gif"/>
+          <p:cNvPicPr>
+            <a:picLocks noChangeAspect="1" noChangeArrowheads="1"/>
+          </p:cNvPicPr>
+          <p:nvPr/>
+        </p:nvPicPr>
+        <p:blipFill rotWithShape="1">
+          <a:blip r:embed="rId2" cstate="screen">
+            <a:extLst>
+              <a:ext uri="{28A0092B-C50C-407E-A947-70E740481C1C}">
+                <a14:useLocalDpi xmlns:a14="http://schemas.microsoft.com/office/drawing/2010/main"/>
+              </a:ext>
+            </a:extLst>
+          </a:blip>
+          <a:srcRect t="5154" b="4992"/>
+          <a:stretch/>
+        </p:blipFill>
+        <p:spPr bwMode="auto">
+          <a:xfrm>
+            <a:off x="2145982" y="1943015"/>
+            <a:ext cx="4714561" cy="4236180"/>
+          </a:xfrm>
+          <a:prstGeom prst="rect">
+            <a:avLst/>
+          </a:prstGeom>
+          <a:noFill/>
+          <a:extLst>
+            <a:ext uri="{909E8E84-426E-40DD-AFC4-6F175D3DCCD1}">
+              <a14:hiddenFill xmlns:a14="http://schemas.microsoft.com/office/drawing/2010/main">
+                <a:solidFill>
+                  <a:srgbClr val="FFFFFF"/>
+                </a:solidFill>
+              </a14:hiddenFill>
+            </a:ext>
+          </a:extLst>
+        </p:spPr>
+      </p:pic>
+      <p:sp>
+        <p:nvSpPr>
+          <p:cNvPr id="6" name="Right Arrow 9"/>
+          <p:cNvSpPr/>
+          <p:nvPr/>
+        </p:nvSpPr>
+        <p:spPr>
+          <a:xfrm>
+            <a:off x="390560" y="4001294"/>
+            <a:ext cx="1755422" cy="838200"/>
+          </a:xfrm>
+          <a:prstGeom prst="rightArrow">
+            <a:avLst/>
+          </a:prstGeom>
+          <a:solidFill>
+            <a:srgbClr val="7030A0"/>
+          </a:solidFill>
+        </p:spPr>
+        <p:style>
+          <a:lnRef idx="2">
+            <a:schemeClr val="accent4">
+              <a:shade val="50000"/>
+            </a:schemeClr>
+          </a:lnRef>
+          <a:fillRef idx="1">
+            <a:schemeClr val="accent4"/>
+          </a:fillRef>
+          <a:effectRef idx="0">
+            <a:schemeClr val="accent4"/>
+          </a:effectRef>
+          <a:fontRef idx="minor">
+            <a:schemeClr val="lt1"/>
+          </a:fontRef>
+        </p:style>
+        <p:txBody>
+          <a:bodyPr rtlCol="0" anchor="ctr"/>
+          <a:lstStyle/>
+          <a:p>
+            <a:pPr algn="ctr"/>
+            <a:endParaRPr lang="en-GB"/>
+          </a:p>
+        </p:txBody>
+      </p:sp>
+      <p:pic>
+        <p:nvPicPr>
+          <p:cNvPr id="7" name="Picture 2" descr="http://umbra.nascom.nasa.gov/images/latest_sxt.gif"/>
+          <p:cNvPicPr>
+            <a:picLocks noGrp="1" noChangeAspect="1" noChangeArrowheads="1"/>
+          </p:cNvPicPr>
           <p:nvPr>
             <p:ph idx="1"/>
           </p:nvPr>
-        </p:nvSpPr>
-        <p:spPr/>
-        <p:txBody>
-          <a:bodyPr/>
-          <a:lstStyle/>
-          <a:p>
-            <a:endParaRPr lang="en-GB"/>
-          </a:p>
-        </p:txBody>
-      </p:sp>
+        </p:nvPicPr>
+        <p:blipFill rotWithShape="1">
+          <a:blip r:embed="rId3">
+            <a:extLst>
+              <a:ext uri="{28A0092B-C50C-407E-A947-70E740481C1C}">
+                <a14:useLocalDpi xmlns:a14="http://schemas.microsoft.com/office/drawing/2010/main"/>
+              </a:ext>
+            </a:extLst>
+          </a:blip>
+          <a:srcRect b="6790"/>
+          <a:stretch/>
+        </p:blipFill>
+        <p:spPr bwMode="auto">
+          <a:xfrm>
+            <a:off x="7297684" y="1943015"/>
+            <a:ext cx="4668316" cy="4351338"/>
+          </a:xfrm>
+          <a:prstGeom prst="rect">
+            <a:avLst/>
+          </a:prstGeom>
+          <a:noFill/>
+          <a:extLst>
+            <a:ext uri="{909E8E84-426E-40DD-AFC4-6F175D3DCCD1}">
+              <a14:hiddenFill xmlns:a14="http://schemas.microsoft.com/office/drawing/2010/main">
+                <a:solidFill>
+                  <a:srgbClr val="FFFFFF"/>
+                </a:solidFill>
+              </a14:hiddenFill>
+            </a:ext>
+          </a:extLst>
+        </p:spPr>
+      </p:pic>
     </p:spTree>
     <p:extLst>
       <p:ext uri="{BB962C8B-B14F-4D97-AF65-F5344CB8AC3E}">
-        <p14:creationId xmlns:p14="http://schemas.microsoft.com/office/powerpoint/2010/main" val="3483359163"/>
+        <p14:creationId xmlns:p14="http://schemas.microsoft.com/office/powerpoint/2010/main" val="2465968318"/>
       </p:ext>
     </p:extLst>
   </p:cSld>
   <p:clrMapOvr>
     <a:masterClrMapping/>
   </p:clrMapOvr>
+  <p:timing>
+    <p:tnLst>
+      <p:par>
+        <p:cTn id="1" dur="indefinite" restart="never" nodeType="tmRoot">
+          <p:childTnLst>
+            <p:seq concurrent="1" nextAc="seek">
+              <p:cTn id="2" dur="indefinite" nodeType="mainSeq">
+                <p:childTnLst>
+                  <p:par>
+                    <p:cTn id="3" fill="hold">
+                      <p:stCondLst>
+                        <p:cond delay="indefinite"/>
+                      </p:stCondLst>
+                      <p:childTnLst>
+                        <p:par>
+                          <p:cTn id="4" fill="hold">
+                            <p:stCondLst>
+                              <p:cond delay="0"/>
+                            </p:stCondLst>
+                            <p:childTnLst>
+                              <p:par>
+                                <p:cTn id="5" presetID="22" presetClass="entr" presetSubtype="2" fill="hold" grpId="0" nodeType="clickEffect">
+                                  <p:stCondLst>
+                                    <p:cond delay="0"/>
+                                  </p:stCondLst>
+                                  <p:childTnLst>
+                                    <p:set>
+                                      <p:cBhvr>
+                                        <p:cTn id="6" dur="1" fill="hold">
+                                          <p:stCondLst>
+                                            <p:cond delay="0"/>
+                                          </p:stCondLst>
+                                        </p:cTn>
+                                        <p:tgtEl>
+                                          <p:spTgt spid="6"/>
+                                        </p:tgtEl>
+                                        <p:attrNameLst>
+                                          <p:attrName>style.visibility</p:attrName>
+                                        </p:attrNameLst>
+                                      </p:cBhvr>
+                                      <p:to>
+                                        <p:strVal val="visible"/>
+                                      </p:to>
+                                    </p:set>
+                                    <p:animEffect transition="in" filter="wipe(right)">
+                                      <p:cBhvr>
+                                        <p:cTn id="7" dur="500"/>
+                                        <p:tgtEl>
+                                          <p:spTgt spid="6"/>
+                                        </p:tgtEl>
+                                      </p:cBhvr>
+                                    </p:animEffect>
+                                  </p:childTnLst>
+                                </p:cTn>
+                              </p:par>
+                            </p:childTnLst>
+                          </p:cTn>
+                        </p:par>
+                      </p:childTnLst>
+                    </p:cTn>
+                  </p:par>
+                </p:childTnLst>
+              </p:cTn>
+              <p:prevCondLst>
+                <p:cond evt="onPrev" delay="0">
+                  <p:tgtEl>
+                    <p:sldTgt/>
+                  </p:tgtEl>
+                </p:cond>
+              </p:prevCondLst>
+              <p:nextCondLst>
+                <p:cond evt="onNext" delay="0">
+                  <p:tgtEl>
+                    <p:sldTgt/>
+                  </p:tgtEl>
+                </p:cond>
+              </p:nextCondLst>
+            </p:seq>
+          </p:childTnLst>
+        </p:cTn>
+      </p:par>
+    </p:tnLst>
+    <p:bldLst>
+      <p:bldP spid="6" grpId="0" animBg="1"/>
+    </p:bldLst>
+  </p:timing>
 </p:sld>
 </file>
 
@@ -5543,7 +6132,7 @@
           <a:p>
             <a:r>
               <a:rPr lang="en-GB" dirty="0" smtClean="0"/>
-              <a:t>Hardware / Software</a:t>
+              <a:t>Our Sun at longer wavelengths</a:t>
             </a:r>
             <a:endParaRPr lang="en-GB" dirty="0"/>
           </a:p>
@@ -5551,27 +6140,300 @@
       </p:sp>
       <p:sp>
         <p:nvSpPr>
-          <p:cNvPr id="3" name="Inhaltsplatzhalter 2"/>
-          <p:cNvSpPr>
-            <a:spLocks noGrp="1"/>
-          </p:cNvSpPr>
+          <p:cNvPr id="8" name="Right Arrow 7"/>
+          <p:cNvSpPr/>
+          <p:nvPr/>
+        </p:nvSpPr>
+        <p:spPr>
+          <a:xfrm rot="10800000">
+            <a:off x="9795147" y="4452575"/>
+            <a:ext cx="1755422" cy="838200"/>
+          </a:xfrm>
+          <a:prstGeom prst="rightArrow">
+            <a:avLst/>
+          </a:prstGeom>
+        </p:spPr>
+        <p:style>
+          <a:lnRef idx="2">
+            <a:schemeClr val="accent2">
+              <a:shade val="50000"/>
+            </a:schemeClr>
+          </a:lnRef>
+          <a:fillRef idx="1">
+            <a:schemeClr val="accent2"/>
+          </a:fillRef>
+          <a:effectRef idx="0">
+            <a:schemeClr val="accent2"/>
+          </a:effectRef>
+          <a:fontRef idx="minor">
+            <a:schemeClr val="lt1"/>
+          </a:fontRef>
+        </p:style>
+        <p:txBody>
+          <a:bodyPr rtlCol="0" anchor="ctr"/>
+          <a:lstStyle/>
+          <a:p>
+            <a:pPr algn="ctr"/>
+            <a:endParaRPr lang="en-GB"/>
+          </a:p>
+        </p:txBody>
+      </p:sp>
+      <p:pic>
+        <p:nvPicPr>
+          <p:cNvPr id="9" name="Picture 2" descr="Sun in &#10;infrared light - loading live image - please be patient."/>
+          <p:cNvPicPr>
+            <a:picLocks noChangeAspect="1" noChangeArrowheads="1"/>
+          </p:cNvPicPr>
+          <p:nvPr/>
+        </p:nvPicPr>
+        <p:blipFill>
+          <a:blip r:embed="rId2">
+            <a:extLst>
+              <a:ext uri="{28A0092B-C50C-407E-A947-70E740481C1C}">
+                <a14:useLocalDpi xmlns:a14="http://schemas.microsoft.com/office/drawing/2010/main"/>
+              </a:ext>
+            </a:extLst>
+          </a:blip>
+          <a:srcRect/>
+          <a:stretch>
+            <a:fillRect/>
+          </a:stretch>
+        </p:blipFill>
+        <p:spPr bwMode="auto">
+          <a:xfrm>
+            <a:off x="5004357" y="1865385"/>
+            <a:ext cx="4382759" cy="4382756"/>
+          </a:xfrm>
+          <a:prstGeom prst="rect">
+            <a:avLst/>
+          </a:prstGeom>
+          <a:noFill/>
+          <a:extLst>
+            <a:ext uri="{909E8E84-426E-40DD-AFC4-6F175D3DCCD1}">
+              <a14:hiddenFill xmlns:a14="http://schemas.microsoft.com/office/drawing/2010/main">
+                <a:solidFill>
+                  <a:srgbClr val="FFFFFF"/>
+                </a:solidFill>
+              </a14:hiddenFill>
+            </a:ext>
+          </a:extLst>
+        </p:spPr>
+      </p:pic>
+      <p:pic>
+        <p:nvPicPr>
+          <p:cNvPr id="10" name="Picture 2" descr="http://images.nrao.edu/images/the_radio_sun_med.jpg"/>
+          <p:cNvPicPr>
+            <a:picLocks noGrp="1" noChangeAspect="1" noChangeArrowheads="1"/>
+          </p:cNvPicPr>
           <p:nvPr>
             <p:ph idx="1"/>
           </p:nvPr>
-        </p:nvSpPr>
-        <p:spPr/>
-        <p:txBody>
-          <a:bodyPr/>
-          <a:lstStyle/>
-          <a:p>
-            <a:endParaRPr lang="en-GB"/>
-          </a:p>
-        </p:txBody>
-      </p:sp>
+        </p:nvPicPr>
+        <p:blipFill>
+          <a:blip r:embed="rId3">
+            <a:extLst>
+              <a:ext uri="{28A0092B-C50C-407E-A947-70E740481C1C}">
+                <a14:useLocalDpi xmlns:a14="http://schemas.microsoft.com/office/drawing/2010/main"/>
+              </a:ext>
+            </a:extLst>
+          </a:blip>
+          <a:srcRect/>
+          <a:stretch>
+            <a:fillRect/>
+          </a:stretch>
+        </p:blipFill>
+        <p:spPr bwMode="auto">
+          <a:xfrm>
+            <a:off x="177238" y="1865385"/>
+            <a:ext cx="4419088" cy="4389823"/>
+          </a:xfrm>
+          <a:prstGeom prst="rect">
+            <a:avLst/>
+          </a:prstGeom>
+          <a:noFill/>
+          <a:extLst>
+            <a:ext uri="{909E8E84-426E-40DD-AFC4-6F175D3DCCD1}">
+              <a14:hiddenFill xmlns:a14="http://schemas.microsoft.com/office/drawing/2010/main">
+                <a:solidFill>
+                  <a:srgbClr val="FFFFFF"/>
+                </a:solidFill>
+              </a14:hiddenFill>
+            </a:ext>
+          </a:extLst>
+        </p:spPr>
+      </p:pic>
     </p:spTree>
     <p:extLst>
       <p:ext uri="{BB962C8B-B14F-4D97-AF65-F5344CB8AC3E}">
-        <p14:creationId xmlns:p14="http://schemas.microsoft.com/office/powerpoint/2010/main" val="674060945"/>
+        <p14:creationId xmlns:p14="http://schemas.microsoft.com/office/powerpoint/2010/main" val="3557882322"/>
+      </p:ext>
+    </p:extLst>
+  </p:cSld>
+  <p:clrMapOvr>
+    <a:masterClrMapping/>
+  </p:clrMapOvr>
+  <p:timing>
+    <p:tnLst>
+      <p:par>
+        <p:cTn id="1" dur="indefinite" restart="never" nodeType="tmRoot">
+          <p:childTnLst>
+            <p:seq concurrent="1" nextAc="seek">
+              <p:cTn id="2" dur="indefinite" nodeType="mainSeq">
+                <p:childTnLst>
+                  <p:par>
+                    <p:cTn id="3" fill="hold">
+                      <p:stCondLst>
+                        <p:cond delay="indefinite"/>
+                      </p:stCondLst>
+                      <p:childTnLst>
+                        <p:par>
+                          <p:cTn id="4" fill="hold">
+                            <p:stCondLst>
+                              <p:cond delay="0"/>
+                            </p:stCondLst>
+                            <p:childTnLst>
+                              <p:par>
+                                <p:cTn id="5" presetID="22" presetClass="entr" presetSubtype="8" fill="hold" grpId="0" nodeType="clickEffect">
+                                  <p:stCondLst>
+                                    <p:cond delay="0"/>
+                                  </p:stCondLst>
+                                  <p:childTnLst>
+                                    <p:set>
+                                      <p:cBhvr>
+                                        <p:cTn id="6" dur="1" fill="hold">
+                                          <p:stCondLst>
+                                            <p:cond delay="0"/>
+                                          </p:stCondLst>
+                                        </p:cTn>
+                                        <p:tgtEl>
+                                          <p:spTgt spid="8"/>
+                                        </p:tgtEl>
+                                        <p:attrNameLst>
+                                          <p:attrName>style.visibility</p:attrName>
+                                        </p:attrNameLst>
+                                      </p:cBhvr>
+                                      <p:to>
+                                        <p:strVal val="visible"/>
+                                      </p:to>
+                                    </p:set>
+                                    <p:animEffect transition="in" filter="wipe(left)">
+                                      <p:cBhvr>
+                                        <p:cTn id="7" dur="500"/>
+                                        <p:tgtEl>
+                                          <p:spTgt spid="8"/>
+                                        </p:tgtEl>
+                                      </p:cBhvr>
+                                    </p:animEffect>
+                                  </p:childTnLst>
+                                </p:cTn>
+                              </p:par>
+                            </p:childTnLst>
+                          </p:cTn>
+                        </p:par>
+                      </p:childTnLst>
+                    </p:cTn>
+                  </p:par>
+                </p:childTnLst>
+              </p:cTn>
+              <p:prevCondLst>
+                <p:cond evt="onPrev" delay="0">
+                  <p:tgtEl>
+                    <p:sldTgt/>
+                  </p:tgtEl>
+                </p:cond>
+              </p:prevCondLst>
+              <p:nextCondLst>
+                <p:cond evt="onNext" delay="0">
+                  <p:tgtEl>
+                    <p:sldTgt/>
+                  </p:tgtEl>
+                </p:cond>
+              </p:nextCondLst>
+            </p:seq>
+          </p:childTnLst>
+        </p:cTn>
+      </p:par>
+    </p:tnLst>
+    <p:bldLst>
+      <p:bldP spid="8" grpId="0" animBg="1"/>
+    </p:bldLst>
+  </p:timing>
+</p:sld>
+</file>
+
+<file path=ppt/slides/slide6.xml><?xml version="1.0" encoding="utf-8"?>
+<p:sld xmlns:a="http://schemas.openxmlformats.org/drawingml/2006/main" xmlns:r="http://schemas.openxmlformats.org/officeDocument/2006/relationships" xmlns:p="http://schemas.openxmlformats.org/presentationml/2006/main">
+  <p:cSld>
+    <p:spTree>
+      <p:nvGrpSpPr>
+        <p:cNvPr id="1" name=""/>
+        <p:cNvGrpSpPr/>
+        <p:nvPr/>
+      </p:nvGrpSpPr>
+      <p:grpSpPr>
+        <a:xfrm>
+          <a:off x="0" y="0"/>
+          <a:ext cx="0" cy="0"/>
+          <a:chOff x="0" y="0"/>
+          <a:chExt cx="0" cy="0"/>
+        </a:xfrm>
+      </p:grpSpPr>
+      <p:sp>
+        <p:nvSpPr>
+          <p:cNvPr id="2" name="Titel 1"/>
+          <p:cNvSpPr>
+            <a:spLocks noGrp="1"/>
+          </p:cNvSpPr>
+          <p:nvPr>
+            <p:ph type="title"/>
+          </p:nvPr>
+        </p:nvSpPr>
+        <p:spPr/>
+        <p:txBody>
+          <a:bodyPr/>
+          <a:lstStyle/>
+          <a:p>
+            <a:r>
+              <a:rPr lang="en-GB" dirty="0" smtClean="0"/>
+              <a:t>Longer wavelengths require larger dishes to focus</a:t>
+            </a:r>
+            <a:endParaRPr lang="en-GB" dirty="0"/>
+          </a:p>
+        </p:txBody>
+      </p:sp>
+      <p:pic>
+        <p:nvPicPr>
+          <p:cNvPr id="4" name="Inhaltsplatzhalter 3"/>
+          <p:cNvPicPr>
+            <a:picLocks noGrp="1" noChangeAspect="1"/>
+          </p:cNvPicPr>
+          <p:nvPr>
+            <p:ph idx="1"/>
+          </p:nvPr>
+        </p:nvPicPr>
+        <p:blipFill>
+          <a:blip r:embed="rId2">
+            <a:extLst>
+              <a:ext uri="{28A0092B-C50C-407E-A947-70E740481C1C}">
+                <a14:useLocalDpi xmlns:a14="http://schemas.microsoft.com/office/drawing/2010/main" val="0"/>
+              </a:ext>
+            </a:extLst>
+          </a:blip>
+          <a:stretch>
+            <a:fillRect/>
+          </a:stretch>
+        </p:blipFill>
+        <p:spPr>
+          <a:xfrm>
+            <a:off x="1844968" y="1844161"/>
+            <a:ext cx="7711231" cy="4351338"/>
+          </a:xfrm>
+        </p:spPr>
+      </p:pic>
+    </p:spTree>
+    <p:extLst>
+      <p:ext uri="{BB962C8B-B14F-4D97-AF65-F5344CB8AC3E}">
+        <p14:creationId xmlns:p14="http://schemas.microsoft.com/office/powerpoint/2010/main" val="3502511244"/>
       </p:ext>
     </p:extLst>
   </p:cSld>
@@ -5581,7 +6443,137 @@
 </p:sld>
 </file>
 
-<file path=ppt/slides/slide6.xml><?xml version="1.0" encoding="utf-8"?>
+<file path=ppt/slides/slide7.xml><?xml version="1.0" encoding="utf-8"?>
+<p:sld xmlns:a="http://schemas.openxmlformats.org/drawingml/2006/main" xmlns:r="http://schemas.openxmlformats.org/officeDocument/2006/relationships" xmlns:p="http://schemas.openxmlformats.org/presentationml/2006/main">
+  <p:cSld>
+    <p:spTree>
+      <p:nvGrpSpPr>
+        <p:cNvPr id="1" name=""/>
+        <p:cNvGrpSpPr/>
+        <p:nvPr/>
+      </p:nvGrpSpPr>
+      <p:grpSpPr>
+        <a:xfrm>
+          <a:off x="0" y="0"/>
+          <a:ext cx="0" cy="0"/>
+          <a:chOff x="0" y="0"/>
+          <a:chExt cx="0" cy="0"/>
+        </a:xfrm>
+      </p:grpSpPr>
+      <p:sp>
+        <p:nvSpPr>
+          <p:cNvPr id="2" name="Titel 1"/>
+          <p:cNvSpPr>
+            <a:spLocks noGrp="1"/>
+          </p:cNvSpPr>
+          <p:nvPr>
+            <p:ph type="title"/>
+          </p:nvPr>
+        </p:nvSpPr>
+        <p:spPr/>
+        <p:txBody>
+          <a:bodyPr/>
+          <a:lstStyle/>
+          <a:p>
+            <a:r>
+              <a:rPr lang="en-GB" dirty="0" smtClean="0"/>
+              <a:t>Square </a:t>
+            </a:r>
+            <a:r>
+              <a:rPr lang="en-GB" dirty="0" err="1" smtClean="0"/>
+              <a:t>Kilometer</a:t>
+            </a:r>
+            <a:r>
+              <a:rPr lang="en-GB" dirty="0" smtClean="0"/>
+              <a:t> Array (SKA)</a:t>
+            </a:r>
+            <a:endParaRPr lang="en-GB" dirty="0"/>
+          </a:p>
+        </p:txBody>
+      </p:sp>
+      <p:sp>
+        <p:nvSpPr>
+          <p:cNvPr id="3" name="Inhaltsplatzhalter 2"/>
+          <p:cNvSpPr>
+            <a:spLocks noGrp="1"/>
+          </p:cNvSpPr>
+          <p:nvPr>
+            <p:ph idx="1"/>
+          </p:nvPr>
+        </p:nvSpPr>
+        <p:spPr/>
+        <p:txBody>
+          <a:bodyPr/>
+          <a:lstStyle/>
+          <a:p>
+            <a:endParaRPr lang="en-GB"/>
+          </a:p>
+        </p:txBody>
+      </p:sp>
+      <p:pic>
+        <p:nvPicPr>
+          <p:cNvPr id="4" name="Picture 2" descr="https://www.skatelescope.org/wp-content/uploads/2015/07/SKA1_night_highres.screen.jpg"/>
+          <p:cNvPicPr>
+            <a:picLocks noChangeAspect="1" noChangeArrowheads="1"/>
+          </p:cNvPicPr>
+          <p:nvPr/>
+        </p:nvPicPr>
+        <p:blipFill rotWithShape="1">
+          <a:blip r:embed="rId2" cstate="screen">
+            <a:extLst>
+              <a:ext uri="{BEBA8EAE-BF5A-486C-A8C5-ECC9F3942E4B}">
+                <a14:imgProps xmlns:a14="http://schemas.microsoft.com/office/drawing/2010/main">
+                  <a14:imgLayer r:embed="rId3">
+                    <a14:imgEffect>
+                      <a14:brightnessContrast bright="40000" contrast="40000"/>
+                    </a14:imgEffect>
+                  </a14:imgLayer>
+                </a14:imgProps>
+              </a:ext>
+              <a:ext uri="{28A0092B-C50C-407E-A947-70E740481C1C}">
+                <a14:useLocalDpi xmlns:a14="http://schemas.microsoft.com/office/drawing/2010/main"/>
+              </a:ext>
+            </a:extLst>
+          </a:blip>
+          <a:srcRect/>
+          <a:stretch/>
+        </p:blipFill>
+        <p:spPr bwMode="auto">
+          <a:xfrm>
+            <a:off x="1468395" y="2112869"/>
+            <a:ext cx="9144000" cy="4325001"/>
+          </a:xfrm>
+          <a:prstGeom prst="roundRect">
+            <a:avLst>
+              <a:gd name="adj" fmla="val 0"/>
+            </a:avLst>
+          </a:prstGeom>
+          <a:solidFill>
+            <a:srgbClr val="FFFFFF">
+              <a:shade val="85000"/>
+            </a:srgbClr>
+          </a:solidFill>
+          <a:ln>
+            <a:noFill/>
+          </a:ln>
+          <a:effectLst/>
+          <a:extLst/>
+        </p:spPr>
+      </p:pic>
+    </p:spTree>
+    <p:extLst>
+      <p:ext uri="{BB962C8B-B14F-4D97-AF65-F5344CB8AC3E}">
+        <p14:creationId xmlns:p14="http://schemas.microsoft.com/office/powerpoint/2010/main" val="2044514056"/>
+      </p:ext>
+    </p:extLst>
+  </p:cSld>
+  <p:clrMapOvr>
+    <a:masterClrMapping/>
+  </p:clrMapOvr>
+</p:sld>
+</file>
+
+<file path=ppt/slides/slide8.xml><?xml version="1.0" encoding="utf-8"?>
 <p:sld xmlns:a="http://schemas.openxmlformats.org/drawingml/2006/main" xmlns:r="http://schemas.openxmlformats.org/officeDocument/2006/relationships" xmlns:p="http://schemas.openxmlformats.org/presentationml/2006/main">
   <p:cSld>
     <p:spTree>
@@ -5663,7 +6655,7 @@
 </p:sld>
 </file>
 
-<file path=ppt/slides/slide7.xml><?xml version="1.0" encoding="utf-8"?>
+<file path=ppt/slides/slide9.xml><?xml version="1.0" encoding="utf-8"?>
 <p:sld xmlns:a="http://schemas.openxmlformats.org/drawingml/2006/main" xmlns:r="http://schemas.openxmlformats.org/officeDocument/2006/relationships" xmlns:p="http://schemas.openxmlformats.org/presentationml/2006/main">
   <p:cSld>
     <p:spTree>
@@ -5785,142 +6777,6 @@
     <p:extLst>
       <p:ext uri="{BB962C8B-B14F-4D97-AF65-F5344CB8AC3E}">
         <p14:creationId xmlns:p14="http://schemas.microsoft.com/office/powerpoint/2010/main" val="507040131"/>
-      </p:ext>
-    </p:extLst>
-  </p:cSld>
-  <p:clrMapOvr>
-    <a:masterClrMapping/>
-  </p:clrMapOvr>
-</p:sld>
-</file>
-
-<file path=ppt/slides/slide8.xml><?xml version="1.0" encoding="utf-8"?>
-<p:sld xmlns:a="http://schemas.openxmlformats.org/drawingml/2006/main" xmlns:r="http://schemas.openxmlformats.org/officeDocument/2006/relationships" xmlns:p="http://schemas.openxmlformats.org/presentationml/2006/main">
-  <p:cSld>
-    <p:spTree>
-      <p:nvGrpSpPr>
-        <p:cNvPr id="1" name=""/>
-        <p:cNvGrpSpPr/>
-        <p:nvPr/>
-      </p:nvGrpSpPr>
-      <p:grpSpPr>
-        <a:xfrm>
-          <a:off x="0" y="0"/>
-          <a:ext cx="0" cy="0"/>
-          <a:chOff x="0" y="0"/>
-          <a:chExt cx="0" cy="0"/>
-        </a:xfrm>
-      </p:grpSpPr>
-      <p:sp>
-        <p:nvSpPr>
-          <p:cNvPr id="2" name="Titel 1"/>
-          <p:cNvSpPr>
-            <a:spLocks noGrp="1"/>
-          </p:cNvSpPr>
-          <p:nvPr>
-            <p:ph type="title"/>
-          </p:nvPr>
-        </p:nvSpPr>
-        <p:spPr/>
-        <p:txBody>
-          <a:bodyPr/>
-          <a:lstStyle/>
-          <a:p>
-            <a:endParaRPr lang="en-GB"/>
-          </a:p>
-        </p:txBody>
-      </p:sp>
-      <p:sp>
-        <p:nvSpPr>
-          <p:cNvPr id="3" name="Inhaltsplatzhalter 2"/>
-          <p:cNvSpPr>
-            <a:spLocks noGrp="1"/>
-          </p:cNvSpPr>
-          <p:nvPr>
-            <p:ph idx="1"/>
-          </p:nvPr>
-        </p:nvSpPr>
-        <p:spPr/>
-        <p:txBody>
-          <a:bodyPr/>
-          <a:lstStyle/>
-          <a:p>
-            <a:endParaRPr lang="en-GB"/>
-          </a:p>
-        </p:txBody>
-      </p:sp>
-    </p:spTree>
-    <p:extLst>
-      <p:ext uri="{BB962C8B-B14F-4D97-AF65-F5344CB8AC3E}">
-        <p14:creationId xmlns:p14="http://schemas.microsoft.com/office/powerpoint/2010/main" val="1863119612"/>
-      </p:ext>
-    </p:extLst>
-  </p:cSld>
-  <p:clrMapOvr>
-    <a:masterClrMapping/>
-  </p:clrMapOvr>
-</p:sld>
-</file>
-
-<file path=ppt/slides/slide9.xml><?xml version="1.0" encoding="utf-8"?>
-<p:sld xmlns:a="http://schemas.openxmlformats.org/drawingml/2006/main" xmlns:r="http://schemas.openxmlformats.org/officeDocument/2006/relationships" xmlns:p="http://schemas.openxmlformats.org/presentationml/2006/main">
-  <p:cSld>
-    <p:spTree>
-      <p:nvGrpSpPr>
-        <p:cNvPr id="1" name=""/>
-        <p:cNvGrpSpPr/>
-        <p:nvPr/>
-      </p:nvGrpSpPr>
-      <p:grpSpPr>
-        <a:xfrm>
-          <a:off x="0" y="0"/>
-          <a:ext cx="0" cy="0"/>
-          <a:chOff x="0" y="0"/>
-          <a:chExt cx="0" cy="0"/>
-        </a:xfrm>
-      </p:grpSpPr>
-      <p:sp>
-        <p:nvSpPr>
-          <p:cNvPr id="2" name="Titel 1"/>
-          <p:cNvSpPr>
-            <a:spLocks noGrp="1"/>
-          </p:cNvSpPr>
-          <p:nvPr>
-            <p:ph type="title"/>
-          </p:nvPr>
-        </p:nvSpPr>
-        <p:spPr/>
-        <p:txBody>
-          <a:bodyPr/>
-          <a:lstStyle/>
-          <a:p>
-            <a:endParaRPr lang="en-GB"/>
-          </a:p>
-        </p:txBody>
-      </p:sp>
-      <p:sp>
-        <p:nvSpPr>
-          <p:cNvPr id="3" name="Inhaltsplatzhalter 2"/>
-          <p:cNvSpPr>
-            <a:spLocks noGrp="1"/>
-          </p:cNvSpPr>
-          <p:nvPr>
-            <p:ph idx="1"/>
-          </p:nvPr>
-        </p:nvSpPr>
-        <p:spPr/>
-        <p:txBody>
-          <a:bodyPr/>
-          <a:lstStyle/>
-          <a:p>
-            <a:endParaRPr lang="en-GB"/>
-          </a:p>
-        </p:txBody>
-      </p:sp>
-    </p:spTree>
-    <p:extLst>
-      <p:ext uri="{BB962C8B-B14F-4D97-AF65-F5344CB8AC3E}">
-        <p14:creationId xmlns:p14="http://schemas.microsoft.com/office/powerpoint/2010/main" val="411611437"/>
       </p:ext>
     </p:extLst>
   </p:cSld>

</xml_diff>

<commit_message>
rewriting the major/minor cycle explanation
</commit_message>
<xml_diff>
--- a/SKA-Days/Towards Distributed Image Reconstruction.pptx
+++ b/SKA-Days/Towards Distributed Image Reconstruction.pptx
@@ -9,22 +9,17 @@
     <p:sldId id="307" r:id="rId3"/>
     <p:sldId id="309" r:id="rId4"/>
     <p:sldId id="306" r:id="rId5"/>
-    <p:sldId id="308" r:id="rId6"/>
-    <p:sldId id="270" r:id="rId7"/>
-    <p:sldId id="273" r:id="rId8"/>
-    <p:sldId id="284" r:id="rId9"/>
-    <p:sldId id="280" r:id="rId10"/>
-    <p:sldId id="295" r:id="rId11"/>
-    <p:sldId id="275" r:id="rId12"/>
-    <p:sldId id="279" r:id="rId13"/>
-    <p:sldId id="278" r:id="rId14"/>
-    <p:sldId id="310" r:id="rId15"/>
-    <p:sldId id="289" r:id="rId16"/>
-    <p:sldId id="285" r:id="rId17"/>
-    <p:sldId id="292" r:id="rId18"/>
-    <p:sldId id="287" r:id="rId19"/>
-    <p:sldId id="291" r:id="rId20"/>
-    <p:sldId id="293" r:id="rId21"/>
+    <p:sldId id="270" r:id="rId6"/>
+    <p:sldId id="273" r:id="rId7"/>
+    <p:sldId id="284" r:id="rId8"/>
+    <p:sldId id="295" r:id="rId9"/>
+    <p:sldId id="275" r:id="rId10"/>
+    <p:sldId id="279" r:id="rId11"/>
+    <p:sldId id="278" r:id="rId12"/>
+    <p:sldId id="310" r:id="rId13"/>
+    <p:sldId id="289" r:id="rId14"/>
+    <p:sldId id="285" r:id="rId15"/>
+    <p:sldId id="287" r:id="rId16"/>
   </p:sldIdLst>
   <p:sldSz cx="12192000" cy="6858000"/>
   <p:notesSz cx="6858000" cy="9144000"/>
@@ -132,7 +127,6 @@
             <p14:sldId id="307"/>
             <p14:sldId id="309"/>
             <p14:sldId id="306"/>
-            <p14:sldId id="308"/>
             <p14:sldId id="270"/>
             <p14:sldId id="273"/>
           </p14:sldIdLst>
@@ -140,7 +134,6 @@
         <p14:section name="Distributed" id="{EDA3CE2A-D4CA-4E4E-80F3-465B2FA15004}">
           <p14:sldIdLst>
             <p14:sldId id="284"/>
-            <p14:sldId id="280"/>
             <p14:sldId id="295"/>
             <p14:sldId id="275"/>
             <p14:sldId id="279"/>
@@ -148,14 +141,7 @@
             <p14:sldId id="310"/>
             <p14:sldId id="289"/>
             <p14:sldId id="285"/>
-            <p14:sldId id="292"/>
             <p14:sldId id="287"/>
-          </p14:sldIdLst>
-        </p14:section>
-        <p14:section name="Abschnitt ohne Titel" id="{F46FDF14-37A6-417B-8F2D-AFE33FA9640D}">
-          <p14:sldIdLst>
-            <p14:sldId id="291"/>
-            <p14:sldId id="293"/>
           </p14:sldIdLst>
         </p14:section>
       </p14:sectionLst>
@@ -298,7 +284,7 @@
           <a:p>
             <a:fld id="{2019A626-8AAF-4A70-B83C-143F15D5AD18}" type="datetimeFigureOut">
               <a:rPr lang="en-GB" smtClean="0"/>
-              <a:t>13/06/2019</a:t>
+              <a:t>14/06/2019</a:t>
             </a:fld>
             <a:endParaRPr lang="en-GB"/>
           </a:p>
@@ -468,7 +454,7 @@
           <a:p>
             <a:fld id="{2019A626-8AAF-4A70-B83C-143F15D5AD18}" type="datetimeFigureOut">
               <a:rPr lang="en-GB" smtClean="0"/>
-              <a:t>13/06/2019</a:t>
+              <a:t>14/06/2019</a:t>
             </a:fld>
             <a:endParaRPr lang="en-GB"/>
           </a:p>
@@ -648,7 +634,7 @@
           <a:p>
             <a:fld id="{2019A626-8AAF-4A70-B83C-143F15D5AD18}" type="datetimeFigureOut">
               <a:rPr lang="en-GB" smtClean="0"/>
-              <a:t>13/06/2019</a:t>
+              <a:t>14/06/2019</a:t>
             </a:fld>
             <a:endParaRPr lang="en-GB"/>
           </a:p>
@@ -818,7 +804,7 @@
           <a:p>
             <a:fld id="{2019A626-8AAF-4A70-B83C-143F15D5AD18}" type="datetimeFigureOut">
               <a:rPr lang="en-GB" smtClean="0"/>
-              <a:t>13/06/2019</a:t>
+              <a:t>14/06/2019</a:t>
             </a:fld>
             <a:endParaRPr lang="en-GB"/>
           </a:p>
@@ -1064,7 +1050,7 @@
           <a:p>
             <a:fld id="{2019A626-8AAF-4A70-B83C-143F15D5AD18}" type="datetimeFigureOut">
               <a:rPr lang="en-GB" smtClean="0"/>
-              <a:t>13/06/2019</a:t>
+              <a:t>14/06/2019</a:t>
             </a:fld>
             <a:endParaRPr lang="en-GB"/>
           </a:p>
@@ -1296,7 +1282,7 @@
           <a:p>
             <a:fld id="{2019A626-8AAF-4A70-B83C-143F15D5AD18}" type="datetimeFigureOut">
               <a:rPr lang="en-GB" smtClean="0"/>
-              <a:t>13/06/2019</a:t>
+              <a:t>14/06/2019</a:t>
             </a:fld>
             <a:endParaRPr lang="en-GB"/>
           </a:p>
@@ -1663,7 +1649,7 @@
           <a:p>
             <a:fld id="{2019A626-8AAF-4A70-B83C-143F15D5AD18}" type="datetimeFigureOut">
               <a:rPr lang="en-GB" smtClean="0"/>
-              <a:t>13/06/2019</a:t>
+              <a:t>14/06/2019</a:t>
             </a:fld>
             <a:endParaRPr lang="en-GB"/>
           </a:p>
@@ -1781,7 +1767,7 @@
           <a:p>
             <a:fld id="{2019A626-8AAF-4A70-B83C-143F15D5AD18}" type="datetimeFigureOut">
               <a:rPr lang="en-GB" smtClean="0"/>
-              <a:t>13/06/2019</a:t>
+              <a:t>14/06/2019</a:t>
             </a:fld>
             <a:endParaRPr lang="en-GB"/>
           </a:p>
@@ -1876,7 +1862,7 @@
           <a:p>
             <a:fld id="{2019A626-8AAF-4A70-B83C-143F15D5AD18}" type="datetimeFigureOut">
               <a:rPr lang="en-GB" smtClean="0"/>
-              <a:t>13/06/2019</a:t>
+              <a:t>14/06/2019</a:t>
             </a:fld>
             <a:endParaRPr lang="en-GB"/>
           </a:p>
@@ -2153,7 +2139,7 @@
           <a:p>
             <a:fld id="{2019A626-8AAF-4A70-B83C-143F15D5AD18}" type="datetimeFigureOut">
               <a:rPr lang="en-GB" smtClean="0"/>
-              <a:t>13/06/2019</a:t>
+              <a:t>14/06/2019</a:t>
             </a:fld>
             <a:endParaRPr lang="en-GB"/>
           </a:p>
@@ -2406,7 +2392,7 @@
           <a:p>
             <a:fld id="{2019A626-8AAF-4A70-B83C-143F15D5AD18}" type="datetimeFigureOut">
               <a:rPr lang="en-GB" smtClean="0"/>
-              <a:t>13/06/2019</a:t>
+              <a:t>14/06/2019</a:t>
             </a:fld>
             <a:endParaRPr lang="en-GB"/>
           </a:p>
@@ -2619,7 +2605,7 @@
           <a:p>
             <a:fld id="{2019A626-8AAF-4A70-B83C-143F15D5AD18}" type="datetimeFigureOut">
               <a:rPr lang="en-GB" smtClean="0"/>
-              <a:t>13/06/2019</a:t>
+              <a:t>14/06/2019</a:t>
             </a:fld>
             <a:endParaRPr lang="en-GB"/>
           </a:p>
@@ -3078,11 +3064,11 @@
   <p:clrMapOvr>
     <a:masterClrMapping/>
   </p:clrMapOvr>
-  <mc:AlternateContent xmlns:mc="http://schemas.openxmlformats.org/markup-compatibility/2006">
-    <mc:Choice xmlns:p14="http://schemas.microsoft.com/office/powerpoint/2010/main" Requires="p14">
+  <mc:AlternateContent xmlns:mc="http://schemas.openxmlformats.org/markup-compatibility/2006" xmlns:p14="http://schemas.microsoft.com/office/powerpoint/2010/main">
+    <mc:Choice Requires="p14">
       <p:transition spd="slow" p14:dur="2000"/>
     </mc:Choice>
-    <mc:Fallback>
+    <mc:Fallback xmlns="">
       <p:transition spd="slow"/>
     </mc:Fallback>
   </mc:AlternateContent>
@@ -3097,325 +3083,6 @@
 </file>
 
 <file path=ppt/slides/slide10.xml><?xml version="1.0" encoding="utf-8"?>
-<p:sld xmlns:a="http://schemas.openxmlformats.org/drawingml/2006/main" xmlns:r="http://schemas.openxmlformats.org/officeDocument/2006/relationships" xmlns:p="http://schemas.openxmlformats.org/presentationml/2006/main">
-  <p:cSld>
-    <p:spTree>
-      <p:nvGrpSpPr>
-        <p:cNvPr id="1" name=""/>
-        <p:cNvGrpSpPr/>
-        <p:nvPr/>
-      </p:nvGrpSpPr>
-      <p:grpSpPr>
-        <a:xfrm>
-          <a:off x="0" y="0"/>
-          <a:ext cx="0" cy="0"/>
-          <a:chOff x="0" y="0"/>
-          <a:chExt cx="0" cy="0"/>
-        </a:xfrm>
-      </p:grpSpPr>
-      <p:sp>
-        <p:nvSpPr>
-          <p:cNvPr id="2" name="Titel 1"/>
-          <p:cNvSpPr>
-            <a:spLocks noGrp="1"/>
-          </p:cNvSpPr>
-          <p:nvPr>
-            <p:ph type="title"/>
-          </p:nvPr>
-        </p:nvSpPr>
-        <p:spPr/>
-        <p:txBody>
-          <a:bodyPr/>
-          <a:lstStyle/>
-          <a:p>
-            <a:r>
-              <a:rPr lang="en-GB" dirty="0" smtClean="0"/>
-              <a:t>Compressed Sensing based deconvolution</a:t>
-            </a:r>
-            <a:endParaRPr lang="en-GB" dirty="0"/>
-          </a:p>
-        </p:txBody>
-      </p:sp>
-      <p:sp>
-        <p:nvSpPr>
-          <p:cNvPr id="3" name="Inhaltsplatzhalter 2"/>
-          <p:cNvSpPr>
-            <a:spLocks noGrp="1"/>
-          </p:cNvSpPr>
-          <p:nvPr>
-            <p:ph idx="1"/>
-          </p:nvPr>
-        </p:nvSpPr>
-        <p:spPr/>
-        <p:txBody>
-          <a:bodyPr>
-            <a:normAutofit lnSpcReduction="10000"/>
-          </a:bodyPr>
-          <a:lstStyle/>
-          <a:p>
-            <a:endParaRPr lang="en-GB" dirty="0"/>
-          </a:p>
-          <a:p>
-            <a:endParaRPr lang="en-GB" dirty="0" smtClean="0"/>
-          </a:p>
-          <a:p>
-            <a:endParaRPr lang="en-GB" dirty="0"/>
-          </a:p>
-          <a:p>
-            <a:endParaRPr lang="en-GB" dirty="0" smtClean="0"/>
-          </a:p>
-          <a:p>
-            <a:r>
-              <a:rPr lang="en-GB" dirty="0" smtClean="0"/>
-              <a:t>A represents the convolution</a:t>
-            </a:r>
-            <a:endParaRPr lang="en-GB" dirty="0"/>
-          </a:p>
-          <a:p>
-            <a:r>
-              <a:rPr lang="en-GB" dirty="0" smtClean="0"/>
-              <a:t>P() represents the prior knowledge about our image</a:t>
-            </a:r>
-          </a:p>
-          <a:p>
-            <a:r>
-              <a:rPr lang="en-GB" dirty="0" smtClean="0"/>
-              <a:t>Optimization algorithm needed, Gradient Descent, ADMM…</a:t>
-            </a:r>
-          </a:p>
-          <a:p>
-            <a:endParaRPr lang="en-GB" dirty="0"/>
-          </a:p>
-          <a:p>
-            <a:pPr marL="0" indent="0">
-              <a:buNone/>
-            </a:pPr>
-            <a:r>
-              <a:rPr lang="en-GB" dirty="0" smtClean="0"/>
-              <a:t>CLEAN can be seen as a Compressed Sensing based deconvolution</a:t>
-            </a:r>
-            <a:endParaRPr lang="en-GB" dirty="0"/>
-          </a:p>
-        </p:txBody>
-      </p:sp>
-      <p:pic>
-        <p:nvPicPr>
-          <p:cNvPr id="4" name="Grafik 3"/>
-          <p:cNvPicPr>
-            <a:picLocks noChangeAspect="1"/>
-          </p:cNvPicPr>
-          <p:nvPr/>
-        </p:nvPicPr>
-        <p:blipFill>
-          <a:blip r:embed="rId2" cstate="print">
-            <a:extLst>
-              <a:ext uri="{28A0092B-C50C-407E-A947-70E740481C1C}">
-                <a14:useLocalDpi xmlns:a14="http://schemas.microsoft.com/office/drawing/2010/main" val="0"/>
-              </a:ext>
-            </a:extLst>
-          </a:blip>
-          <a:stretch>
-            <a:fillRect/>
-          </a:stretch>
-        </p:blipFill>
-        <p:spPr>
-          <a:xfrm>
-            <a:off x="3562427" y="2537022"/>
-            <a:ext cx="4591421" cy="712039"/>
-          </a:xfrm>
-          <a:prstGeom prst="rect">
-            <a:avLst/>
-          </a:prstGeom>
-        </p:spPr>
-      </p:pic>
-    </p:spTree>
-    <p:extLst>
-      <p:ext uri="{BB962C8B-B14F-4D97-AF65-F5344CB8AC3E}">
-        <p14:creationId xmlns:p14="http://schemas.microsoft.com/office/powerpoint/2010/main" val="857991154"/>
-      </p:ext>
-    </p:extLst>
-  </p:cSld>
-  <p:clrMapOvr>
-    <a:masterClrMapping/>
-  </p:clrMapOvr>
-  <p:timing>
-    <p:tnLst>
-      <p:par>
-        <p:cTn id="1" dur="indefinite" restart="never" nodeType="tmRoot"/>
-      </p:par>
-    </p:tnLst>
-  </p:timing>
-</p:sld>
-</file>
-
-<file path=ppt/slides/slide11.xml><?xml version="1.0" encoding="utf-8"?>
-<p:sld xmlns:a="http://schemas.openxmlformats.org/drawingml/2006/main" xmlns:r="http://schemas.openxmlformats.org/officeDocument/2006/relationships" xmlns:p="http://schemas.openxmlformats.org/presentationml/2006/main">
-  <p:cSld>
-    <p:spTree>
-      <p:nvGrpSpPr>
-        <p:cNvPr id="1" name=""/>
-        <p:cNvGrpSpPr/>
-        <p:nvPr/>
-      </p:nvGrpSpPr>
-      <p:grpSpPr>
-        <a:xfrm>
-          <a:off x="0" y="0"/>
-          <a:ext cx="0" cy="0"/>
-          <a:chOff x="0" y="0"/>
-          <a:chExt cx="0" cy="0"/>
-        </a:xfrm>
-      </p:grpSpPr>
-      <p:sp>
-        <p:nvSpPr>
-          <p:cNvPr id="2" name="Titel 1"/>
-          <p:cNvSpPr>
-            <a:spLocks noGrp="1"/>
-          </p:cNvSpPr>
-          <p:nvPr>
-            <p:ph type="title"/>
-          </p:nvPr>
-        </p:nvSpPr>
-        <p:spPr/>
-        <p:txBody>
-          <a:bodyPr/>
-          <a:lstStyle/>
-          <a:p>
-            <a:r>
-              <a:rPr lang="en-GB" dirty="0" smtClean="0"/>
-              <a:t>Compressed </a:t>
-            </a:r>
-            <a:r>
-              <a:rPr lang="en-GB" dirty="0"/>
-              <a:t>Sensing based deconvolution</a:t>
-            </a:r>
-          </a:p>
-        </p:txBody>
-      </p:sp>
-      <p:sp>
-        <p:nvSpPr>
-          <p:cNvPr id="3" name="Inhaltsplatzhalter 2"/>
-          <p:cNvSpPr>
-            <a:spLocks noGrp="1"/>
-          </p:cNvSpPr>
-          <p:nvPr>
-            <p:ph idx="1"/>
-          </p:nvPr>
-        </p:nvSpPr>
-        <p:spPr/>
-        <p:txBody>
-          <a:bodyPr>
-            <a:normAutofit/>
-          </a:bodyPr>
-          <a:lstStyle/>
-          <a:p>
-            <a:endParaRPr lang="en-GB" dirty="0" smtClean="0"/>
-          </a:p>
-          <a:p>
-            <a:endParaRPr lang="en-GB" dirty="0"/>
-          </a:p>
-          <a:p>
-            <a:pPr marL="0" indent="0">
-              <a:buNone/>
-            </a:pPr>
-            <a:endParaRPr lang="en-GB" dirty="0" smtClean="0"/>
-          </a:p>
-          <a:p>
-            <a:pPr marL="0" indent="0">
-              <a:buNone/>
-            </a:pPr>
-            <a:endParaRPr lang="en-GB" dirty="0" smtClean="0"/>
-          </a:p>
-          <a:p>
-            <a:r>
-              <a:rPr lang="en-GB" dirty="0" smtClean="0"/>
-              <a:t>Prior P() </a:t>
-            </a:r>
-            <a:r>
-              <a:rPr lang="en-GB" dirty="0" smtClean="0">
-                <a:sym typeface="Wingdings" panose="05000000000000000000" pitchFamily="2" charset="2"/>
-              </a:rPr>
-              <a:t> </a:t>
-            </a:r>
-            <a:r>
-              <a:rPr lang="en-GB" dirty="0" err="1" smtClean="0">
-                <a:sym typeface="Wingdings" panose="05000000000000000000" pitchFamily="2" charset="2"/>
-              </a:rPr>
-              <a:t>ElasticNet</a:t>
-            </a:r>
-            <a:endParaRPr lang="en-GB" dirty="0" smtClean="0"/>
-          </a:p>
-          <a:p>
-            <a:r>
-              <a:rPr lang="en-GB" dirty="0" smtClean="0"/>
-              <a:t>Optimization Algorithm </a:t>
-            </a:r>
-            <a:r>
-              <a:rPr lang="en-GB" dirty="0" smtClean="0">
-                <a:sym typeface="Wingdings" panose="05000000000000000000" pitchFamily="2" charset="2"/>
-              </a:rPr>
-              <a:t> Coordinate Descent</a:t>
-            </a:r>
-            <a:endParaRPr lang="en-GB" dirty="0" smtClean="0"/>
-          </a:p>
-          <a:p>
-            <a:endParaRPr lang="en-GB" dirty="0"/>
-          </a:p>
-          <a:p>
-            <a:endParaRPr lang="en-GB" dirty="0"/>
-          </a:p>
-        </p:txBody>
-      </p:sp>
-      <p:pic>
-        <p:nvPicPr>
-          <p:cNvPr id="4" name="Grafik 3"/>
-          <p:cNvPicPr>
-            <a:picLocks noChangeAspect="1"/>
-          </p:cNvPicPr>
-          <p:nvPr/>
-        </p:nvPicPr>
-        <p:blipFill>
-          <a:blip r:embed="rId2" cstate="print">
-            <a:extLst>
-              <a:ext uri="{28A0092B-C50C-407E-A947-70E740481C1C}">
-                <a14:useLocalDpi xmlns:a14="http://schemas.microsoft.com/office/drawing/2010/main" val="0"/>
-              </a:ext>
-            </a:extLst>
-          </a:blip>
-          <a:stretch>
-            <a:fillRect/>
-          </a:stretch>
-        </p:blipFill>
-        <p:spPr>
-          <a:xfrm>
-            <a:off x="3562427" y="2537024"/>
-            <a:ext cx="4591421" cy="712039"/>
-          </a:xfrm>
-          <a:prstGeom prst="rect">
-            <a:avLst/>
-          </a:prstGeom>
-        </p:spPr>
-      </p:pic>
-    </p:spTree>
-    <p:extLst>
-      <p:ext uri="{BB962C8B-B14F-4D97-AF65-F5344CB8AC3E}">
-        <p14:creationId xmlns:p14="http://schemas.microsoft.com/office/powerpoint/2010/main" val="2103644964"/>
-      </p:ext>
-    </p:extLst>
-  </p:cSld>
-  <p:clrMapOvr>
-    <a:masterClrMapping/>
-  </p:clrMapOvr>
-  <p:timing>
-    <p:tnLst>
-      <p:par>
-        <p:cTn id="1" dur="indefinite" restart="never" nodeType="tmRoot"/>
-      </p:par>
-    </p:tnLst>
-  </p:timing>
-</p:sld>
-</file>
-
-<file path=ppt/slides/slide12.xml><?xml version="1.0" encoding="utf-8"?>
 <p:sld xmlns:a="http://schemas.openxmlformats.org/drawingml/2006/main" xmlns:r="http://schemas.openxmlformats.org/officeDocument/2006/relationships" xmlns:p="http://schemas.openxmlformats.org/presentationml/2006/main">
   <p:cSld>
     <p:spTree>
@@ -3597,6 +3264,200 @@
 </p:sld>
 </file>
 
+<file path=ppt/slides/slide11.xml><?xml version="1.0" encoding="utf-8"?>
+<p:sld xmlns:a="http://schemas.openxmlformats.org/drawingml/2006/main" xmlns:r="http://schemas.openxmlformats.org/officeDocument/2006/relationships" xmlns:p="http://schemas.openxmlformats.org/presentationml/2006/main">
+  <p:cSld>
+    <p:spTree>
+      <p:nvGrpSpPr>
+        <p:cNvPr id="1" name=""/>
+        <p:cNvGrpSpPr/>
+        <p:nvPr/>
+      </p:nvGrpSpPr>
+      <p:grpSpPr>
+        <a:xfrm>
+          <a:off x="0" y="0"/>
+          <a:ext cx="0" cy="0"/>
+          <a:chOff x="0" y="0"/>
+          <a:chExt cx="0" cy="0"/>
+        </a:xfrm>
+      </p:grpSpPr>
+      <p:sp>
+        <p:nvSpPr>
+          <p:cNvPr id="2" name="Titel 1"/>
+          <p:cNvSpPr>
+            <a:spLocks noGrp="1"/>
+          </p:cNvSpPr>
+          <p:nvPr>
+            <p:ph type="title"/>
+          </p:nvPr>
+        </p:nvSpPr>
+        <p:spPr/>
+        <p:txBody>
+          <a:bodyPr/>
+          <a:lstStyle/>
+          <a:p>
+            <a:r>
+              <a:rPr lang="en-GB" dirty="0" smtClean="0"/>
+              <a:t>Coordinate Descent algorithm</a:t>
+            </a:r>
+            <a:endParaRPr lang="en-GB" dirty="0"/>
+          </a:p>
+        </p:txBody>
+      </p:sp>
+      <p:sp>
+        <p:nvSpPr>
+          <p:cNvPr id="3" name="Inhaltsplatzhalter 2"/>
+          <p:cNvSpPr>
+            <a:spLocks noGrp="1"/>
+          </p:cNvSpPr>
+          <p:nvPr>
+            <p:ph idx="1"/>
+          </p:nvPr>
+        </p:nvSpPr>
+        <p:spPr/>
+        <p:txBody>
+          <a:bodyPr/>
+          <a:lstStyle/>
+          <a:p>
+            <a:pPr marL="0" indent="0">
+              <a:buNone/>
+            </a:pPr>
+            <a:r>
+              <a:rPr lang="en-GB" dirty="0" smtClean="0"/>
+              <a:t>Algorithm:</a:t>
+            </a:r>
+          </a:p>
+          <a:p>
+            <a:r>
+              <a:rPr lang="en-GB" dirty="0" smtClean="0"/>
+              <a:t>Minimizes one pixel at a time</a:t>
+            </a:r>
+          </a:p>
+          <a:p>
+            <a:r>
+              <a:rPr lang="en-GB" dirty="0" smtClean="0"/>
+              <a:t>Iterate over pixels (with some strategy) until convergence</a:t>
+            </a:r>
+          </a:p>
+          <a:p>
+            <a:pPr marL="0" indent="0">
+              <a:buNone/>
+            </a:pPr>
+            <a:endParaRPr lang="en-GB" dirty="0" smtClean="0"/>
+          </a:p>
+          <a:p>
+            <a:r>
+              <a:rPr lang="en-GB" dirty="0" smtClean="0"/>
+              <a:t>Effective for high-dimensional problems</a:t>
+            </a:r>
+          </a:p>
+          <a:p>
+            <a:r>
+              <a:rPr lang="en-GB" dirty="0" smtClean="0"/>
+              <a:t>Parallel/Distributed/GPU variants</a:t>
+            </a:r>
+          </a:p>
+          <a:p>
+            <a:pPr lvl="1"/>
+            <a:endParaRPr lang="en-GB" dirty="0" smtClean="0"/>
+          </a:p>
+          <a:p>
+            <a:endParaRPr lang="en-GB" dirty="0"/>
+          </a:p>
+        </p:txBody>
+      </p:sp>
+    </p:spTree>
+    <p:extLst>
+      <p:ext uri="{BB962C8B-B14F-4D97-AF65-F5344CB8AC3E}">
+        <p14:creationId xmlns:p14="http://schemas.microsoft.com/office/powerpoint/2010/main" val="2837136548"/>
+      </p:ext>
+    </p:extLst>
+  </p:cSld>
+  <p:clrMapOvr>
+    <a:masterClrMapping/>
+  </p:clrMapOvr>
+  <p:timing>
+    <p:tnLst>
+      <p:par>
+        <p:cTn id="1" dur="indefinite" restart="never" nodeType="tmRoot"/>
+      </p:par>
+    </p:tnLst>
+  </p:timing>
+</p:sld>
+</file>
+
+<file path=ppt/slides/slide12.xml><?xml version="1.0" encoding="utf-8"?>
+<p:sld xmlns:a="http://schemas.openxmlformats.org/drawingml/2006/main" xmlns:r="http://schemas.openxmlformats.org/officeDocument/2006/relationships" xmlns:p="http://schemas.openxmlformats.org/presentationml/2006/main">
+  <p:cSld>
+    <p:spTree>
+      <p:nvGrpSpPr>
+        <p:cNvPr id="1" name=""/>
+        <p:cNvGrpSpPr/>
+        <p:nvPr/>
+      </p:nvGrpSpPr>
+      <p:grpSpPr>
+        <a:xfrm>
+          <a:off x="0" y="0"/>
+          <a:ext cx="0" cy="0"/>
+          <a:chOff x="0" y="0"/>
+          <a:chExt cx="0" cy="0"/>
+        </a:xfrm>
+      </p:grpSpPr>
+      <p:sp>
+        <p:nvSpPr>
+          <p:cNvPr id="2" name="Titel 1"/>
+          <p:cNvSpPr>
+            <a:spLocks noGrp="1"/>
+          </p:cNvSpPr>
+          <p:nvPr>
+            <p:ph type="title"/>
+          </p:nvPr>
+        </p:nvSpPr>
+        <p:spPr/>
+        <p:txBody>
+          <a:bodyPr/>
+          <a:lstStyle/>
+          <a:p>
+            <a:r>
+              <a:rPr lang="en-GB" dirty="0" smtClean="0"/>
+              <a:t>Distributed Coordinate Descent</a:t>
+            </a:r>
+            <a:endParaRPr lang="en-GB" dirty="0"/>
+          </a:p>
+        </p:txBody>
+      </p:sp>
+      <p:sp>
+        <p:nvSpPr>
+          <p:cNvPr id="3" name="Inhaltsplatzhalter 2"/>
+          <p:cNvSpPr>
+            <a:spLocks noGrp="1"/>
+          </p:cNvSpPr>
+          <p:nvPr>
+            <p:ph idx="1"/>
+          </p:nvPr>
+        </p:nvSpPr>
+        <p:spPr/>
+        <p:txBody>
+          <a:bodyPr/>
+          <a:lstStyle/>
+          <a:p>
+            <a:endParaRPr lang="en-GB"/>
+          </a:p>
+        </p:txBody>
+      </p:sp>
+    </p:spTree>
+    <p:extLst>
+      <p:ext uri="{BB962C8B-B14F-4D97-AF65-F5344CB8AC3E}">
+        <p14:creationId xmlns:p14="http://schemas.microsoft.com/office/powerpoint/2010/main" val="3182483723"/>
+      </p:ext>
+    </p:extLst>
+  </p:cSld>
+  <p:clrMapOvr>
+    <a:masterClrMapping/>
+  </p:clrMapOvr>
+</p:sld>
+</file>
+
 <file path=ppt/slides/slide13.xml><?xml version="1.0" encoding="utf-8"?>
 <p:sld xmlns:a="http://schemas.openxmlformats.org/drawingml/2006/main" xmlns:r="http://schemas.openxmlformats.org/officeDocument/2006/relationships" xmlns:p="http://schemas.openxmlformats.org/presentationml/2006/main">
   <p:cSld>
@@ -3630,8 +3491,12 @@
           <a:lstStyle/>
           <a:p>
             <a:r>
-              <a:rPr lang="en-GB" dirty="0" smtClean="0"/>
-              <a:t>Coordinate Descent algorithm</a:t>
+              <a:rPr lang="en-GB" dirty="0"/>
+              <a:t>D</a:t>
+            </a:r>
+            <a:r>
+              <a:rPr lang="en-GB" dirty="0" smtClean="0"/>
+              <a:t>istributed major / minor cycle</a:t>
             </a:r>
             <a:endParaRPr lang="en-GB" dirty="0"/>
           </a:p>
@@ -3652,58 +3517,38 @@
           <a:bodyPr/>
           <a:lstStyle/>
           <a:p>
-            <a:pPr marL="0" indent="0">
-              <a:buNone/>
-            </a:pPr>
-            <a:r>
-              <a:rPr lang="en-GB" dirty="0" smtClean="0"/>
-              <a:t>Algorithm:</a:t>
-            </a:r>
-          </a:p>
-          <a:p>
-            <a:r>
-              <a:rPr lang="en-GB" dirty="0" smtClean="0"/>
-              <a:t>Minimizes one pixel at a time</a:t>
-            </a:r>
-          </a:p>
-          <a:p>
-            <a:r>
-              <a:rPr lang="en-GB" dirty="0" smtClean="0"/>
-              <a:t>Iterate over pixels (with some strategy) until convergence</a:t>
-            </a:r>
-          </a:p>
-          <a:p>
-            <a:pPr marL="0" indent="0">
-              <a:buNone/>
-            </a:pPr>
-            <a:endParaRPr lang="en-GB" dirty="0" smtClean="0"/>
-          </a:p>
-          <a:p>
-            <a:r>
-              <a:rPr lang="en-GB" dirty="0" smtClean="0"/>
-              <a:t>Effective for high-dimensional problems</a:t>
-            </a:r>
-          </a:p>
-          <a:p>
-            <a:r>
-              <a:rPr lang="en-GB" dirty="0" smtClean="0"/>
-              <a:t>Parallel/Distributed/GPU variants</a:t>
-            </a:r>
-            <a:endParaRPr lang="en-GB" dirty="0" smtClean="0"/>
-          </a:p>
-          <a:p>
-            <a:pPr lvl="1"/>
-            <a:endParaRPr lang="en-GB" dirty="0" smtClean="0"/>
-          </a:p>
-          <a:p>
             <a:endParaRPr lang="en-GB" dirty="0"/>
           </a:p>
         </p:txBody>
       </p:sp>
+      <p:pic>
+        <p:nvPicPr>
+          <p:cNvPr id="4" name="Grafik 3"/>
+          <p:cNvPicPr>
+            <a:picLocks noChangeAspect="1"/>
+          </p:cNvPicPr>
+          <p:nvPr/>
+        </p:nvPicPr>
+        <p:blipFill>
+          <a:blip r:embed="rId2"/>
+          <a:stretch>
+            <a:fillRect/>
+          </a:stretch>
+        </p:blipFill>
+        <p:spPr>
+          <a:xfrm>
+            <a:off x="588661" y="2322173"/>
+            <a:ext cx="10695260" cy="2861486"/>
+          </a:xfrm>
+          <a:prstGeom prst="rect">
+            <a:avLst/>
+          </a:prstGeom>
+        </p:spPr>
+      </p:pic>
     </p:spTree>
     <p:extLst>
       <p:ext uri="{BB962C8B-B14F-4D97-AF65-F5344CB8AC3E}">
-        <p14:creationId xmlns:p14="http://schemas.microsoft.com/office/powerpoint/2010/main" val="2837136548"/>
+        <p14:creationId xmlns:p14="http://schemas.microsoft.com/office/powerpoint/2010/main" val="1704200707"/>
       </p:ext>
     </p:extLst>
   </p:cSld>
@@ -3752,7 +3597,11 @@
           <a:bodyPr/>
           <a:lstStyle/>
           <a:p>
-            <a:endParaRPr lang="en-GB"/>
+            <a:r>
+              <a:rPr lang="en-GB" dirty="0" smtClean="0"/>
+              <a:t>Preliminary Results</a:t>
+            </a:r>
+            <a:endParaRPr lang="en-GB" dirty="0"/>
           </a:p>
         </p:txBody>
       </p:sp>
@@ -3771,20 +3620,120 @@
           <a:bodyPr/>
           <a:lstStyle/>
           <a:p>
-            <a:endParaRPr lang="en-GB"/>
-          </a:p>
-        </p:txBody>
-      </p:sp>
+            <a:r>
+              <a:rPr lang="en-GB" dirty="0" smtClean="0"/>
+              <a:t>1 Node vs 4 Nodes</a:t>
+            </a:r>
+          </a:p>
+          <a:p>
+            <a:r>
+              <a:rPr lang="de-DE" dirty="0" err="1" smtClean="0"/>
+              <a:t>Speedup</a:t>
+            </a:r>
+            <a:r>
+              <a:rPr lang="de-DE" dirty="0" smtClean="0"/>
+              <a:t> </a:t>
+            </a:r>
+            <a:r>
+              <a:rPr lang="de-DE" dirty="0" err="1" smtClean="0"/>
+              <a:t>of</a:t>
+            </a:r>
+            <a:r>
+              <a:rPr lang="de-DE" dirty="0" smtClean="0"/>
+              <a:t> a </a:t>
+            </a:r>
+            <a:r>
+              <a:rPr lang="de-DE" dirty="0" err="1" smtClean="0"/>
+              <a:t>factor</a:t>
+            </a:r>
+            <a:r>
+              <a:rPr lang="de-DE" dirty="0" smtClean="0"/>
+              <a:t> 3.2 </a:t>
+            </a:r>
+          </a:p>
+          <a:p>
+            <a:endParaRPr lang="en-GB" dirty="0"/>
+          </a:p>
+          <a:p>
+            <a:endParaRPr lang="en-GB" dirty="0"/>
+          </a:p>
+        </p:txBody>
+      </p:sp>
+      <p:pic>
+        <p:nvPicPr>
+          <p:cNvPr id="4" name="Grafik 3"/>
+          <p:cNvPicPr>
+            <a:picLocks noChangeAspect="1"/>
+          </p:cNvPicPr>
+          <p:nvPr/>
+        </p:nvPicPr>
+        <p:blipFill rotWithShape="1">
+          <a:blip r:embed="rId2">
+            <a:extLst>
+              <a:ext uri="{28A0092B-C50C-407E-A947-70E740481C1C}">
+                <a14:useLocalDpi xmlns:a14="http://schemas.microsoft.com/office/drawing/2010/main" val="0"/>
+              </a:ext>
+            </a:extLst>
+          </a:blip>
+          <a:srcRect l="5849" t="7514" r="37960" b="40839"/>
+          <a:stretch/>
+        </p:blipFill>
+        <p:spPr>
+          <a:xfrm>
+            <a:off x="1124465" y="3124948"/>
+            <a:ext cx="3743422" cy="3440704"/>
+          </a:xfrm>
+          <a:prstGeom prst="rect">
+            <a:avLst/>
+          </a:prstGeom>
+        </p:spPr>
+      </p:pic>
+      <p:pic>
+        <p:nvPicPr>
+          <p:cNvPr id="5" name="Inhaltsplatzhalter 3"/>
+          <p:cNvPicPr>
+            <a:picLocks noChangeAspect="1"/>
+          </p:cNvPicPr>
+          <p:nvPr/>
+        </p:nvPicPr>
+        <p:blipFill rotWithShape="1">
+          <a:blip r:embed="rId3">
+            <a:extLst>
+              <a:ext uri="{28A0092B-C50C-407E-A947-70E740481C1C}">
+                <a14:useLocalDpi xmlns:a14="http://schemas.microsoft.com/office/drawing/2010/main" val="0"/>
+              </a:ext>
+            </a:extLst>
+          </a:blip>
+          <a:srcRect l="9589" t="8669" r="41896" b="43804"/>
+          <a:stretch/>
+        </p:blipFill>
+        <p:spPr>
+          <a:xfrm>
+            <a:off x="7159691" y="3125323"/>
+            <a:ext cx="3452291" cy="3381950"/>
+          </a:xfrm>
+          <a:prstGeom prst="rect">
+            <a:avLst/>
+          </a:prstGeom>
+        </p:spPr>
+      </p:pic>
     </p:spTree>
     <p:extLst>
       <p:ext uri="{BB962C8B-B14F-4D97-AF65-F5344CB8AC3E}">
-        <p14:creationId xmlns:p14="http://schemas.microsoft.com/office/powerpoint/2010/main" val="3182483723"/>
+        <p14:creationId xmlns:p14="http://schemas.microsoft.com/office/powerpoint/2010/main" val="3193024315"/>
       </p:ext>
     </p:extLst>
   </p:cSld>
   <p:clrMapOvr>
     <a:masterClrMapping/>
   </p:clrMapOvr>
+  <p:timing>
+    <p:tnLst>
+      <p:par>
+        <p:cTn id="1" dur="indefinite" restart="never" nodeType="tmRoot"/>
+      </p:par>
+    </p:tnLst>
+  </p:timing>
 </p:sld>
 </file>
 
@@ -3821,393 +3770,63 @@
           <a:lstStyle/>
           <a:p>
             <a:r>
+              <a:rPr lang="en-GB" dirty="0" smtClean="0"/>
+              <a:t>Limitations</a:t>
+            </a:r>
+            <a:endParaRPr lang="en-GB" dirty="0"/>
+          </a:p>
+        </p:txBody>
+      </p:sp>
+      <p:sp>
+        <p:nvSpPr>
+          <p:cNvPr id="3" name="Inhaltsplatzhalter 2"/>
+          <p:cNvSpPr>
+            <a:spLocks noGrp="1"/>
+          </p:cNvSpPr>
+          <p:nvPr>
+            <p:ph idx="1"/>
+          </p:nvPr>
+        </p:nvSpPr>
+        <p:spPr/>
+        <p:txBody>
+          <a:bodyPr/>
+          <a:lstStyle/>
+          <a:p>
+            <a:r>
+              <a:rPr lang="en-GB" dirty="0" smtClean="0"/>
+              <a:t>Distributed Coordinate Descent is </a:t>
+            </a:r>
+            <a:r>
               <a:rPr lang="en-GB" dirty="0"/>
-              <a:t>D</a:t>
-            </a:r>
-            <a:r>
-              <a:rPr lang="en-GB" dirty="0" smtClean="0"/>
-              <a:t>istributed </a:t>
-            </a:r>
-            <a:r>
-              <a:rPr lang="en-GB" dirty="0" smtClean="0"/>
-              <a:t>Minor Cycle</a:t>
+              <a:t>latency </a:t>
+            </a:r>
+            <a:r>
+              <a:rPr lang="en-GB" dirty="0" smtClean="0"/>
+              <a:t>limited</a:t>
+            </a:r>
+          </a:p>
+          <a:p>
+            <a:endParaRPr lang="de-DE" dirty="0" smtClean="0"/>
+          </a:p>
+          <a:p>
+            <a:r>
+              <a:rPr lang="de-DE" dirty="0" smtClean="0"/>
+              <a:t>GPU </a:t>
+            </a:r>
+            <a:r>
+              <a:rPr lang="de-DE" dirty="0" err="1" smtClean="0"/>
+              <a:t>Acceleration</a:t>
             </a:r>
             <a:endParaRPr lang="en-GB" dirty="0"/>
           </a:p>
-        </p:txBody>
-      </p:sp>
-      <p:sp>
-        <p:nvSpPr>
-          <p:cNvPr id="3" name="Inhaltsplatzhalter 2"/>
-          <p:cNvSpPr>
-            <a:spLocks noGrp="1"/>
-          </p:cNvSpPr>
-          <p:nvPr>
-            <p:ph idx="1"/>
-          </p:nvPr>
-        </p:nvSpPr>
-        <p:spPr/>
-        <p:txBody>
-          <a:bodyPr/>
-          <a:lstStyle/>
-          <a:p>
-            <a:endParaRPr lang="en-GB" dirty="0"/>
-          </a:p>
-        </p:txBody>
-      </p:sp>
-      <p:pic>
-        <p:nvPicPr>
-          <p:cNvPr id="5" name="Grafik 4"/>
-          <p:cNvPicPr>
-            <a:picLocks noChangeAspect="1"/>
-          </p:cNvPicPr>
-          <p:nvPr/>
-        </p:nvPicPr>
-        <p:blipFill>
-          <a:blip r:embed="rId2"/>
-          <a:stretch>
-            <a:fillRect/>
-          </a:stretch>
-        </p:blipFill>
-        <p:spPr>
-          <a:xfrm>
-            <a:off x="356285" y="2198606"/>
-            <a:ext cx="11434221" cy="3059193"/>
-          </a:xfrm>
-          <a:prstGeom prst="rect">
-            <a:avLst/>
-          </a:prstGeom>
-        </p:spPr>
-      </p:pic>
-    </p:spTree>
-    <p:extLst>
-      <p:ext uri="{BB962C8B-B14F-4D97-AF65-F5344CB8AC3E}">
-        <p14:creationId xmlns:p14="http://schemas.microsoft.com/office/powerpoint/2010/main" val="1704200707"/>
-      </p:ext>
-    </p:extLst>
-  </p:cSld>
-  <p:clrMapOvr>
-    <a:masterClrMapping/>
-  </p:clrMapOvr>
-  <p:timing>
-    <p:tnLst>
-      <p:par>
-        <p:cTn id="1" dur="indefinite" restart="never" nodeType="tmRoot"/>
-      </p:par>
-    </p:tnLst>
-  </p:timing>
-</p:sld>
-</file>
-
-<file path=ppt/slides/slide16.xml><?xml version="1.0" encoding="utf-8"?>
-<p:sld xmlns:a="http://schemas.openxmlformats.org/drawingml/2006/main" xmlns:r="http://schemas.openxmlformats.org/officeDocument/2006/relationships" xmlns:p="http://schemas.openxmlformats.org/presentationml/2006/main">
-  <p:cSld>
-    <p:spTree>
-      <p:nvGrpSpPr>
-        <p:cNvPr id="1" name=""/>
-        <p:cNvGrpSpPr/>
-        <p:nvPr/>
-      </p:nvGrpSpPr>
-      <p:grpSpPr>
-        <a:xfrm>
-          <a:off x="0" y="0"/>
-          <a:ext cx="0" cy="0"/>
-          <a:chOff x="0" y="0"/>
-          <a:chExt cx="0" cy="0"/>
-        </a:xfrm>
-      </p:grpSpPr>
-      <p:sp>
-        <p:nvSpPr>
-          <p:cNvPr id="2" name="Titel 1"/>
-          <p:cNvSpPr>
-            <a:spLocks noGrp="1"/>
-          </p:cNvSpPr>
-          <p:nvPr>
-            <p:ph type="title"/>
-          </p:nvPr>
-        </p:nvSpPr>
-        <p:spPr/>
-        <p:txBody>
-          <a:bodyPr/>
-          <a:lstStyle/>
-          <a:p>
-            <a:r>
-              <a:rPr lang="en-GB" dirty="0" smtClean="0"/>
-              <a:t>Preliminary Results</a:t>
-            </a:r>
-            <a:endParaRPr lang="en-GB" dirty="0"/>
-          </a:p>
-        </p:txBody>
-      </p:sp>
-      <p:sp>
-        <p:nvSpPr>
-          <p:cNvPr id="3" name="Inhaltsplatzhalter 2"/>
-          <p:cNvSpPr>
-            <a:spLocks noGrp="1"/>
-          </p:cNvSpPr>
-          <p:nvPr>
-            <p:ph idx="1"/>
-          </p:nvPr>
-        </p:nvSpPr>
-        <p:spPr/>
-        <p:txBody>
-          <a:bodyPr/>
-          <a:lstStyle/>
-          <a:p>
-            <a:r>
-              <a:rPr lang="de-DE" dirty="0" err="1" smtClean="0"/>
-              <a:t>Implemented</a:t>
-            </a:r>
-            <a:r>
-              <a:rPr lang="de-DE" dirty="0" smtClean="0"/>
-              <a:t> in C# .</a:t>
-            </a:r>
-            <a:r>
-              <a:rPr lang="de-DE" dirty="0" err="1" smtClean="0"/>
-              <a:t>netcore</a:t>
-            </a:r>
-            <a:endParaRPr lang="en-GB" dirty="0" smtClean="0"/>
-          </a:p>
-          <a:p>
-            <a:r>
-              <a:rPr lang="en-GB" dirty="0" smtClean="0"/>
-              <a:t>1 Node vs 4 Nodes</a:t>
-            </a:r>
-          </a:p>
-          <a:p>
-            <a:r>
-              <a:rPr lang="de-DE" dirty="0" err="1" smtClean="0"/>
-              <a:t>Speedup</a:t>
-            </a:r>
-            <a:r>
-              <a:rPr lang="de-DE" dirty="0" smtClean="0"/>
-              <a:t> </a:t>
-            </a:r>
-            <a:r>
-              <a:rPr lang="de-DE" dirty="0" err="1" smtClean="0"/>
-              <a:t>of</a:t>
-            </a:r>
-            <a:r>
-              <a:rPr lang="de-DE" dirty="0" smtClean="0"/>
-              <a:t> a </a:t>
-            </a:r>
-            <a:r>
-              <a:rPr lang="de-DE" dirty="0" err="1" smtClean="0"/>
-              <a:t>factor</a:t>
-            </a:r>
-            <a:r>
-              <a:rPr lang="de-DE" dirty="0" smtClean="0"/>
-              <a:t> 3.2 </a:t>
-            </a:r>
-          </a:p>
-          <a:p>
-            <a:endParaRPr lang="en-GB" dirty="0"/>
-          </a:p>
-          <a:p>
-            <a:endParaRPr lang="en-GB" dirty="0"/>
-          </a:p>
-        </p:txBody>
-      </p:sp>
-    </p:spTree>
-    <p:extLst>
-      <p:ext uri="{BB962C8B-B14F-4D97-AF65-F5344CB8AC3E}">
-        <p14:creationId xmlns:p14="http://schemas.microsoft.com/office/powerpoint/2010/main" val="3193024315"/>
-      </p:ext>
-    </p:extLst>
-  </p:cSld>
-  <p:clrMapOvr>
-    <a:masterClrMapping/>
-  </p:clrMapOvr>
-  <p:timing>
-    <p:tnLst>
-      <p:par>
-        <p:cTn id="1" dur="indefinite" restart="never" nodeType="tmRoot"/>
-      </p:par>
-    </p:tnLst>
-  </p:timing>
-</p:sld>
-</file>
-
-<file path=ppt/slides/slide17.xml><?xml version="1.0" encoding="utf-8"?>
-<p:sld xmlns:a="http://schemas.openxmlformats.org/drawingml/2006/main" xmlns:r="http://schemas.openxmlformats.org/officeDocument/2006/relationships" xmlns:p="http://schemas.openxmlformats.org/presentationml/2006/main">
-  <p:cSld>
-    <p:spTree>
-      <p:nvGrpSpPr>
-        <p:cNvPr id="1" name=""/>
-        <p:cNvGrpSpPr/>
-        <p:nvPr/>
-      </p:nvGrpSpPr>
-      <p:grpSpPr>
-        <a:xfrm>
-          <a:off x="0" y="0"/>
-          <a:ext cx="0" cy="0"/>
-          <a:chOff x="0" y="0"/>
-          <a:chExt cx="0" cy="0"/>
-        </a:xfrm>
-      </p:grpSpPr>
-      <p:sp>
-        <p:nvSpPr>
-          <p:cNvPr id="2" name="Titel 1"/>
-          <p:cNvSpPr>
-            <a:spLocks noGrp="1"/>
-          </p:cNvSpPr>
-          <p:nvPr>
-            <p:ph type="title"/>
-          </p:nvPr>
-        </p:nvSpPr>
-        <p:spPr/>
-        <p:txBody>
-          <a:bodyPr/>
-          <a:lstStyle/>
-          <a:p>
+          <a:p>
+            <a:r>
+              <a:rPr lang="en-GB" dirty="0" smtClean="0"/>
+              <a:t>Data </a:t>
+            </a:r>
             <a:r>
               <a:rPr lang="en-GB" dirty="0"/>
-              <a:t>Preliminary Results</a:t>
-            </a:r>
-          </a:p>
-        </p:txBody>
-      </p:sp>
-      <p:pic>
-        <p:nvPicPr>
-          <p:cNvPr id="5" name="Grafik 4"/>
-          <p:cNvPicPr>
-            <a:picLocks noChangeAspect="1"/>
-          </p:cNvPicPr>
-          <p:nvPr/>
-        </p:nvPicPr>
-        <p:blipFill rotWithShape="1">
-          <a:blip r:embed="rId2">
-            <a:extLst>
-              <a:ext uri="{28A0092B-C50C-407E-A947-70E740481C1C}">
-                <a14:useLocalDpi xmlns:a14="http://schemas.microsoft.com/office/drawing/2010/main" val="0"/>
-              </a:ext>
-            </a:extLst>
-          </a:blip>
-          <a:srcRect l="5849" t="7514" r="37960" b="40839"/>
-          <a:stretch/>
-        </p:blipFill>
-        <p:spPr>
-          <a:xfrm>
-            <a:off x="706581" y="2105201"/>
-            <a:ext cx="4705003" cy="4324525"/>
-          </a:xfrm>
-          <a:prstGeom prst="rect">
-            <a:avLst/>
-          </a:prstGeom>
-        </p:spPr>
-      </p:pic>
-      <p:pic>
-        <p:nvPicPr>
-          <p:cNvPr id="4" name="Inhaltsplatzhalter 3"/>
-          <p:cNvPicPr>
-            <a:picLocks noGrp="1" noChangeAspect="1"/>
-          </p:cNvPicPr>
-          <p:nvPr>
-            <p:ph idx="1"/>
-          </p:nvPr>
-        </p:nvPicPr>
-        <p:blipFill rotWithShape="1">
-          <a:blip r:embed="rId3">
-            <a:extLst>
-              <a:ext uri="{28A0092B-C50C-407E-A947-70E740481C1C}">
-                <a14:useLocalDpi xmlns:a14="http://schemas.microsoft.com/office/drawing/2010/main" val="0"/>
-              </a:ext>
-            </a:extLst>
-          </a:blip>
-          <a:srcRect l="9589" t="8669" r="41896" b="43804"/>
-          <a:stretch/>
-        </p:blipFill>
-        <p:spPr>
-          <a:xfrm>
-            <a:off x="6816590" y="2120668"/>
-            <a:ext cx="4339089" cy="4250679"/>
-          </a:xfrm>
-        </p:spPr>
-      </p:pic>
-    </p:spTree>
-    <p:extLst>
-      <p:ext uri="{BB962C8B-B14F-4D97-AF65-F5344CB8AC3E}">
-        <p14:creationId xmlns:p14="http://schemas.microsoft.com/office/powerpoint/2010/main" val="36143187"/>
-      </p:ext>
-    </p:extLst>
-  </p:cSld>
-  <p:clrMapOvr>
-    <a:masterClrMapping/>
-  </p:clrMapOvr>
-  <p:timing>
-    <p:tnLst>
-      <p:par>
-        <p:cTn id="1" dur="indefinite" restart="never" nodeType="tmRoot"/>
-      </p:par>
-    </p:tnLst>
-  </p:timing>
-</p:sld>
-</file>
-
-<file path=ppt/slides/slide18.xml><?xml version="1.0" encoding="utf-8"?>
-<p:sld xmlns:a="http://schemas.openxmlformats.org/drawingml/2006/main" xmlns:r="http://schemas.openxmlformats.org/officeDocument/2006/relationships" xmlns:p="http://schemas.openxmlformats.org/presentationml/2006/main">
-  <p:cSld>
-    <p:spTree>
-      <p:nvGrpSpPr>
-        <p:cNvPr id="1" name=""/>
-        <p:cNvGrpSpPr/>
-        <p:nvPr/>
-      </p:nvGrpSpPr>
-      <p:grpSpPr>
-        <a:xfrm>
-          <a:off x="0" y="0"/>
-          <a:ext cx="0" cy="0"/>
-          <a:chOff x="0" y="0"/>
-          <a:chExt cx="0" cy="0"/>
-        </a:xfrm>
-      </p:grpSpPr>
-      <p:sp>
-        <p:nvSpPr>
-          <p:cNvPr id="2" name="Titel 1"/>
-          <p:cNvSpPr>
-            <a:spLocks noGrp="1"/>
-          </p:cNvSpPr>
-          <p:nvPr>
-            <p:ph type="title"/>
-          </p:nvPr>
-        </p:nvSpPr>
-        <p:spPr/>
-        <p:txBody>
-          <a:bodyPr/>
-          <a:lstStyle/>
-          <a:p>
-            <a:r>
-              <a:rPr lang="en-GB" dirty="0" smtClean="0"/>
-              <a:t>Limitations</a:t>
-            </a:r>
-            <a:endParaRPr lang="en-GB" dirty="0"/>
-          </a:p>
-        </p:txBody>
-      </p:sp>
-      <p:sp>
-        <p:nvSpPr>
-          <p:cNvPr id="3" name="Inhaltsplatzhalter 2"/>
-          <p:cNvSpPr>
-            <a:spLocks noGrp="1"/>
-          </p:cNvSpPr>
-          <p:nvPr>
-            <p:ph idx="1"/>
-          </p:nvPr>
-        </p:nvSpPr>
-        <p:spPr/>
-        <p:txBody>
-          <a:bodyPr/>
-          <a:lstStyle/>
-          <a:p>
-            <a:r>
-              <a:rPr lang="en-GB" dirty="0" smtClean="0"/>
-              <a:t>Proof of concept implementation</a:t>
-            </a:r>
-          </a:p>
-          <a:p>
-            <a:r>
-              <a:rPr lang="en-GB" dirty="0"/>
-              <a:t>Data volume not (yet) </a:t>
+              <a:t>volume not (yet) </a:t>
             </a:r>
             <a:r>
               <a:rPr lang="en-GB" dirty="0" smtClean="0"/>
@@ -4218,13 +3837,6 @@
             <a:pPr marL="0" indent="0">
               <a:buNone/>
             </a:pPr>
-            <a:endParaRPr lang="en-GB" dirty="0"/>
-          </a:p>
-          <a:p>
-            <a:r>
-              <a:rPr lang="en-GB" dirty="0" smtClean="0"/>
-              <a:t>Minor Cycle is latency limited</a:t>
-            </a:r>
             <a:endParaRPr lang="en-GB" dirty="0"/>
           </a:p>
           <a:p>
@@ -4239,137 +3851,6 @@
     <p:extLst>
       <p:ext uri="{BB962C8B-B14F-4D97-AF65-F5344CB8AC3E}">
         <p14:creationId xmlns:p14="http://schemas.microsoft.com/office/powerpoint/2010/main" val="136673020"/>
-      </p:ext>
-    </p:extLst>
-  </p:cSld>
-  <p:clrMapOvr>
-    <a:masterClrMapping/>
-  </p:clrMapOvr>
-  <p:timing>
-    <p:tnLst>
-      <p:par>
-        <p:cTn id="1" dur="indefinite" restart="never" nodeType="tmRoot"/>
-      </p:par>
-    </p:tnLst>
-  </p:timing>
-</p:sld>
-</file>
-
-<file path=ppt/slides/slide19.xml><?xml version="1.0" encoding="utf-8"?>
-<p:sld xmlns:a="http://schemas.openxmlformats.org/drawingml/2006/main" xmlns:r="http://schemas.openxmlformats.org/officeDocument/2006/relationships" xmlns:p="http://schemas.openxmlformats.org/presentationml/2006/main">
-  <p:cSld>
-    <p:spTree>
-      <p:nvGrpSpPr>
-        <p:cNvPr id="1" name=""/>
-        <p:cNvGrpSpPr/>
-        <p:nvPr/>
-      </p:nvGrpSpPr>
-      <p:grpSpPr>
-        <a:xfrm>
-          <a:off x="0" y="0"/>
-          <a:ext cx="0" cy="0"/>
-          <a:chOff x="0" y="0"/>
-          <a:chExt cx="0" cy="0"/>
-        </a:xfrm>
-      </p:grpSpPr>
-      <p:sp>
-        <p:nvSpPr>
-          <p:cNvPr id="2" name="Titel 1"/>
-          <p:cNvSpPr>
-            <a:spLocks noGrp="1"/>
-          </p:cNvSpPr>
-          <p:nvPr>
-            <p:ph type="title"/>
-          </p:nvPr>
-        </p:nvSpPr>
-        <p:spPr/>
-        <p:txBody>
-          <a:bodyPr/>
-          <a:lstStyle/>
-          <a:p>
-            <a:r>
-              <a:rPr lang="en-GB" dirty="0" smtClean="0"/>
-              <a:t>Next Steps</a:t>
-            </a:r>
-            <a:endParaRPr lang="en-GB" dirty="0"/>
-          </a:p>
-        </p:txBody>
-      </p:sp>
-      <p:sp>
-        <p:nvSpPr>
-          <p:cNvPr id="3" name="Inhaltsplatzhalter 2"/>
-          <p:cNvSpPr>
-            <a:spLocks noGrp="1"/>
-          </p:cNvSpPr>
-          <p:nvPr>
-            <p:ph idx="1"/>
-          </p:nvPr>
-        </p:nvSpPr>
-        <p:spPr/>
-        <p:txBody>
-          <a:bodyPr/>
-          <a:lstStyle/>
-          <a:p>
-            <a:r>
-              <a:rPr lang="de-DE" dirty="0" smtClean="0"/>
-              <a:t>GPU </a:t>
-            </a:r>
-            <a:r>
-              <a:rPr lang="de-DE" dirty="0" err="1" smtClean="0"/>
-              <a:t>Acceleration</a:t>
-            </a:r>
-            <a:r>
-              <a:rPr lang="de-DE" dirty="0" smtClean="0"/>
-              <a:t> </a:t>
-            </a:r>
-            <a:r>
-              <a:rPr lang="de-DE" dirty="0" err="1" smtClean="0"/>
-              <a:t>for</a:t>
-            </a:r>
-            <a:r>
-              <a:rPr lang="de-DE" dirty="0" smtClean="0"/>
-              <a:t> </a:t>
-            </a:r>
-            <a:r>
-              <a:rPr lang="de-DE" dirty="0" err="1" smtClean="0"/>
-              <a:t>Coordinate</a:t>
-            </a:r>
-            <a:r>
-              <a:rPr lang="de-DE" dirty="0" smtClean="0"/>
-              <a:t> </a:t>
-            </a:r>
-            <a:r>
-              <a:rPr lang="de-DE" dirty="0" err="1" smtClean="0"/>
-              <a:t>Descent</a:t>
-            </a:r>
-            <a:endParaRPr lang="en-GB" dirty="0"/>
-          </a:p>
-          <a:p>
-            <a:r>
-              <a:rPr lang="de-DE" dirty="0" smtClean="0"/>
-              <a:t>Test on </a:t>
-            </a:r>
-            <a:r>
-              <a:rPr lang="de-DE" dirty="0" err="1" smtClean="0"/>
-              <a:t>Azure</a:t>
-            </a:r>
-            <a:r>
-              <a:rPr lang="de-DE" dirty="0" smtClean="0"/>
-              <a:t> Cloud</a:t>
-            </a:r>
-          </a:p>
-          <a:p>
-            <a:r>
-              <a:rPr lang="de-DE" dirty="0" smtClean="0"/>
-              <a:t>MORE DATA</a:t>
-            </a:r>
-          </a:p>
-        </p:txBody>
-      </p:sp>
-    </p:spTree>
-    <p:extLst>
-      <p:ext uri="{BB962C8B-B14F-4D97-AF65-F5344CB8AC3E}">
-        <p14:creationId xmlns:p14="http://schemas.microsoft.com/office/powerpoint/2010/main" val="3848722892"/>
       </p:ext>
     </p:extLst>
   </p:cSld>
@@ -4490,89 +3971,14 @@
   <p:clrMapOvr>
     <a:masterClrMapping/>
   </p:clrMapOvr>
-  <mc:AlternateContent xmlns:mc="http://schemas.openxmlformats.org/markup-compatibility/2006">
-    <mc:Choice xmlns:p14="http://schemas.microsoft.com/office/powerpoint/2010/main" Requires="p14">
+  <mc:AlternateContent xmlns:mc="http://schemas.openxmlformats.org/markup-compatibility/2006" xmlns:p14="http://schemas.microsoft.com/office/powerpoint/2010/main">
+    <mc:Choice Requires="p14">
       <p:transition spd="slow" p14:dur="2000"/>
     </mc:Choice>
-    <mc:Fallback>
+    <mc:Fallback xmlns="">
       <p:transition spd="slow"/>
     </mc:Fallback>
   </mc:AlternateContent>
-  <p:timing>
-    <p:tnLst>
-      <p:par>
-        <p:cTn id="1" dur="indefinite" restart="never" nodeType="tmRoot"/>
-      </p:par>
-    </p:tnLst>
-  </p:timing>
-</p:sld>
-</file>
-
-<file path=ppt/slides/slide20.xml><?xml version="1.0" encoding="utf-8"?>
-<p:sld xmlns:a="http://schemas.openxmlformats.org/drawingml/2006/main" xmlns:r="http://schemas.openxmlformats.org/officeDocument/2006/relationships" xmlns:p="http://schemas.openxmlformats.org/presentationml/2006/main">
-  <p:cSld>
-    <p:spTree>
-      <p:nvGrpSpPr>
-        <p:cNvPr id="1" name=""/>
-        <p:cNvGrpSpPr/>
-        <p:nvPr/>
-      </p:nvGrpSpPr>
-      <p:grpSpPr>
-        <a:xfrm>
-          <a:off x="0" y="0"/>
-          <a:ext cx="0" cy="0"/>
-          <a:chOff x="0" y="0"/>
-          <a:chExt cx="0" cy="0"/>
-        </a:xfrm>
-      </p:grpSpPr>
-      <p:sp>
-        <p:nvSpPr>
-          <p:cNvPr id="2" name="Titel 1"/>
-          <p:cNvSpPr>
-            <a:spLocks noGrp="1"/>
-          </p:cNvSpPr>
-          <p:nvPr>
-            <p:ph type="title"/>
-          </p:nvPr>
-        </p:nvSpPr>
-        <p:spPr/>
-        <p:txBody>
-          <a:bodyPr/>
-          <a:lstStyle/>
-          <a:p>
-            <a:endParaRPr lang="en-GB"/>
-          </a:p>
-        </p:txBody>
-      </p:sp>
-      <p:sp>
-        <p:nvSpPr>
-          <p:cNvPr id="3" name="Inhaltsplatzhalter 2"/>
-          <p:cNvSpPr>
-            <a:spLocks noGrp="1"/>
-          </p:cNvSpPr>
-          <p:nvPr>
-            <p:ph idx="1"/>
-          </p:nvPr>
-        </p:nvSpPr>
-        <p:spPr/>
-        <p:txBody>
-          <a:bodyPr/>
-          <a:lstStyle/>
-          <a:p>
-            <a:endParaRPr lang="en-GB"/>
-          </a:p>
-        </p:txBody>
-      </p:sp>
-    </p:spTree>
-    <p:extLst>
-      <p:ext uri="{BB962C8B-B14F-4D97-AF65-F5344CB8AC3E}">
-        <p14:creationId xmlns:p14="http://schemas.microsoft.com/office/powerpoint/2010/main" val="1319971018"/>
-      </p:ext>
-    </p:extLst>
-  </p:cSld>
-  <p:clrMapOvr>
-    <a:masterClrMapping/>
-  </p:clrMapOvr>
   <p:timing>
     <p:tnLst>
       <p:par>
@@ -4640,22 +4046,86 @@
           <a:p>
             <a:r>
               <a:rPr lang="en-GB" dirty="0" smtClean="0"/>
-              <a:t>Distributing the Major Cycle (Gridding and Minor Cycle)</a:t>
-            </a:r>
-          </a:p>
-          <a:p>
-            <a:r>
-              <a:rPr lang="en-GB" dirty="0" smtClean="0"/>
-              <a:t>Proof-of-concept </a:t>
+              <a:t>Distributing the </a:t>
+            </a:r>
+            <a:r>
+              <a:rPr lang="en-GB" dirty="0" smtClean="0"/>
+              <a:t>major/minor</a:t>
+            </a:r>
+            <a:r>
+              <a:rPr lang="en-GB" dirty="0" smtClean="0"/>
+              <a:t> </a:t>
+            </a:r>
+            <a:r>
+              <a:rPr lang="en-GB" dirty="0"/>
+              <a:t>c</a:t>
+            </a:r>
+            <a:r>
+              <a:rPr lang="en-GB" dirty="0" smtClean="0"/>
+              <a:t>ycle using MPI and .</a:t>
             </a:r>
             <a:r>
               <a:rPr lang="en-GB" dirty="0" err="1" smtClean="0"/>
-              <a:t>implememtations</a:t>
-            </a:r>
-            <a:r>
-              <a:rPr lang="en-GB" dirty="0" smtClean="0"/>
-              <a:t>.</a:t>
-            </a:r>
+              <a:t>netcore</a:t>
+            </a:r>
+            <a:r>
+              <a:rPr lang="en-GB" dirty="0" smtClean="0"/>
+              <a:t> </a:t>
+            </a:r>
+            <a:r>
+              <a:rPr lang="en-GB" dirty="0" smtClean="0"/>
+              <a:t>(C#)</a:t>
+            </a:r>
+            <a:endParaRPr lang="en-GB" dirty="0" smtClean="0"/>
+          </a:p>
+          <a:p>
+            <a:r>
+              <a:rPr lang="en-GB" dirty="0" smtClean="0"/>
+              <a:t>Distributed gridding </a:t>
+            </a:r>
+            <a:r>
+              <a:rPr lang="en-GB" dirty="0" smtClean="0"/>
+              <a:t>is </a:t>
+            </a:r>
+            <a:r>
+              <a:rPr lang="en-GB" dirty="0" smtClean="0"/>
+              <a:t>based on the Image </a:t>
+            </a:r>
+            <a:r>
+              <a:rPr lang="en-GB" dirty="0" smtClean="0"/>
+              <a:t>Domain </a:t>
+            </a:r>
+            <a:r>
+              <a:rPr lang="en-GB" dirty="0" err="1" smtClean="0"/>
+              <a:t>Gridder</a:t>
+            </a:r>
+            <a:r>
+              <a:rPr lang="en-GB" dirty="0" smtClean="0"/>
+              <a:t> (IDG</a:t>
+            </a:r>
+            <a:r>
+              <a:rPr lang="en-GB" dirty="0" smtClean="0"/>
+              <a:t>)</a:t>
+            </a:r>
+          </a:p>
+          <a:p>
+            <a:r>
+              <a:rPr lang="en-GB" dirty="0" smtClean="0"/>
+              <a:t>Focus on distributing the minor cycle</a:t>
+            </a:r>
+          </a:p>
+          <a:p>
+            <a:endParaRPr lang="en-GB" dirty="0" smtClean="0"/>
+          </a:p>
+          <a:p>
+            <a:pPr marL="0" indent="0">
+              <a:buNone/>
+            </a:pPr>
+            <a:r>
+              <a:rPr lang="en-GB" dirty="0" smtClean="0"/>
+              <a:t>Work in progress</a:t>
+            </a:r>
+            <a:endParaRPr lang="en-GB" dirty="0" smtClean="0"/>
           </a:p>
         </p:txBody>
       </p:sp>
@@ -4808,8 +4278,8 @@
           <a:lstStyle/>
           <a:p>
             <a:r>
-              <a:rPr lang="en-GB" dirty="0" smtClean="0"/>
-              <a:t>Major / Minor Cycle</a:t>
+              <a:rPr lang="en-GB" smtClean="0"/>
+              <a:t>Distributed gridding</a:t>
             </a:r>
             <a:endParaRPr lang="en-GB" dirty="0"/>
           </a:p>
@@ -4830,13 +4300,81 @@
           <a:bodyPr/>
           <a:lstStyle/>
           <a:p>
+            <a:endParaRPr lang="en-GB" dirty="0"/>
+          </a:p>
+        </p:txBody>
+      </p:sp>
+      <p:sp>
+        <p:nvSpPr>
+          <p:cNvPr id="6" name="Textfeld 5"/>
+          <p:cNvSpPr txBox="1"/>
+          <p:nvPr/>
+        </p:nvSpPr>
+        <p:spPr>
+          <a:xfrm>
+            <a:off x="976354" y="5359212"/>
+            <a:ext cx="1091966" cy="369332"/>
+          </a:xfrm>
+          <a:prstGeom prst="rect">
+            <a:avLst/>
+          </a:prstGeom>
+          <a:noFill/>
+        </p:spPr>
+        <p:txBody>
+          <a:bodyPr wrap="none" rtlCol="0">
+            <a:spAutoFit/>
+          </a:bodyPr>
+          <a:lstStyle/>
+          <a:p>
+            <a:r>
+              <a:rPr lang="en-GB" dirty="0" smtClean="0"/>
+              <a:t>1000+ GB</a:t>
+            </a:r>
+            <a:endParaRPr lang="en-GB" dirty="0"/>
+          </a:p>
+        </p:txBody>
+      </p:sp>
+      <p:sp>
+        <p:nvSpPr>
+          <p:cNvPr id="7" name="Textfeld 6"/>
+          <p:cNvSpPr txBox="1"/>
+          <p:nvPr/>
+        </p:nvSpPr>
+        <p:spPr>
+          <a:xfrm>
+            <a:off x="4390405" y="5036047"/>
+            <a:ext cx="1705595" cy="646331"/>
+          </a:xfrm>
+          <a:prstGeom prst="rect">
+            <a:avLst/>
+          </a:prstGeom>
+          <a:noFill/>
+        </p:spPr>
+        <p:txBody>
+          <a:bodyPr wrap="none" rtlCol="0">
+            <a:spAutoFit/>
+          </a:bodyPr>
+          <a:lstStyle/>
+          <a:p>
+            <a:pPr algn="ctr"/>
+            <a:r>
+              <a:rPr lang="en-GB" dirty="0" smtClean="0"/>
+              <a:t>~ 4 GB</a:t>
+            </a:r>
+          </a:p>
+          <a:p>
+            <a:pPr algn="ctr"/>
+            <a:r>
+              <a:rPr lang="en-GB" dirty="0" smtClean="0"/>
+              <a:t>32k * 32k image</a:t>
+            </a:r>
             <a:endParaRPr lang="en-GB" dirty="0"/>
           </a:p>
         </p:txBody>
       </p:sp>
       <p:pic>
         <p:nvPicPr>
-          <p:cNvPr id="4" name="Grafik 3"/>
+          <p:cNvPr id="9" name="Grafik 8"/>
           <p:cNvPicPr>
             <a:picLocks noChangeAspect="1"/>
           </p:cNvPicPr>
@@ -4850,8 +4388,8 @@
         </p:blipFill>
         <p:spPr>
           <a:xfrm>
-            <a:off x="200507" y="2389397"/>
-            <a:ext cx="11230254" cy="1805721"/>
+            <a:off x="358346" y="1752153"/>
+            <a:ext cx="10864613" cy="3283894"/>
           </a:xfrm>
           <a:prstGeom prst="rect">
             <a:avLst/>
@@ -4860,81 +4398,13 @@
       </p:pic>
       <p:sp>
         <p:nvSpPr>
-          <p:cNvPr id="5" name="Textfeld 4"/>
+          <p:cNvPr id="11" name="Textfeld 10"/>
           <p:cNvSpPr txBox="1"/>
           <p:nvPr/>
         </p:nvSpPr>
         <p:spPr>
           <a:xfrm>
-            <a:off x="838200" y="4251058"/>
-            <a:ext cx="1091966" cy="369332"/>
-          </a:xfrm>
-          <a:prstGeom prst="rect">
-            <a:avLst/>
-          </a:prstGeom>
-          <a:noFill/>
-        </p:spPr>
-        <p:txBody>
-          <a:bodyPr wrap="none" rtlCol="0">
-            <a:spAutoFit/>
-          </a:bodyPr>
-          <a:lstStyle/>
-          <a:p>
-            <a:r>
-              <a:rPr lang="en-GB" dirty="0" smtClean="0"/>
-              <a:t>1000+ GB</a:t>
-            </a:r>
-            <a:endParaRPr lang="en-GB" dirty="0"/>
-          </a:p>
-        </p:txBody>
-      </p:sp>
-      <p:sp>
-        <p:nvSpPr>
-          <p:cNvPr id="6" name="Textfeld 5"/>
-          <p:cNvSpPr txBox="1"/>
-          <p:nvPr/>
-        </p:nvSpPr>
-        <p:spPr>
-          <a:xfrm>
-            <a:off x="4390405" y="4112559"/>
-            <a:ext cx="1705595" cy="646331"/>
-          </a:xfrm>
-          <a:prstGeom prst="rect">
-            <a:avLst/>
-          </a:prstGeom>
-          <a:noFill/>
-        </p:spPr>
-        <p:txBody>
-          <a:bodyPr wrap="none" rtlCol="0">
-            <a:spAutoFit/>
-          </a:bodyPr>
-          <a:lstStyle/>
-          <a:p>
-            <a:pPr algn="ctr"/>
-            <a:r>
-              <a:rPr lang="en-GB" dirty="0" smtClean="0"/>
-              <a:t>~ 4 GB</a:t>
-            </a:r>
-          </a:p>
-          <a:p>
-            <a:pPr algn="ctr"/>
-            <a:r>
-              <a:rPr lang="en-GB" dirty="0" smtClean="0"/>
-              <a:t>32k * 32k image</a:t>
-            </a:r>
-            <a:endParaRPr lang="en-GB" dirty="0"/>
-          </a:p>
-        </p:txBody>
-      </p:sp>
-      <p:sp>
-        <p:nvSpPr>
-          <p:cNvPr id="7" name="Textfeld 6"/>
-          <p:cNvSpPr txBox="1"/>
-          <p:nvPr/>
-        </p:nvSpPr>
-        <p:spPr>
-          <a:xfrm>
-            <a:off x="9349159" y="4114504"/>
+            <a:off x="9355338" y="4847818"/>
             <a:ext cx="1641347" cy="646331"/>
           </a:xfrm>
           <a:prstGeom prst="rect">
@@ -4967,7 +4437,7 @@
     </p:spTree>
     <p:extLst>
       <p:ext uri="{BB962C8B-B14F-4D97-AF65-F5344CB8AC3E}">
-        <p14:creationId xmlns:p14="http://schemas.microsoft.com/office/powerpoint/2010/main" val="257555008"/>
+        <p14:creationId xmlns:p14="http://schemas.microsoft.com/office/powerpoint/2010/main" val="2193424225"/>
       </p:ext>
     </p:extLst>
   </p:cSld>
@@ -5017,8 +4487,28 @@
           <a:lstStyle/>
           <a:p>
             <a:r>
-              <a:rPr lang="en-GB" dirty="0" smtClean="0"/>
-              <a:t>Distribute Gridding!</a:t>
+              <a:rPr lang="en-GB" dirty="0"/>
+              <a:t>But what about </a:t>
+            </a:r>
+            <a:r>
+              <a:rPr lang="en-GB" dirty="0" smtClean="0"/>
+              <a:t>the </a:t>
+            </a:r>
+            <a:r>
+              <a:rPr lang="en-GB" dirty="0" smtClean="0"/>
+              <a:t>minor </a:t>
+            </a:r>
+            <a:r>
+              <a:rPr lang="en-GB" dirty="0"/>
+              <a:t>c</a:t>
+            </a:r>
+            <a:r>
+              <a:rPr lang="en-GB" dirty="0" smtClean="0"/>
+              <a:t>ycle</a:t>
+            </a:r>
+            <a:r>
+              <a:rPr lang="en-GB" dirty="0" smtClean="0"/>
+              <a:t>?</a:t>
             </a:r>
             <a:endParaRPr lang="en-GB" dirty="0"/>
           </a:p>
@@ -5036,41 +4526,73 @@
         </p:nvSpPr>
         <p:spPr/>
         <p:txBody>
-          <a:bodyPr/>
-          <a:lstStyle/>
-          <a:p>
+          <a:bodyPr>
+            <a:normAutofit/>
+          </a:bodyPr>
+          <a:lstStyle/>
+          <a:p>
+            <a:r>
+              <a:rPr lang="en-GB" dirty="0" smtClean="0"/>
+              <a:t>Deconvolution </a:t>
+            </a:r>
+            <a:r>
+              <a:rPr lang="en-GB" dirty="0"/>
+              <a:t>may become the most time consuming </a:t>
+            </a:r>
+            <a:r>
+              <a:rPr lang="en-GB" dirty="0" smtClean="0"/>
+              <a:t>step</a:t>
+            </a:r>
+          </a:p>
+          <a:p>
+            <a:r>
+              <a:rPr lang="en-GB" dirty="0" smtClean="0"/>
+              <a:t>Deconvolution </a:t>
+            </a:r>
+            <a:r>
+              <a:rPr lang="en-GB" dirty="0"/>
+              <a:t>is done only on one </a:t>
+            </a:r>
+            <a:r>
+              <a:rPr lang="en-GB" dirty="0" smtClean="0"/>
+              <a:t>node</a:t>
+            </a:r>
             <a:endParaRPr lang="en-GB" dirty="0"/>
           </a:p>
-        </p:txBody>
-      </p:sp>
-      <p:pic>
-        <p:nvPicPr>
-          <p:cNvPr id="5" name="Grafik 4"/>
-          <p:cNvPicPr>
-            <a:picLocks noChangeAspect="1"/>
-          </p:cNvPicPr>
-          <p:nvPr/>
-        </p:nvPicPr>
-        <p:blipFill>
-          <a:blip r:embed="rId2"/>
-          <a:stretch>
-            <a:fillRect/>
-          </a:stretch>
-        </p:blipFill>
-        <p:spPr>
-          <a:xfrm>
-            <a:off x="555145" y="1825624"/>
-            <a:ext cx="10621539" cy="3210423"/>
-          </a:xfrm>
-          <a:prstGeom prst="rect">
-            <a:avLst/>
-          </a:prstGeom>
-        </p:spPr>
-      </p:pic>
+          <a:p>
+            <a:r>
+              <a:rPr lang="en-GB" dirty="0" smtClean="0"/>
+              <a:t> All other nodes idle during deconvolution</a:t>
+            </a:r>
+          </a:p>
+          <a:p>
+            <a:r>
+              <a:rPr lang="en-GB" dirty="0"/>
+              <a:t>We can use the idling nodes for </a:t>
+            </a:r>
+            <a:r>
+              <a:rPr lang="en-GB" dirty="0" smtClean="0"/>
+              <a:t>deconvolution</a:t>
+            </a:r>
+          </a:p>
+          <a:p>
+            <a:pPr marL="0" indent="0">
+              <a:buNone/>
+            </a:pPr>
+            <a:endParaRPr lang="en-GB" dirty="0" smtClean="0"/>
+          </a:p>
+          <a:p>
+            <a:pPr marL="0" indent="0">
+              <a:buNone/>
+            </a:pPr>
+            <a:endParaRPr lang="en-GB" dirty="0"/>
+          </a:p>
+        </p:txBody>
+      </p:sp>
     </p:spTree>
     <p:extLst>
       <p:ext uri="{BB962C8B-B14F-4D97-AF65-F5344CB8AC3E}">
-        <p14:creationId xmlns:p14="http://schemas.microsoft.com/office/powerpoint/2010/main" val="2193424225"/>
+        <p14:creationId xmlns:p14="http://schemas.microsoft.com/office/powerpoint/2010/main" val="592263724"/>
       </p:ext>
     </p:extLst>
   </p:cSld>
@@ -5120,12 +4642,31 @@
           <a:lstStyle/>
           <a:p>
             <a:r>
+              <a:rPr lang="en-GB" dirty="0" smtClean="0"/>
+              <a:t>Minor </a:t>
+            </a:r>
+            <a:r>
+              <a:rPr lang="en-GB" dirty="0" smtClean="0"/>
+              <a:t>cycle </a:t>
+            </a:r>
+            <a:r>
+              <a:rPr lang="en-GB" dirty="0" smtClean="0"/>
+              <a:t>distribution </a:t>
+            </a:r>
+            <a:br>
+              <a:rPr lang="en-GB" dirty="0" smtClean="0"/>
+            </a:br>
+            <a:r>
+              <a:rPr lang="en-GB" dirty="0" smtClean="0"/>
+              <a:t>can </a:t>
+            </a:r>
+            <a:r>
               <a:rPr lang="en-GB" dirty="0"/>
-              <a:t>But what about </a:t>
-            </a:r>
-            <a:r>
-              <a:rPr lang="en-GB" dirty="0" smtClean="0"/>
-              <a:t>the Minor Cycle?</a:t>
+              <a:t>exploit the data properties</a:t>
+            </a:r>
+            <a:r>
+              <a:rPr lang="en-GB" dirty="0" smtClean="0"/>
+              <a:t> </a:t>
             </a:r>
             <a:endParaRPr lang="en-GB" dirty="0"/>
           </a:p>
@@ -5150,46 +4691,41 @@
           <a:p>
             <a:r>
               <a:rPr lang="en-GB" dirty="0" smtClean="0"/>
-              <a:t>Deconvolution </a:t>
+              <a:t>How </a:t>
             </a:r>
             <a:r>
               <a:rPr lang="en-GB" dirty="0"/>
-              <a:t>may become the most time consuming </a:t>
-            </a:r>
-            <a:r>
-              <a:rPr lang="en-GB" dirty="0" smtClean="0"/>
-              <a:t>step</a:t>
-            </a:r>
-          </a:p>
-          <a:p>
-            <a:r>
-              <a:rPr lang="en-GB" dirty="0" smtClean="0"/>
-              <a:t>Deconvolution </a:t>
+              <a:t>large is the </a:t>
+            </a:r>
+            <a:r>
+              <a:rPr lang="en-GB" dirty="0" smtClean="0"/>
+              <a:t>PSF</a:t>
+            </a:r>
+          </a:p>
+          <a:p>
+            <a:r>
+              <a:rPr lang="en-GB" dirty="0" smtClean="0"/>
+              <a:t>How </a:t>
             </a:r>
             <a:r>
               <a:rPr lang="en-GB" dirty="0"/>
-              <a:t>is done only on one </a:t>
-            </a:r>
-            <a:r>
-              <a:rPr lang="en-GB" dirty="0" smtClean="0"/>
-              <a:t>node</a:t>
-            </a:r>
-            <a:endParaRPr lang="en-GB" dirty="0"/>
-          </a:p>
-          <a:p>
-            <a:r>
-              <a:rPr lang="en-GB" dirty="0" smtClean="0"/>
-              <a:t> All other nodes idle during deconvolution</a:t>
+              <a:t>large is the grid vs. the calibrated Visibilities</a:t>
             </a:r>
           </a:p>
           <a:p>
             <a:r>
               <a:rPr lang="en-GB" dirty="0"/>
-              <a:t>We can use the idling nodes for </a:t>
-            </a:r>
-            <a:r>
-              <a:rPr lang="en-GB" dirty="0" smtClean="0"/>
-              <a:t>deconvolution</a:t>
+              <a:t>How sparse is the model </a:t>
+            </a:r>
+            <a:r>
+              <a:rPr lang="en-GB" dirty="0" smtClean="0"/>
+              <a:t>image</a:t>
+            </a:r>
+          </a:p>
+          <a:p>
+            <a:r>
+              <a:rPr lang="en-GB" dirty="0" smtClean="0"/>
+              <a:t>…</a:t>
             </a:r>
           </a:p>
           <a:p>
@@ -5202,6 +4738,20 @@
             <a:pPr marL="0" indent="0">
               <a:buNone/>
             </a:pPr>
+            <a:r>
+              <a:rPr lang="en-GB" dirty="0" smtClean="0"/>
+              <a:t>Test on a real world </a:t>
+            </a:r>
+            <a:r>
+              <a:rPr lang="en-GB" dirty="0" err="1" smtClean="0"/>
+              <a:t>MeerKAT</a:t>
+            </a:r>
+            <a:r>
+              <a:rPr lang="en-GB" dirty="0" smtClean="0"/>
+              <a:t> observation</a:t>
+            </a:r>
+          </a:p>
+          <a:p>
             <a:endParaRPr lang="en-GB" dirty="0"/>
           </a:p>
         </p:txBody>
@@ -5209,7 +4759,7 @@
     </p:spTree>
     <p:extLst>
       <p:ext uri="{BB962C8B-B14F-4D97-AF65-F5344CB8AC3E}">
-        <p14:creationId xmlns:p14="http://schemas.microsoft.com/office/powerpoint/2010/main" val="592263724"/>
+        <p14:creationId xmlns:p14="http://schemas.microsoft.com/office/powerpoint/2010/main" val="1282123596"/>
       </p:ext>
     </p:extLst>
   </p:cSld>
@@ -5260,26 +4810,7 @@
           <a:p>
             <a:r>
               <a:rPr lang="en-GB" dirty="0" smtClean="0"/>
-              <a:t>Minor Cycle distribution </a:t>
-            </a:r>
-            <a:br>
-              <a:rPr lang="en-GB" dirty="0" smtClean="0"/>
-            </a:br>
-            <a:r>
-              <a:rPr lang="en-GB" dirty="0" smtClean="0"/>
-              <a:t>can</a:t>
-            </a:r>
-            <a:r>
-              <a:rPr lang="en-GB" dirty="0" smtClean="0"/>
-              <a:t> </a:t>
-            </a:r>
-            <a:r>
-              <a:rPr lang="en-GB" dirty="0"/>
-              <a:t>exploit the data properties</a:t>
-            </a:r>
-            <a:r>
-              <a:rPr lang="en-GB" dirty="0" smtClean="0"/>
-              <a:t> </a:t>
+              <a:t>Compressed Sensing based deconvolution</a:t>
             </a:r>
             <a:endParaRPr lang="en-GB" dirty="0"/>
           </a:p>
@@ -5302,77 +4833,78 @@
           </a:bodyPr>
           <a:lstStyle/>
           <a:p>
-            <a:r>
-              <a:rPr lang="en-GB" dirty="0" smtClean="0"/>
-              <a:t>How </a:t>
-            </a:r>
-            <a:r>
-              <a:rPr lang="en-GB" dirty="0"/>
-              <a:t>large is the </a:t>
-            </a:r>
-            <a:r>
-              <a:rPr lang="en-GB" dirty="0" smtClean="0"/>
-              <a:t>PSF</a:t>
-            </a:r>
-          </a:p>
-          <a:p>
-            <a:r>
-              <a:rPr lang="en-GB" dirty="0" smtClean="0"/>
-              <a:t>How </a:t>
-            </a:r>
-            <a:r>
-              <a:rPr lang="en-GB" dirty="0"/>
-              <a:t>large is the grid vs. the calibrated Visibilities</a:t>
-            </a:r>
-          </a:p>
-          <a:p>
-            <a:r>
-              <a:rPr lang="en-GB" dirty="0"/>
-              <a:t>How sparse is the model </a:t>
-            </a:r>
-            <a:r>
-              <a:rPr lang="en-GB" dirty="0" smtClean="0"/>
-              <a:t>image</a:t>
-            </a:r>
-          </a:p>
-          <a:p>
-            <a:r>
-              <a:rPr lang="en-GB" dirty="0" smtClean="0"/>
-              <a:t>…</a:t>
-            </a:r>
+            <a:endParaRPr lang="en-GB" dirty="0"/>
+          </a:p>
+          <a:p>
+            <a:endParaRPr lang="en-GB" dirty="0" smtClean="0"/>
+          </a:p>
+          <a:p>
+            <a:endParaRPr lang="en-GB" dirty="0"/>
+          </a:p>
+          <a:p>
+            <a:endParaRPr lang="en-GB" dirty="0" smtClean="0"/>
+          </a:p>
+          <a:p>
+            <a:r>
+              <a:rPr lang="en-GB" dirty="0" smtClean="0"/>
+              <a:t>P() represents the prior knowledge about our image</a:t>
+            </a:r>
+          </a:p>
+          <a:p>
+            <a:r>
+              <a:rPr lang="en-GB" dirty="0" smtClean="0"/>
+              <a:t>Optimization algorithm needed, Gradient Descent, ADMM…</a:t>
+            </a:r>
+          </a:p>
+          <a:p>
+            <a:endParaRPr lang="en-GB" dirty="0"/>
           </a:p>
           <a:p>
             <a:pPr marL="0" indent="0">
               <a:buNone/>
             </a:pPr>
-            <a:endParaRPr lang="en-GB" dirty="0" smtClean="0"/>
-          </a:p>
-          <a:p>
-            <a:pPr marL="0" indent="0">
-              <a:buNone/>
-            </a:pPr>
-            <a:r>
-              <a:rPr lang="en-GB" dirty="0" smtClean="0"/>
-              <a:t>Test on a real world </a:t>
-            </a:r>
-            <a:r>
-              <a:rPr lang="en-GB" dirty="0" err="1" smtClean="0"/>
-              <a:t>MeerKAT</a:t>
-            </a:r>
-            <a:r>
-              <a:rPr lang="en-GB" dirty="0" smtClean="0"/>
-              <a:t> observation</a:t>
-            </a:r>
-          </a:p>
-          <a:p>
+            <a:r>
+              <a:rPr lang="en-GB" dirty="0" smtClean="0"/>
+              <a:t>CLEAN can be seen as a Compressed Sensing based deconvolution</a:t>
+            </a:r>
             <a:endParaRPr lang="en-GB" dirty="0"/>
           </a:p>
         </p:txBody>
       </p:sp>
+      <p:pic>
+        <p:nvPicPr>
+          <p:cNvPr id="5" name="Grafik 4"/>
+          <p:cNvPicPr>
+            <a:picLocks noChangeAspect="1"/>
+          </p:cNvPicPr>
+          <p:nvPr/>
+        </p:nvPicPr>
+        <p:blipFill>
+          <a:blip r:embed="rId2">
+            <a:extLst>
+              <a:ext uri="{28A0092B-C50C-407E-A947-70E740481C1C}">
+                <a14:useLocalDpi xmlns:a14="http://schemas.microsoft.com/office/drawing/2010/main" val="0"/>
+              </a:ext>
+            </a:extLst>
+          </a:blip>
+          <a:stretch>
+            <a:fillRect/>
+          </a:stretch>
+        </p:blipFill>
+        <p:spPr>
+          <a:xfrm>
+            <a:off x="2489885" y="2207522"/>
+            <a:ext cx="6853881" cy="933199"/>
+          </a:xfrm>
+          <a:prstGeom prst="rect">
+            <a:avLst/>
+          </a:prstGeom>
+        </p:spPr>
+      </p:pic>
     </p:spTree>
     <p:extLst>
       <p:ext uri="{BB962C8B-B14F-4D97-AF65-F5344CB8AC3E}">
-        <p14:creationId xmlns:p14="http://schemas.microsoft.com/office/powerpoint/2010/main" val="1282123596"/>
+        <p14:creationId xmlns:p14="http://schemas.microsoft.com/office/powerpoint/2010/main" val="857991154"/>
       </p:ext>
     </p:extLst>
   </p:cSld>
@@ -5390,7 +4922,7 @@
 </file>
 
 <file path=ppt/slides/slide9.xml><?xml version="1.0" encoding="utf-8"?>
-<p:sld xmlns:a="http://schemas.openxmlformats.org/drawingml/2006/main" xmlns:r="http://schemas.openxmlformats.org/officeDocument/2006/relationships" xmlns:p="http://schemas.openxmlformats.org/presentationml/2006/main" show="0">
+<p:sld xmlns:a="http://schemas.openxmlformats.org/drawingml/2006/main" xmlns:r="http://schemas.openxmlformats.org/officeDocument/2006/relationships" xmlns:p="http://schemas.openxmlformats.org/presentationml/2006/main">
   <p:cSld>
     <p:spTree>
       <p:nvGrpSpPr>
@@ -5423,21 +4955,96 @@
           <a:p>
             <a:r>
               <a:rPr lang="en-GB" dirty="0" smtClean="0"/>
-              <a:t>The problem of distributed deconvolution</a:t>
-            </a:r>
+              <a:t>Compressed </a:t>
+            </a:r>
+            <a:r>
+              <a:rPr lang="en-GB" dirty="0"/>
+              <a:t>Sensing based deconvolution</a:t>
+            </a:r>
+          </a:p>
+        </p:txBody>
+      </p:sp>
+      <p:sp>
+        <p:nvSpPr>
+          <p:cNvPr id="3" name="Inhaltsplatzhalter 2"/>
+          <p:cNvSpPr>
+            <a:spLocks noGrp="1"/>
+          </p:cNvSpPr>
+          <p:nvPr>
+            <p:ph idx="1"/>
+          </p:nvPr>
+        </p:nvSpPr>
+        <p:spPr/>
+        <p:txBody>
+          <a:bodyPr>
+            <a:normAutofit/>
+          </a:bodyPr>
+          <a:lstStyle/>
+          <a:p>
+            <a:endParaRPr lang="en-GB" dirty="0" smtClean="0"/>
+          </a:p>
+          <a:p>
+            <a:endParaRPr lang="en-GB" dirty="0"/>
+          </a:p>
+          <a:p>
+            <a:pPr marL="0" indent="0">
+              <a:buNone/>
+            </a:pPr>
+            <a:endParaRPr lang="en-GB" dirty="0" smtClean="0"/>
+          </a:p>
+          <a:p>
+            <a:pPr marL="0" indent="0">
+              <a:buNone/>
+            </a:pPr>
+            <a:endParaRPr lang="en-GB" dirty="0" smtClean="0"/>
+          </a:p>
+          <a:p>
+            <a:r>
+              <a:rPr lang="en-GB" dirty="0" smtClean="0"/>
+              <a:t>P() </a:t>
+            </a:r>
+            <a:r>
+              <a:rPr lang="en-GB" dirty="0" smtClean="0">
+                <a:sym typeface="Wingdings" panose="05000000000000000000" pitchFamily="2" charset="2"/>
+              </a:rPr>
+              <a:t> </a:t>
+            </a:r>
+            <a:r>
+              <a:rPr lang="en-GB" dirty="0" err="1" smtClean="0">
+                <a:sym typeface="Wingdings" panose="05000000000000000000" pitchFamily="2" charset="2"/>
+              </a:rPr>
+              <a:t>ElasticNet</a:t>
+            </a:r>
+            <a:endParaRPr lang="en-GB" dirty="0" smtClean="0"/>
+          </a:p>
+          <a:p>
+            <a:r>
+              <a:rPr lang="en-GB" dirty="0" smtClean="0"/>
+              <a:t>Optimization Algorithm </a:t>
+            </a:r>
+            <a:r>
+              <a:rPr lang="en-GB" dirty="0" smtClean="0">
+                <a:sym typeface="Wingdings" panose="05000000000000000000" pitchFamily="2" charset="2"/>
+              </a:rPr>
+              <a:t> Coordinate Descent</a:t>
+            </a:r>
+            <a:endParaRPr lang="en-GB" dirty="0" smtClean="0"/>
+          </a:p>
+          <a:p>
+            <a:endParaRPr lang="en-GB" dirty="0"/>
+          </a:p>
+          <a:p>
             <a:endParaRPr lang="en-GB" dirty="0"/>
           </a:p>
         </p:txBody>
       </p:sp>
       <p:pic>
         <p:nvPicPr>
-          <p:cNvPr id="4" name="Inhaltsplatzhalter 3"/>
+          <p:cNvPr id="5" name="Grafik 4"/>
           <p:cNvPicPr>
-            <a:picLocks noGrp="1" noChangeAspect="1"/>
+            <a:picLocks noChangeAspect="1"/>
           </p:cNvPicPr>
-          <p:nvPr>
-            <p:ph idx="1"/>
-          </p:nvPr>
+          <p:nvPr/>
         </p:nvPicPr>
         <p:blipFill>
           <a:blip r:embed="rId2">
@@ -5453,29 +5060,24 @@
         </p:blipFill>
         <p:spPr>
           <a:xfrm>
-            <a:off x="3263900" y="1550988"/>
-            <a:ext cx="4965700" cy="4965700"/>
+            <a:off x="2421923" y="2250771"/>
+            <a:ext cx="6853881" cy="933199"/>
           </a:xfrm>
+          <a:prstGeom prst="rect">
+            <a:avLst/>
+          </a:prstGeom>
         </p:spPr>
       </p:pic>
     </p:spTree>
     <p:extLst>
       <p:ext uri="{BB962C8B-B14F-4D97-AF65-F5344CB8AC3E}">
-        <p14:creationId xmlns:p14="http://schemas.microsoft.com/office/powerpoint/2010/main" val="2646679646"/>
+        <p14:creationId xmlns:p14="http://schemas.microsoft.com/office/powerpoint/2010/main" val="2103644964"/>
       </p:ext>
     </p:extLst>
   </p:cSld>
   <p:clrMapOvr>
     <a:masterClrMapping/>
   </p:clrMapOvr>
-  <mc:AlternateContent xmlns:mc="http://schemas.openxmlformats.org/markup-compatibility/2006">
-    <mc:Choice xmlns:p14="http://schemas.microsoft.com/office/powerpoint/2010/main" Requires="p14">
-      <p:transition spd="slow" p14:dur="2000"/>
-    </mc:Choice>
-    <mc:Fallback>
-      <p:transition spd="slow"/>
-    </mc:Fallback>
-  </mc:AlternateContent>
   <p:timing>
     <p:tnLst>
       <p:par>

</xml_diff>